<commit_message>
revising according to Ben Tully's advice
</commit_message>
<xml_diff>
--- a/Figure Generating/illustration_conclusion.pptx
+++ b/Figure Generating/illustration_conclusion.pptx
@@ -8,11 +8,11 @@
     <p:notesMasterId r:id="rId7"/>
   </p:notesMasterIdLst>
   <p:sldIdLst>
-    <p:sldId id="259" r:id="rId2"/>
-    <p:sldId id="260" r:id="rId3"/>
-    <p:sldId id="262" r:id="rId4"/>
-    <p:sldId id="261" r:id="rId5"/>
-    <p:sldId id="263" r:id="rId6"/>
+    <p:sldId id="262" r:id="rId2"/>
+    <p:sldId id="263" r:id="rId3"/>
+    <p:sldId id="256" r:id="rId4"/>
+    <p:sldId id="265" r:id="rId5"/>
+    <p:sldId id="266" r:id="rId6"/>
   </p:sldIdLst>
   <p:sldSz cx="9144000" cy="5143500" type="screen16x9"/>
   <p:notesSz cx="6858000" cy="9144000"/>
@@ -264,6 +264,470 @@
 </p:presentation>
 </file>
 
+<file path=ppt/ink/ink1.xml><?xml version="1.0" encoding="utf-8"?>
+<inkml:ink xmlns:inkml="http://www.w3.org/2003/InkML">
+  <inkml:definitions>
+    <inkml:context xml:id="ctx0">
+      <inkml:inkSource xml:id="inkSrc0">
+        <inkml:traceFormat>
+          <inkml:channel name="X" type="integer" min="-2.14748E9" max="2.14748E9" units="cm"/>
+          <inkml:channel name="Y" type="integer" min="-2.14748E9" max="2.14748E9" units="cm"/>
+        </inkml:traceFormat>
+        <inkml:channelProperties>
+          <inkml:channelProperty channel="X" name="resolution" value="1000" units="1/cm"/>
+          <inkml:channelProperty channel="Y" name="resolution" value="1000" units="1/cm"/>
+        </inkml:channelProperties>
+      </inkml:inkSource>
+      <inkml:timestamp xml:id="ts0" timeString="2021-12-02T08:03:33.212"/>
+    </inkml:context>
+    <inkml:brush xml:id="br0">
+      <inkml:brushProperty name="width" value="0.3" units="cm"/>
+      <inkml:brushProperty name="height" value="0.6" units="cm"/>
+      <inkml:brushProperty name="color" value="#33CCFF"/>
+      <inkml:brushProperty name="tip" value="rectangle"/>
+      <inkml:brushProperty name="rasterOp" value="maskPen"/>
+      <inkml:brushProperty name="ignorePressure" value="1"/>
+    </inkml:brush>
+  </inkml:definitions>
+  <inkml:trace contextRef="#ctx0" brushRef="#br0">0 0,'2091'0,"-2065"0</inkml:trace>
+</inkml:ink>
+</file>
+
+<file path=ppt/ink/ink10.xml><?xml version="1.0" encoding="utf-8"?>
+<inkml:ink xmlns:inkml="http://www.w3.org/2003/InkML">
+  <inkml:definitions>
+    <inkml:context xml:id="ctx0">
+      <inkml:inkSource xml:id="inkSrc0">
+        <inkml:traceFormat>
+          <inkml:channel name="X" type="integer" min="-2.14748E9" max="2.14748E9" units="cm"/>
+          <inkml:channel name="Y" type="integer" min="-2.14748E9" max="2.14748E9" units="cm"/>
+        </inkml:traceFormat>
+        <inkml:channelProperties>
+          <inkml:channelProperty channel="X" name="resolution" value="1000" units="1/cm"/>
+          <inkml:channelProperty channel="Y" name="resolution" value="1000" units="1/cm"/>
+        </inkml:channelProperties>
+      </inkml:inkSource>
+      <inkml:timestamp xml:id="ts0" timeString="2021-12-02T08:03:36.255"/>
+    </inkml:context>
+    <inkml:brush xml:id="br0">
+      <inkml:brushProperty name="width" value="0.3" units="cm"/>
+      <inkml:brushProperty name="height" value="0.6" units="cm"/>
+      <inkml:brushProperty name="color" value="#33CCFF"/>
+      <inkml:brushProperty name="tip" value="rectangle"/>
+      <inkml:brushProperty name="rasterOp" value="maskPen"/>
+      <inkml:brushProperty name="ignorePressure" value="1"/>
+    </inkml:brush>
+  </inkml:definitions>
+  <inkml:trace contextRef="#ctx0" brushRef="#br0">1 1,'1656'0,"-1635"0</inkml:trace>
+</inkml:ink>
+</file>
+
+<file path=ppt/ink/ink11.xml><?xml version="1.0" encoding="utf-8"?>
+<inkml:ink xmlns:inkml="http://www.w3.org/2003/InkML">
+  <inkml:definitions>
+    <inkml:context xml:id="ctx0">
+      <inkml:inkSource xml:id="inkSrc0">
+        <inkml:traceFormat>
+          <inkml:channel name="X" type="integer" min="-2.14748E9" max="2.14748E9" units="cm"/>
+          <inkml:channel name="Y" type="integer" min="-2.14748E9" max="2.14748E9" units="cm"/>
+        </inkml:traceFormat>
+        <inkml:channelProperties>
+          <inkml:channelProperty channel="X" name="resolution" value="1000" units="1/cm"/>
+          <inkml:channelProperty channel="Y" name="resolution" value="1000" units="1/cm"/>
+        </inkml:channelProperties>
+      </inkml:inkSource>
+      <inkml:timestamp xml:id="ts0" timeString="2021-12-02T08:03:38.334"/>
+    </inkml:context>
+    <inkml:brush xml:id="br0">
+      <inkml:brushProperty name="width" value="0.3" units="cm"/>
+      <inkml:brushProperty name="height" value="0.6" units="cm"/>
+      <inkml:brushProperty name="color" value="#33CCFF"/>
+      <inkml:brushProperty name="tip" value="rectangle"/>
+      <inkml:brushProperty name="rasterOp" value="maskPen"/>
+      <inkml:brushProperty name="ignorePressure" value="1"/>
+    </inkml:brush>
+  </inkml:definitions>
+  <inkml:trace contextRef="#ctx0" brushRef="#br0">0 1,'1566'0,"-1545"0</inkml:trace>
+</inkml:ink>
+</file>
+
+<file path=ppt/ink/ink12.xml><?xml version="1.0" encoding="utf-8"?>
+<inkml:ink xmlns:inkml="http://www.w3.org/2003/InkML">
+  <inkml:definitions>
+    <inkml:context xml:id="ctx0">
+      <inkml:inkSource xml:id="inkSrc0">
+        <inkml:traceFormat>
+          <inkml:channel name="X" type="integer" min="-2.14748E9" max="2.14748E9" units="cm"/>
+          <inkml:channel name="Y" type="integer" min="-2.14748E9" max="2.14748E9" units="cm"/>
+        </inkml:traceFormat>
+        <inkml:channelProperties>
+          <inkml:channelProperty channel="X" name="resolution" value="1000" units="1/cm"/>
+          <inkml:channelProperty channel="Y" name="resolution" value="1000" units="1/cm"/>
+        </inkml:channelProperties>
+      </inkml:inkSource>
+      <inkml:timestamp xml:id="ts0" timeString="2021-12-02T08:03:48.500"/>
+    </inkml:context>
+    <inkml:brush xml:id="br0">
+      <inkml:brushProperty name="width" value="0.3" units="cm"/>
+      <inkml:brushProperty name="height" value="0.6" units="cm"/>
+      <inkml:brushProperty name="color" value="#33CCFF"/>
+      <inkml:brushProperty name="tip" value="rectangle"/>
+      <inkml:brushProperty name="rasterOp" value="maskPen"/>
+      <inkml:brushProperty name="ignorePressure" value="1"/>
+    </inkml:brush>
+  </inkml:definitions>
+  <inkml:trace contextRef="#ctx0" brushRef="#br0">1 1,'980'0,"-967"0</inkml:trace>
+</inkml:ink>
+</file>
+
+<file path=ppt/ink/ink13.xml><?xml version="1.0" encoding="utf-8"?>
+<inkml:ink xmlns:inkml="http://www.w3.org/2003/InkML">
+  <inkml:definitions>
+    <inkml:context xml:id="ctx0">
+      <inkml:inkSource xml:id="inkSrc0">
+        <inkml:traceFormat>
+          <inkml:channel name="X" type="integer" min="-2.14748E9" max="2.14748E9" units="cm"/>
+          <inkml:channel name="Y" type="integer" min="-2.14748E9" max="2.14748E9" units="cm"/>
+        </inkml:traceFormat>
+        <inkml:channelProperties>
+          <inkml:channelProperty channel="X" name="resolution" value="1000" units="1/cm"/>
+          <inkml:channelProperty channel="Y" name="resolution" value="1000" units="1/cm"/>
+        </inkml:channelProperties>
+      </inkml:inkSource>
+      <inkml:timestamp xml:id="ts0" timeString="2021-12-02T08:04:58.816"/>
+    </inkml:context>
+    <inkml:brush xml:id="br0">
+      <inkml:brushProperty name="width" value="0.3" units="cm"/>
+      <inkml:brushProperty name="height" value="0.6" units="cm"/>
+      <inkml:brushProperty name="color" value="#33CCFF"/>
+      <inkml:brushProperty name="tip" value="rectangle"/>
+      <inkml:brushProperty name="rasterOp" value="maskPen"/>
+      <inkml:brushProperty name="ignorePressure" value="1"/>
+    </inkml:brush>
+  </inkml:definitions>
+  <inkml:trace contextRef="#ctx0" brushRef="#br0">1 1,'1361'0,"-1343"0</inkml:trace>
+</inkml:ink>
+</file>
+
+<file path=ppt/ink/ink14.xml><?xml version="1.0" encoding="utf-8"?>
+<inkml:ink xmlns:inkml="http://www.w3.org/2003/InkML">
+  <inkml:definitions>
+    <inkml:context xml:id="ctx0">
+      <inkml:inkSource xml:id="inkSrc0">
+        <inkml:traceFormat>
+          <inkml:channel name="X" type="integer" min="-2.14748E9" max="2.14748E9" units="cm"/>
+          <inkml:channel name="Y" type="integer" min="-2.14748E9" max="2.14748E9" units="cm"/>
+        </inkml:traceFormat>
+        <inkml:channelProperties>
+          <inkml:channelProperty channel="X" name="resolution" value="1000" units="1/cm"/>
+          <inkml:channelProperty channel="Y" name="resolution" value="1000" units="1/cm"/>
+        </inkml:channelProperties>
+      </inkml:inkSource>
+      <inkml:timestamp xml:id="ts0" timeString="2021-12-02T08:05:07.310"/>
+    </inkml:context>
+    <inkml:brush xml:id="br0">
+      <inkml:brushProperty name="width" value="0.3" units="cm"/>
+      <inkml:brushProperty name="height" value="0.6" units="cm"/>
+      <inkml:brushProperty name="color" value="#33CCFF"/>
+      <inkml:brushProperty name="tip" value="rectangle"/>
+      <inkml:brushProperty name="rasterOp" value="maskPen"/>
+      <inkml:brushProperty name="ignorePressure" value="1"/>
+    </inkml:brush>
+  </inkml:definitions>
+  <inkml:trace contextRef="#ctx0" brushRef="#br0">1 1,'1414'0,"-1395"0</inkml:trace>
+</inkml:ink>
+</file>
+
+<file path=ppt/ink/ink15.xml><?xml version="1.0" encoding="utf-8"?>
+<inkml:ink xmlns:inkml="http://www.w3.org/2003/InkML">
+  <inkml:definitions>
+    <inkml:context xml:id="ctx0">
+      <inkml:inkSource xml:id="inkSrc0">
+        <inkml:traceFormat>
+          <inkml:channel name="X" type="integer" min="-2.14748E9" max="2.14748E9" units="cm"/>
+          <inkml:channel name="Y" type="integer" min="-2.14748E9" max="2.14748E9" units="cm"/>
+        </inkml:traceFormat>
+        <inkml:channelProperties>
+          <inkml:channelProperty channel="X" name="resolution" value="1000" units="1/cm"/>
+          <inkml:channelProperty channel="Y" name="resolution" value="1000" units="1/cm"/>
+        </inkml:channelProperties>
+      </inkml:inkSource>
+      <inkml:timestamp xml:id="ts0" timeString="2021-12-02T08:06:24.616"/>
+    </inkml:context>
+    <inkml:brush xml:id="br0">
+      <inkml:brushProperty name="width" value="0.3" units="cm"/>
+      <inkml:brushProperty name="height" value="0.6" units="cm"/>
+      <inkml:brushProperty name="color" value="#66FFFF"/>
+      <inkml:brushProperty name="tip" value="rectangle"/>
+      <inkml:brushProperty name="rasterOp" value="maskPen"/>
+      <inkml:brushProperty name="ignorePressure" value="1"/>
+    </inkml:brush>
+  </inkml:definitions>
+  <inkml:trace contextRef="#ctx0" brushRef="#br0">1 0,'126'14,"608"-15,-558 14,124-13,-398 0,84 0</inkml:trace>
+</inkml:ink>
+</file>
+
+<file path=ppt/ink/ink16.xml><?xml version="1.0" encoding="utf-8"?>
+<inkml:ink xmlns:inkml="http://www.w3.org/2003/InkML">
+  <inkml:definitions>
+    <inkml:context xml:id="ctx0">
+      <inkml:inkSource xml:id="inkSrc0">
+        <inkml:traceFormat>
+          <inkml:channel name="X" type="integer" min="-2.14748E9" max="2.14748E9" units="cm"/>
+          <inkml:channel name="Y" type="integer" min="-2.14748E9" max="2.14748E9" units="cm"/>
+        </inkml:traceFormat>
+        <inkml:channelProperties>
+          <inkml:channelProperty channel="X" name="resolution" value="1000" units="1/cm"/>
+          <inkml:channelProperty channel="Y" name="resolution" value="1000" units="1/cm"/>
+        </inkml:channelProperties>
+      </inkml:inkSource>
+      <inkml:timestamp xml:id="ts0" timeString="2021-12-02T08:06:28.654"/>
+    </inkml:context>
+    <inkml:brush xml:id="br0">
+      <inkml:brushProperty name="width" value="0.3" units="cm"/>
+      <inkml:brushProperty name="height" value="0.6" units="cm"/>
+      <inkml:brushProperty name="color" value="#66FFFF"/>
+      <inkml:brushProperty name="tip" value="rectangle"/>
+      <inkml:brushProperty name="rasterOp" value="maskPen"/>
+      <inkml:brushProperty name="ignorePressure" value="1"/>
+    </inkml:brush>
+  </inkml:definitions>
+  <inkml:trace contextRef="#ctx0" brushRef="#br0">0 1,'706'0,"-697"0</inkml:trace>
+</inkml:ink>
+</file>
+
+<file path=ppt/ink/ink2.xml><?xml version="1.0" encoding="utf-8"?>
+<inkml:ink xmlns:inkml="http://www.w3.org/2003/InkML">
+  <inkml:definitions>
+    <inkml:context xml:id="ctx0">
+      <inkml:inkSource xml:id="inkSrc0">
+        <inkml:traceFormat>
+          <inkml:channel name="X" type="integer" min="-2.14748E9" max="2.14748E9" units="cm"/>
+          <inkml:channel name="Y" type="integer" min="-2.14748E9" max="2.14748E9" units="cm"/>
+        </inkml:traceFormat>
+        <inkml:channelProperties>
+          <inkml:channelProperty channel="X" name="resolution" value="1000" units="1/cm"/>
+          <inkml:channelProperty channel="Y" name="resolution" value="1000" units="1/cm"/>
+        </inkml:channelProperties>
+      </inkml:inkSource>
+      <inkml:timestamp xml:id="ts0" timeString="2021-12-02T08:03:36.255"/>
+    </inkml:context>
+    <inkml:brush xml:id="br0">
+      <inkml:brushProperty name="width" value="0.3" units="cm"/>
+      <inkml:brushProperty name="height" value="0.6" units="cm"/>
+      <inkml:brushProperty name="color" value="#33CCFF"/>
+      <inkml:brushProperty name="tip" value="rectangle"/>
+      <inkml:brushProperty name="rasterOp" value="maskPen"/>
+      <inkml:brushProperty name="ignorePressure" value="1"/>
+    </inkml:brush>
+  </inkml:definitions>
+  <inkml:trace contextRef="#ctx0" brushRef="#br0">1 1,'1656'0,"-1635"0</inkml:trace>
+</inkml:ink>
+</file>
+
+<file path=ppt/ink/ink3.xml><?xml version="1.0" encoding="utf-8"?>
+<inkml:ink xmlns:inkml="http://www.w3.org/2003/InkML">
+  <inkml:definitions>
+    <inkml:context xml:id="ctx0">
+      <inkml:inkSource xml:id="inkSrc0">
+        <inkml:traceFormat>
+          <inkml:channel name="X" type="integer" min="-2.14748E9" max="2.14748E9" units="cm"/>
+          <inkml:channel name="Y" type="integer" min="-2.14748E9" max="2.14748E9" units="cm"/>
+        </inkml:traceFormat>
+        <inkml:channelProperties>
+          <inkml:channelProperty channel="X" name="resolution" value="1000" units="1/cm"/>
+          <inkml:channelProperty channel="Y" name="resolution" value="1000" units="1/cm"/>
+        </inkml:channelProperties>
+      </inkml:inkSource>
+      <inkml:timestamp xml:id="ts0" timeString="2021-12-02T08:03:38.334"/>
+    </inkml:context>
+    <inkml:brush xml:id="br0">
+      <inkml:brushProperty name="width" value="0.3" units="cm"/>
+      <inkml:brushProperty name="height" value="0.6" units="cm"/>
+      <inkml:brushProperty name="color" value="#33CCFF"/>
+      <inkml:brushProperty name="tip" value="rectangle"/>
+      <inkml:brushProperty name="rasterOp" value="maskPen"/>
+      <inkml:brushProperty name="ignorePressure" value="1"/>
+    </inkml:brush>
+  </inkml:definitions>
+  <inkml:trace contextRef="#ctx0" brushRef="#br0">0 1,'1566'0,"-1545"0</inkml:trace>
+</inkml:ink>
+</file>
+
+<file path=ppt/ink/ink4.xml><?xml version="1.0" encoding="utf-8"?>
+<inkml:ink xmlns:inkml="http://www.w3.org/2003/InkML">
+  <inkml:definitions>
+    <inkml:context xml:id="ctx0">
+      <inkml:inkSource xml:id="inkSrc0">
+        <inkml:traceFormat>
+          <inkml:channel name="X" type="integer" min="-2.14748E9" max="2.14748E9" units="cm"/>
+          <inkml:channel name="Y" type="integer" min="-2.14748E9" max="2.14748E9" units="cm"/>
+        </inkml:traceFormat>
+        <inkml:channelProperties>
+          <inkml:channelProperty channel="X" name="resolution" value="1000" units="1/cm"/>
+          <inkml:channelProperty channel="Y" name="resolution" value="1000" units="1/cm"/>
+        </inkml:channelProperties>
+      </inkml:inkSource>
+      <inkml:timestamp xml:id="ts0" timeString="2021-12-02T08:03:48.500"/>
+    </inkml:context>
+    <inkml:brush xml:id="br0">
+      <inkml:brushProperty name="width" value="0.3" units="cm"/>
+      <inkml:brushProperty name="height" value="0.6" units="cm"/>
+      <inkml:brushProperty name="color" value="#33CCFF"/>
+      <inkml:brushProperty name="tip" value="rectangle"/>
+      <inkml:brushProperty name="rasterOp" value="maskPen"/>
+      <inkml:brushProperty name="ignorePressure" value="1"/>
+    </inkml:brush>
+  </inkml:definitions>
+  <inkml:trace contextRef="#ctx0" brushRef="#br0">1 1,'1656'0,"-1634"0</inkml:trace>
+</inkml:ink>
+</file>
+
+<file path=ppt/ink/ink5.xml><?xml version="1.0" encoding="utf-8"?>
+<inkml:ink xmlns:inkml="http://www.w3.org/2003/InkML">
+  <inkml:definitions>
+    <inkml:context xml:id="ctx0">
+      <inkml:inkSource xml:id="inkSrc0">
+        <inkml:traceFormat>
+          <inkml:channel name="X" type="integer" min="-2.14748E9" max="2.14748E9" units="cm"/>
+          <inkml:channel name="Y" type="integer" min="-2.14748E9" max="2.14748E9" units="cm"/>
+        </inkml:traceFormat>
+        <inkml:channelProperties>
+          <inkml:channelProperty channel="X" name="resolution" value="1000" units="1/cm"/>
+          <inkml:channelProperty channel="Y" name="resolution" value="1000" units="1/cm"/>
+        </inkml:channelProperties>
+      </inkml:inkSource>
+      <inkml:timestamp xml:id="ts0" timeString="2021-12-02T08:04:58.816"/>
+    </inkml:context>
+    <inkml:brush xml:id="br0">
+      <inkml:brushProperty name="width" value="0.3" units="cm"/>
+      <inkml:brushProperty name="height" value="0.6" units="cm"/>
+      <inkml:brushProperty name="color" value="#33CCFF"/>
+      <inkml:brushProperty name="tip" value="rectangle"/>
+      <inkml:brushProperty name="rasterOp" value="maskPen"/>
+      <inkml:brushProperty name="ignorePressure" value="1"/>
+    </inkml:brush>
+  </inkml:definitions>
+  <inkml:trace contextRef="#ctx0" brushRef="#br0">1 1,'1656'0,"-1634"0</inkml:trace>
+</inkml:ink>
+</file>
+
+<file path=ppt/ink/ink6.xml><?xml version="1.0" encoding="utf-8"?>
+<inkml:ink xmlns:inkml="http://www.w3.org/2003/InkML">
+  <inkml:definitions>
+    <inkml:context xml:id="ctx0">
+      <inkml:inkSource xml:id="inkSrc0">
+        <inkml:traceFormat>
+          <inkml:channel name="X" type="integer" min="-2.14748E9" max="2.14748E9" units="cm"/>
+          <inkml:channel name="Y" type="integer" min="-2.14748E9" max="2.14748E9" units="cm"/>
+        </inkml:traceFormat>
+        <inkml:channelProperties>
+          <inkml:channelProperty channel="X" name="resolution" value="1000" units="1/cm"/>
+          <inkml:channelProperty channel="Y" name="resolution" value="1000" units="1/cm"/>
+        </inkml:channelProperties>
+      </inkml:inkSource>
+      <inkml:timestamp xml:id="ts0" timeString="2021-12-02T08:05:07.310"/>
+    </inkml:context>
+    <inkml:brush xml:id="br0">
+      <inkml:brushProperty name="width" value="0.3" units="cm"/>
+      <inkml:brushProperty name="height" value="0.6" units="cm"/>
+      <inkml:brushProperty name="color" value="#33CCFF"/>
+      <inkml:brushProperty name="tip" value="rectangle"/>
+      <inkml:brushProperty name="rasterOp" value="maskPen"/>
+      <inkml:brushProperty name="ignorePressure" value="1"/>
+    </inkml:brush>
+  </inkml:definitions>
+  <inkml:trace contextRef="#ctx0" brushRef="#br0">1 1,'1414'0,"-1395"0</inkml:trace>
+</inkml:ink>
+</file>
+
+<file path=ppt/ink/ink7.xml><?xml version="1.0" encoding="utf-8"?>
+<inkml:ink xmlns:inkml="http://www.w3.org/2003/InkML">
+  <inkml:definitions>
+    <inkml:context xml:id="ctx0">
+      <inkml:inkSource xml:id="inkSrc0">
+        <inkml:traceFormat>
+          <inkml:channel name="X" type="integer" min="-2.14748E9" max="2.14748E9" units="cm"/>
+          <inkml:channel name="Y" type="integer" min="-2.14748E9" max="2.14748E9" units="cm"/>
+        </inkml:traceFormat>
+        <inkml:channelProperties>
+          <inkml:channelProperty channel="X" name="resolution" value="1000" units="1/cm"/>
+          <inkml:channelProperty channel="Y" name="resolution" value="1000" units="1/cm"/>
+        </inkml:channelProperties>
+      </inkml:inkSource>
+      <inkml:timestamp xml:id="ts0" timeString="2021-12-02T08:06:24.616"/>
+    </inkml:context>
+    <inkml:brush xml:id="br0">
+      <inkml:brushProperty name="width" value="0.3" units="cm"/>
+      <inkml:brushProperty name="height" value="0.6" units="cm"/>
+      <inkml:brushProperty name="color" value="#66FFFF"/>
+      <inkml:brushProperty name="tip" value="rectangle"/>
+      <inkml:brushProperty name="rasterOp" value="maskPen"/>
+      <inkml:brushProperty name="ignorePressure" value="1"/>
+    </inkml:brush>
+  </inkml:definitions>
+  <inkml:trace contextRef="#ctx0" brushRef="#br0">1 0,'126'14,"608"-15,-558 14,124-13,-398 0,84 0</inkml:trace>
+</inkml:ink>
+</file>
+
+<file path=ppt/ink/ink8.xml><?xml version="1.0" encoding="utf-8"?>
+<inkml:ink xmlns:inkml="http://www.w3.org/2003/InkML">
+  <inkml:definitions>
+    <inkml:context xml:id="ctx0">
+      <inkml:inkSource xml:id="inkSrc0">
+        <inkml:traceFormat>
+          <inkml:channel name="X" type="integer" min="-2.14748E9" max="2.14748E9" units="cm"/>
+          <inkml:channel name="Y" type="integer" min="-2.14748E9" max="2.14748E9" units="cm"/>
+        </inkml:traceFormat>
+        <inkml:channelProperties>
+          <inkml:channelProperty channel="X" name="resolution" value="1000" units="1/cm"/>
+          <inkml:channelProperty channel="Y" name="resolution" value="1000" units="1/cm"/>
+        </inkml:channelProperties>
+      </inkml:inkSource>
+      <inkml:timestamp xml:id="ts0" timeString="2021-12-02T08:06:28.654"/>
+    </inkml:context>
+    <inkml:brush xml:id="br0">
+      <inkml:brushProperty name="width" value="0.3" units="cm"/>
+      <inkml:brushProperty name="height" value="0.6" units="cm"/>
+      <inkml:brushProperty name="color" value="#66FFFF"/>
+      <inkml:brushProperty name="tip" value="rectangle"/>
+      <inkml:brushProperty name="rasterOp" value="maskPen"/>
+      <inkml:brushProperty name="ignorePressure" value="1"/>
+    </inkml:brush>
+  </inkml:definitions>
+  <inkml:trace contextRef="#ctx0" brushRef="#br0">0 1,'1221'0,"-1206"0</inkml:trace>
+</inkml:ink>
+</file>
+
+<file path=ppt/ink/ink9.xml><?xml version="1.0" encoding="utf-8"?>
+<inkml:ink xmlns:inkml="http://www.w3.org/2003/InkML">
+  <inkml:definitions>
+    <inkml:context xml:id="ctx0">
+      <inkml:inkSource xml:id="inkSrc0">
+        <inkml:traceFormat>
+          <inkml:channel name="X" type="integer" min="-2.14748E9" max="2.14748E9" units="cm"/>
+          <inkml:channel name="Y" type="integer" min="-2.14748E9" max="2.14748E9" units="cm"/>
+        </inkml:traceFormat>
+        <inkml:channelProperties>
+          <inkml:channelProperty channel="X" name="resolution" value="1000" units="1/cm"/>
+          <inkml:channelProperty channel="Y" name="resolution" value="1000" units="1/cm"/>
+        </inkml:channelProperties>
+      </inkml:inkSource>
+      <inkml:timestamp xml:id="ts0" timeString="2021-12-02T08:03:33.212"/>
+    </inkml:context>
+    <inkml:brush xml:id="br0">
+      <inkml:brushProperty name="width" value="0.3" units="cm"/>
+      <inkml:brushProperty name="height" value="0.6" units="cm"/>
+      <inkml:brushProperty name="color" value="#33CCFF"/>
+      <inkml:brushProperty name="tip" value="rectangle"/>
+      <inkml:brushProperty name="rasterOp" value="maskPen"/>
+      <inkml:brushProperty name="ignorePressure" value="1"/>
+    </inkml:brush>
+  </inkml:definitions>
+  <inkml:trace contextRef="#ctx0" brushRef="#br0">0 0,'2091'0,"-2065"0</inkml:trace>
+</inkml:ink>
+</file>
+
 <file path=ppt/notesMasters/notesMaster1.xml><?xml version="1.0" encoding="utf-8"?>
 <p:notesMaster xmlns:a="http://schemas.openxmlformats.org/drawingml/2006/main" xmlns:r="http://schemas.openxmlformats.org/officeDocument/2006/relationships" xmlns:p="http://schemas.openxmlformats.org/presentationml/2006/main">
   <p:cSld>
@@ -706,219 +1170,6 @@
 </file>
 
 <file path=ppt/notesSlides/notesSlide1.xml><?xml version="1.0" encoding="utf-8"?>
-<p:notes xmlns:a="http://schemas.openxmlformats.org/drawingml/2006/main" xmlns:r="http://schemas.openxmlformats.org/officeDocument/2006/relationships" xmlns:p="http://schemas.openxmlformats.org/presentationml/2006/main" showMasterSp="0" showMasterPhAnim="0">
-  <p:cSld>
-    <p:spTree>
-      <p:nvGrpSpPr>
-        <p:cNvPr id="1" name="Shape 80"/>
-        <p:cNvGrpSpPr/>
-        <p:nvPr/>
-      </p:nvGrpSpPr>
-      <p:grpSpPr>
-        <a:xfrm>
-          <a:off x="0" y="0"/>
-          <a:ext cx="0" cy="0"/>
-          <a:chOff x="0" y="0"/>
-          <a:chExt cx="0" cy="0"/>
-        </a:xfrm>
-      </p:grpSpPr>
-      <p:sp>
-        <p:nvSpPr>
-          <p:cNvPr id="81" name="Google Shape;81;ged2377cda1_0_0:notes"/>
-          <p:cNvSpPr>
-            <a:spLocks noGrp="1" noRot="1" noChangeAspect="1"/>
-          </p:cNvSpPr>
-          <p:nvPr>
-            <p:ph type="sldImg" idx="2"/>
-          </p:nvPr>
-        </p:nvSpPr>
-        <p:spPr>
-          <a:xfrm>
-            <a:off x="381000" y="685800"/>
-            <a:ext cx="6096000" cy="3429000"/>
-          </a:xfrm>
-          <a:custGeom>
-            <a:avLst/>
-            <a:gdLst/>
-            <a:ahLst/>
-            <a:cxnLst/>
-            <a:rect l="l" t="t" r="r" b="b"/>
-            <a:pathLst>
-              <a:path w="120000" h="120000" extrusionOk="0">
-                <a:moveTo>
-                  <a:pt x="0" y="0"/>
-                </a:moveTo>
-                <a:lnTo>
-                  <a:pt x="120000" y="0"/>
-                </a:lnTo>
-                <a:lnTo>
-                  <a:pt x="120000" y="120000"/>
-                </a:lnTo>
-                <a:lnTo>
-                  <a:pt x="0" y="120000"/>
-                </a:lnTo>
-                <a:close/>
-              </a:path>
-            </a:pathLst>
-          </a:custGeom>
-        </p:spPr>
-      </p:sp>
-      <p:sp>
-        <p:nvSpPr>
-          <p:cNvPr id="82" name="Google Shape;82;ged2377cda1_0_0:notes"/>
-          <p:cNvSpPr txBox="1">
-            <a:spLocks noGrp="1"/>
-          </p:cNvSpPr>
-          <p:nvPr>
-            <p:ph type="body" idx="1"/>
-          </p:nvPr>
-        </p:nvSpPr>
-        <p:spPr>
-          <a:xfrm>
-            <a:off x="685800" y="4343400"/>
-            <a:ext cx="5486400" cy="4114800"/>
-          </a:xfrm>
-          <a:prstGeom prst="rect">
-            <a:avLst/>
-          </a:prstGeom>
-        </p:spPr>
-        <p:txBody>
-          <a:bodyPr spcFirstLastPara="1" wrap="square" lIns="91425" tIns="91425" rIns="91425" bIns="91425" anchor="t" anchorCtr="0">
-            <a:noAutofit/>
-          </a:bodyPr>
-          <a:lstStyle/>
-          <a:p>
-            <a:pPr marL="0" lvl="0" indent="0" algn="l" rtl="0">
-              <a:spcBef>
-                <a:spcPts val="0"/>
-              </a:spcBef>
-              <a:spcAft>
-                <a:spcPts val="0"/>
-              </a:spcAft>
-              <a:buNone/>
-            </a:pPr>
-            <a:endParaRPr/>
-          </a:p>
-        </p:txBody>
-      </p:sp>
-    </p:spTree>
-  </p:cSld>
-  <p:clrMapOvr>
-    <a:masterClrMapping/>
-  </p:clrMapOvr>
-</p:notes>
-</file>
-
-<file path=ppt/notesSlides/notesSlide2.xml><?xml version="1.0" encoding="utf-8"?>
-<p:notes xmlns:a="http://schemas.openxmlformats.org/drawingml/2006/main" xmlns:r="http://schemas.openxmlformats.org/officeDocument/2006/relationships" xmlns:p="http://schemas.openxmlformats.org/presentationml/2006/main" showMasterSp="0" showMasterPhAnim="0">
-  <p:cSld>
-    <p:spTree>
-      <p:nvGrpSpPr>
-        <p:cNvPr id="1" name="Shape 80"/>
-        <p:cNvGrpSpPr/>
-        <p:nvPr/>
-      </p:nvGrpSpPr>
-      <p:grpSpPr>
-        <a:xfrm>
-          <a:off x="0" y="0"/>
-          <a:ext cx="0" cy="0"/>
-          <a:chOff x="0" y="0"/>
-          <a:chExt cx="0" cy="0"/>
-        </a:xfrm>
-      </p:grpSpPr>
-      <p:sp>
-        <p:nvSpPr>
-          <p:cNvPr id="81" name="Google Shape;81;ged2377cda1_0_0:notes"/>
-          <p:cNvSpPr>
-            <a:spLocks noGrp="1" noRot="1" noChangeAspect="1"/>
-          </p:cNvSpPr>
-          <p:nvPr>
-            <p:ph type="sldImg" idx="2"/>
-          </p:nvPr>
-        </p:nvSpPr>
-        <p:spPr>
-          <a:xfrm>
-            <a:off x="381000" y="685800"/>
-            <a:ext cx="6096000" cy="3429000"/>
-          </a:xfrm>
-          <a:custGeom>
-            <a:avLst/>
-            <a:gdLst/>
-            <a:ahLst/>
-            <a:cxnLst/>
-            <a:rect l="l" t="t" r="r" b="b"/>
-            <a:pathLst>
-              <a:path w="120000" h="120000" extrusionOk="0">
-                <a:moveTo>
-                  <a:pt x="0" y="0"/>
-                </a:moveTo>
-                <a:lnTo>
-                  <a:pt x="120000" y="0"/>
-                </a:lnTo>
-                <a:lnTo>
-                  <a:pt x="120000" y="120000"/>
-                </a:lnTo>
-                <a:lnTo>
-                  <a:pt x="0" y="120000"/>
-                </a:lnTo>
-                <a:close/>
-              </a:path>
-            </a:pathLst>
-          </a:custGeom>
-        </p:spPr>
-      </p:sp>
-      <p:sp>
-        <p:nvSpPr>
-          <p:cNvPr id="82" name="Google Shape;82;ged2377cda1_0_0:notes"/>
-          <p:cNvSpPr txBox="1">
-            <a:spLocks noGrp="1"/>
-          </p:cNvSpPr>
-          <p:nvPr>
-            <p:ph type="body" idx="1"/>
-          </p:nvPr>
-        </p:nvSpPr>
-        <p:spPr>
-          <a:xfrm>
-            <a:off x="685800" y="4343400"/>
-            <a:ext cx="5486400" cy="4114800"/>
-          </a:xfrm>
-          <a:prstGeom prst="rect">
-            <a:avLst/>
-          </a:prstGeom>
-        </p:spPr>
-        <p:txBody>
-          <a:bodyPr spcFirstLastPara="1" wrap="square" lIns="91425" tIns="91425" rIns="91425" bIns="91425" anchor="t" anchorCtr="0">
-            <a:noAutofit/>
-          </a:bodyPr>
-          <a:lstStyle/>
-          <a:p>
-            <a:pPr marL="0" lvl="0" indent="0" algn="l" rtl="0">
-              <a:spcBef>
-                <a:spcPts val="0"/>
-              </a:spcBef>
-              <a:spcAft>
-                <a:spcPts val="0"/>
-              </a:spcAft>
-              <a:buNone/>
-            </a:pPr>
-            <a:endParaRPr/>
-          </a:p>
-        </p:txBody>
-      </p:sp>
-    </p:spTree>
-    <p:extLst>
-      <p:ext uri="{BB962C8B-B14F-4D97-AF65-F5344CB8AC3E}">
-        <p14:creationId xmlns:p14="http://schemas.microsoft.com/office/powerpoint/2010/main" val="2025694093"/>
-      </p:ext>
-    </p:extLst>
-  </p:cSld>
-  <p:clrMapOvr>
-    <a:masterClrMapping/>
-  </p:clrMapOvr>
-</p:notes>
-</file>
-
-<file path=ppt/notesSlides/notesSlide3.xml><?xml version="1.0" encoding="utf-8"?>
 <p:notes xmlns:a="http://schemas.openxmlformats.org/drawingml/2006/main" xmlns:r="http://schemas.openxmlformats.org/officeDocument/2006/relationships" xmlns:p="http://schemas.openxmlformats.org/presentationml/2006/main" showMasterSp="0" showMasterPhAnim="0">
   <p:cSld>
     <p:spTree>
@@ -5430,1132 +5681,6 @@
           <a:chExt cx="0" cy="0"/>
         </a:xfrm>
       </p:grpSpPr>
-      <p:sp>
-        <p:nvSpPr>
-          <p:cNvPr id="84" name="Google Shape;84;p16"/>
-          <p:cNvSpPr/>
-          <p:nvPr/>
-        </p:nvSpPr>
-        <p:spPr>
-          <a:xfrm>
-            <a:off x="282800" y="895125"/>
-            <a:ext cx="2296200" cy="2895600"/>
-          </a:xfrm>
-          <a:prstGeom prst="roundRect">
-            <a:avLst>
-              <a:gd name="adj" fmla="val 16667"/>
-            </a:avLst>
-          </a:prstGeom>
-          <a:noFill/>
-          <a:ln w="76200" cap="flat" cmpd="sng">
-            <a:solidFill>
-              <a:srgbClr val="E69138"/>
-            </a:solidFill>
-            <a:prstDash val="solid"/>
-            <a:round/>
-            <a:headEnd type="none" w="sm" len="sm"/>
-            <a:tailEnd type="none" w="sm" len="sm"/>
-          </a:ln>
-        </p:spPr>
-        <p:txBody>
-          <a:bodyPr spcFirstLastPara="1" wrap="square" lIns="91425" tIns="91425" rIns="91425" bIns="91425" anchor="ctr" anchorCtr="0">
-            <a:noAutofit/>
-          </a:bodyPr>
-          <a:lstStyle/>
-          <a:p>
-            <a:pPr marL="0" lvl="0" indent="0" algn="l" rtl="0">
-              <a:spcBef>
-                <a:spcPts val="0"/>
-              </a:spcBef>
-              <a:spcAft>
-                <a:spcPts val="0"/>
-              </a:spcAft>
-              <a:buNone/>
-            </a:pPr>
-            <a:endParaRPr/>
-          </a:p>
-        </p:txBody>
-      </p:sp>
-      <p:sp>
-        <p:nvSpPr>
-          <p:cNvPr id="85" name="Google Shape;85;p16"/>
-          <p:cNvSpPr txBox="1"/>
-          <p:nvPr/>
-        </p:nvSpPr>
-        <p:spPr>
-          <a:xfrm>
-            <a:off x="329150" y="923250"/>
-            <a:ext cx="2203500" cy="615600"/>
-          </a:xfrm>
-          <a:prstGeom prst="rect">
-            <a:avLst/>
-          </a:prstGeom>
-          <a:noFill/>
-          <a:ln>
-            <a:noFill/>
-          </a:ln>
-        </p:spPr>
-        <p:txBody>
-          <a:bodyPr spcFirstLastPara="1" wrap="square" lIns="91425" tIns="91425" rIns="91425" bIns="91425" anchor="t" anchorCtr="0">
-            <a:spAutoFit/>
-          </a:bodyPr>
-          <a:lstStyle/>
-          <a:p>
-            <a:pPr marL="0" lvl="0" indent="0" algn="ctr" rtl="0">
-              <a:spcBef>
-                <a:spcPts val="0"/>
-              </a:spcBef>
-              <a:spcAft>
-                <a:spcPts val="0"/>
-              </a:spcAft>
-              <a:buNone/>
-            </a:pPr>
-            <a:r>
-              <a:rPr lang="en"/>
-              <a:t>Defense Mechanism Genes</a:t>
-            </a:r>
-            <a:endParaRPr/>
-          </a:p>
-        </p:txBody>
-      </p:sp>
-      <p:sp>
-        <p:nvSpPr>
-          <p:cNvPr id="86" name="Google Shape;86;p16"/>
-          <p:cNvSpPr txBox="1"/>
-          <p:nvPr/>
-        </p:nvSpPr>
-        <p:spPr>
-          <a:xfrm>
-            <a:off x="293550" y="2142813"/>
-            <a:ext cx="718200" cy="400200"/>
-          </a:xfrm>
-          <a:prstGeom prst="rect">
-            <a:avLst/>
-          </a:prstGeom>
-          <a:noFill/>
-          <a:ln>
-            <a:noFill/>
-          </a:ln>
-        </p:spPr>
-        <p:txBody>
-          <a:bodyPr spcFirstLastPara="1" wrap="square" lIns="91425" tIns="91425" rIns="91425" bIns="91425" anchor="t" anchorCtr="0">
-            <a:spAutoFit/>
-          </a:bodyPr>
-          <a:lstStyle/>
-          <a:p>
-            <a:pPr marL="0" lvl="0" indent="0" algn="l" rtl="0">
-              <a:spcBef>
-                <a:spcPts val="0"/>
-              </a:spcBef>
-              <a:spcAft>
-                <a:spcPts val="0"/>
-              </a:spcAft>
-              <a:buNone/>
-            </a:pPr>
-            <a:r>
-              <a:rPr lang="en"/>
-              <a:t>Biofilm</a:t>
-            </a:r>
-            <a:endParaRPr/>
-          </a:p>
-        </p:txBody>
-      </p:sp>
-      <p:sp>
-        <p:nvSpPr>
-          <p:cNvPr id="87" name="Google Shape;87;p16"/>
-          <p:cNvSpPr txBox="1"/>
-          <p:nvPr/>
-        </p:nvSpPr>
-        <p:spPr>
-          <a:xfrm>
-            <a:off x="1437025" y="2142813"/>
-            <a:ext cx="1221600" cy="400200"/>
-          </a:xfrm>
-          <a:prstGeom prst="rect">
-            <a:avLst/>
-          </a:prstGeom>
-          <a:noFill/>
-          <a:ln>
-            <a:noFill/>
-          </a:ln>
-        </p:spPr>
-        <p:txBody>
-          <a:bodyPr spcFirstLastPara="1" wrap="square" lIns="91425" tIns="91425" rIns="91425" bIns="91425" anchor="t" anchorCtr="0">
-            <a:spAutoFit/>
-          </a:bodyPr>
-          <a:lstStyle/>
-          <a:p>
-            <a:pPr marL="0" lvl="0" indent="0" algn="l" rtl="0">
-              <a:spcBef>
-                <a:spcPts val="0"/>
-              </a:spcBef>
-              <a:spcAft>
-                <a:spcPts val="0"/>
-              </a:spcAft>
-              <a:buNone/>
-            </a:pPr>
-            <a:r>
-              <a:rPr lang="en" dirty="0"/>
-              <a:t>Transposon</a:t>
-            </a:r>
-            <a:endParaRPr dirty="0"/>
-          </a:p>
-        </p:txBody>
-      </p:sp>
-      <p:cxnSp>
-        <p:nvCxnSpPr>
-          <p:cNvPr id="88" name="Google Shape;88;p16"/>
-          <p:cNvCxnSpPr/>
-          <p:nvPr/>
-        </p:nvCxnSpPr>
-        <p:spPr>
-          <a:xfrm rot="10800000">
-            <a:off x="1813400" y="1338788"/>
-            <a:ext cx="321600" cy="811200"/>
-          </a:xfrm>
-          <a:prstGeom prst="straightConnector1">
-            <a:avLst/>
-          </a:prstGeom>
-          <a:noFill/>
-          <a:ln w="9525" cap="flat" cmpd="sng">
-            <a:solidFill>
-              <a:schemeClr val="dk2"/>
-            </a:solidFill>
-            <a:prstDash val="solid"/>
-            <a:round/>
-            <a:headEnd type="none" w="med" len="med"/>
-            <a:tailEnd type="triangle" w="med" len="med"/>
-          </a:ln>
-        </p:spPr>
-      </p:cxnSp>
-      <p:cxnSp>
-        <p:nvCxnSpPr>
-          <p:cNvPr id="89" name="Google Shape;89;p16"/>
-          <p:cNvCxnSpPr/>
-          <p:nvPr/>
-        </p:nvCxnSpPr>
-        <p:spPr>
-          <a:xfrm flipH="1">
-            <a:off x="743350" y="1361900"/>
-            <a:ext cx="308400" cy="765000"/>
-          </a:xfrm>
-          <a:prstGeom prst="straightConnector1">
-            <a:avLst/>
-          </a:prstGeom>
-          <a:noFill/>
-          <a:ln w="9525" cap="flat" cmpd="sng">
-            <a:solidFill>
-              <a:schemeClr val="dk2"/>
-            </a:solidFill>
-            <a:prstDash val="solid"/>
-            <a:round/>
-            <a:headEnd type="none" w="med" len="med"/>
-            <a:tailEnd type="triangle" w="med" len="med"/>
-          </a:ln>
-        </p:spPr>
-      </p:cxnSp>
-      <p:cxnSp>
-        <p:nvCxnSpPr>
-          <p:cNvPr id="90" name="Google Shape;90;p16"/>
-          <p:cNvCxnSpPr>
-            <a:stCxn id="86" idx="3"/>
-            <a:endCxn id="87" idx="1"/>
-          </p:cNvCxnSpPr>
-          <p:nvPr/>
-        </p:nvCxnSpPr>
-        <p:spPr>
-          <a:xfrm>
-            <a:off x="1011750" y="2342913"/>
-            <a:ext cx="425400" cy="0"/>
-          </a:xfrm>
-          <a:prstGeom prst="straightConnector1">
-            <a:avLst/>
-          </a:prstGeom>
-          <a:noFill/>
-          <a:ln w="9525" cap="flat" cmpd="sng">
-            <a:solidFill>
-              <a:schemeClr val="dk2"/>
-            </a:solidFill>
-            <a:prstDash val="solid"/>
-            <a:round/>
-            <a:headEnd type="none" w="med" len="med"/>
-            <a:tailEnd type="triangle" w="med" len="med"/>
-          </a:ln>
-        </p:spPr>
-      </p:cxnSp>
-      <p:sp>
-        <p:nvSpPr>
-          <p:cNvPr id="91" name="Google Shape;91;p16"/>
-          <p:cNvSpPr txBox="1"/>
-          <p:nvPr/>
-        </p:nvSpPr>
-        <p:spPr>
-          <a:xfrm>
-            <a:off x="698219" y="3014342"/>
-            <a:ext cx="1465361" cy="776383"/>
-          </a:xfrm>
-          <a:prstGeom prst="roundRect">
-            <a:avLst/>
-          </a:prstGeom>
-          <a:noFill/>
-          <a:ln>
-            <a:solidFill>
-              <a:schemeClr val="accent4">
-                <a:lumMod val="75000"/>
-              </a:schemeClr>
-            </a:solidFill>
-          </a:ln>
-        </p:spPr>
-        <p:style>
-          <a:lnRef idx="2">
-            <a:schemeClr val="accent4"/>
-          </a:lnRef>
-          <a:fillRef idx="1">
-            <a:schemeClr val="lt1"/>
-          </a:fillRef>
-          <a:effectRef idx="0">
-            <a:schemeClr val="accent4"/>
-          </a:effectRef>
-          <a:fontRef idx="minor">
-            <a:schemeClr val="dk1"/>
-          </a:fontRef>
-        </p:style>
-        <p:txBody>
-          <a:bodyPr spcFirstLastPara="1" wrap="square" lIns="27432" tIns="27432" rIns="27432" bIns="27432" anchor="t" anchorCtr="0">
-            <a:spAutoFit/>
-          </a:bodyPr>
-          <a:lstStyle/>
-          <a:p>
-            <a:pPr marL="0" lvl="0" indent="0" algn="ctr" rtl="0">
-              <a:spcBef>
-                <a:spcPts val="0"/>
-              </a:spcBef>
-              <a:spcAft>
-                <a:spcPts val="0"/>
-              </a:spcAft>
-              <a:buClr>
-                <a:schemeClr val="dk1"/>
-              </a:buClr>
-              <a:buSzPts val="1100"/>
-              <a:buFont typeface="Arial"/>
-              <a:buNone/>
-            </a:pPr>
-            <a:r>
-              <a:rPr lang="en" dirty="0"/>
-              <a:t>A d</a:t>
-            </a:r>
-            <a:r>
-              <a:rPr lang="en" dirty="0">
-                <a:solidFill>
-                  <a:schemeClr val="dk1"/>
-                </a:solidFill>
-              </a:rPr>
-              <a:t>eep ocean</a:t>
-            </a:r>
-            <a:endParaRPr dirty="0"/>
-          </a:p>
-          <a:p>
-            <a:pPr marL="0" lvl="0" indent="0" algn="ctr" rtl="0">
-              <a:spcBef>
-                <a:spcPts val="0"/>
-              </a:spcBef>
-              <a:spcAft>
-                <a:spcPts val="0"/>
-              </a:spcAft>
-              <a:buNone/>
-            </a:pPr>
-            <a:r>
-              <a:rPr lang="en" dirty="0"/>
-              <a:t>particle-attached</a:t>
-            </a:r>
-            <a:endParaRPr dirty="0"/>
-          </a:p>
-          <a:p>
-            <a:pPr marL="0" lvl="0" indent="0" algn="ctr" rtl="0">
-              <a:spcBef>
-                <a:spcPts val="0"/>
-              </a:spcBef>
-              <a:spcAft>
-                <a:spcPts val="0"/>
-              </a:spcAft>
-              <a:buNone/>
-            </a:pPr>
-            <a:r>
-              <a:rPr lang="en" dirty="0"/>
-              <a:t>microbe</a:t>
-            </a:r>
-            <a:endParaRPr dirty="0"/>
-          </a:p>
-        </p:txBody>
-      </p:sp>
-      <p:sp>
-        <p:nvSpPr>
-          <p:cNvPr id="92" name="Google Shape;92;p16"/>
-          <p:cNvSpPr txBox="1"/>
-          <p:nvPr/>
-        </p:nvSpPr>
-        <p:spPr>
-          <a:xfrm>
-            <a:off x="743350" y="2342913"/>
-            <a:ext cx="1123500" cy="523200"/>
-          </a:xfrm>
-          <a:prstGeom prst="rect">
-            <a:avLst/>
-          </a:prstGeom>
-          <a:noFill/>
-          <a:ln>
-            <a:noFill/>
-          </a:ln>
-        </p:spPr>
-        <p:txBody>
-          <a:bodyPr spcFirstLastPara="1" wrap="square" lIns="91425" tIns="91425" rIns="91425" bIns="91425" anchor="t" anchorCtr="0">
-            <a:spAutoFit/>
-          </a:bodyPr>
-          <a:lstStyle/>
-          <a:p>
-            <a:pPr marL="0" lvl="0" indent="0" algn="l" rtl="0">
-              <a:spcBef>
-                <a:spcPts val="0"/>
-              </a:spcBef>
-              <a:spcAft>
-                <a:spcPts val="0"/>
-              </a:spcAft>
-              <a:buNone/>
-            </a:pPr>
-            <a:r>
-              <a:rPr lang="en" sz="1100" b="1">
-                <a:solidFill>
-                  <a:srgbClr val="B45F06"/>
-                </a:solidFill>
-              </a:rPr>
-              <a:t>facilitate the spread of</a:t>
-            </a:r>
-            <a:endParaRPr sz="1100" b="1">
-              <a:solidFill>
-                <a:srgbClr val="B45F06"/>
-              </a:solidFill>
-            </a:endParaRPr>
-          </a:p>
-        </p:txBody>
-      </p:sp>
-      <p:sp>
-        <p:nvSpPr>
-          <p:cNvPr id="93" name="Google Shape;93;p16"/>
-          <p:cNvSpPr txBox="1"/>
-          <p:nvPr/>
-        </p:nvSpPr>
-        <p:spPr>
-          <a:xfrm>
-            <a:off x="1907150" y="1526600"/>
-            <a:ext cx="718200" cy="354000"/>
-          </a:xfrm>
-          <a:prstGeom prst="rect">
-            <a:avLst/>
-          </a:prstGeom>
-          <a:noFill/>
-          <a:ln>
-            <a:noFill/>
-          </a:ln>
-        </p:spPr>
-        <p:txBody>
-          <a:bodyPr spcFirstLastPara="1" wrap="square" lIns="91425" tIns="91425" rIns="91425" bIns="91425" anchor="t" anchorCtr="0">
-            <a:spAutoFit/>
-          </a:bodyPr>
-          <a:lstStyle/>
-          <a:p>
-            <a:pPr marL="0" lvl="0" indent="0" algn="l" rtl="0">
-              <a:spcBef>
-                <a:spcPts val="0"/>
-              </a:spcBef>
-              <a:spcAft>
-                <a:spcPts val="0"/>
-              </a:spcAft>
-              <a:buNone/>
-            </a:pPr>
-            <a:r>
-              <a:rPr lang="en" sz="1100" b="1">
-                <a:solidFill>
-                  <a:srgbClr val="B45F06"/>
-                </a:solidFill>
-              </a:rPr>
-              <a:t>carries</a:t>
-            </a:r>
-            <a:endParaRPr sz="1100" b="1">
-              <a:solidFill>
-                <a:srgbClr val="B45F06"/>
-              </a:solidFill>
-            </a:endParaRPr>
-          </a:p>
-        </p:txBody>
-      </p:sp>
-      <p:sp>
-        <p:nvSpPr>
-          <p:cNvPr id="94" name="Google Shape;94;p16"/>
-          <p:cNvSpPr txBox="1"/>
-          <p:nvPr/>
-        </p:nvSpPr>
-        <p:spPr>
-          <a:xfrm>
-            <a:off x="286750" y="1482800"/>
-            <a:ext cx="1221600" cy="523200"/>
-          </a:xfrm>
-          <a:prstGeom prst="rect">
-            <a:avLst/>
-          </a:prstGeom>
-          <a:noFill/>
-          <a:ln>
-            <a:noFill/>
-          </a:ln>
-        </p:spPr>
-        <p:txBody>
-          <a:bodyPr spcFirstLastPara="1" wrap="square" lIns="91425" tIns="91425" rIns="91425" bIns="91425" anchor="t" anchorCtr="0">
-            <a:spAutoFit/>
-          </a:bodyPr>
-          <a:lstStyle/>
-          <a:p>
-            <a:pPr marL="0" lvl="0" indent="0" algn="ctr" rtl="0">
-              <a:spcBef>
-                <a:spcPts val="0"/>
-              </a:spcBef>
-              <a:spcAft>
-                <a:spcPts val="0"/>
-              </a:spcAft>
-              <a:buNone/>
-            </a:pPr>
-            <a:r>
-              <a:rPr lang="en" sz="1100" b="1">
-                <a:solidFill>
-                  <a:srgbClr val="B45F06"/>
-                </a:solidFill>
-              </a:rPr>
-              <a:t>helps competition on</a:t>
-            </a:r>
-            <a:endParaRPr sz="1100" b="1">
-              <a:solidFill>
-                <a:srgbClr val="B45F06"/>
-              </a:solidFill>
-            </a:endParaRPr>
-          </a:p>
-        </p:txBody>
-      </p:sp>
-    </p:spTree>
-  </p:cSld>
-  <p:clrMapOvr>
-    <a:masterClrMapping/>
-  </p:clrMapOvr>
-</p:sld>
-</file>
-
-<file path=ppt/slides/slide2.xml><?xml version="1.0" encoding="utf-8"?>
-<p:sld xmlns:a="http://schemas.openxmlformats.org/drawingml/2006/main" xmlns:r="http://schemas.openxmlformats.org/officeDocument/2006/relationships" xmlns:p="http://schemas.openxmlformats.org/presentationml/2006/main">
-  <p:cSld>
-    <p:spTree>
-      <p:nvGrpSpPr>
-        <p:cNvPr id="1" name="Shape 83"/>
-        <p:cNvGrpSpPr/>
-        <p:nvPr/>
-      </p:nvGrpSpPr>
-      <p:grpSpPr>
-        <a:xfrm>
-          <a:off x="0" y="0"/>
-          <a:ext cx="0" cy="0"/>
-          <a:chOff x="0" y="0"/>
-          <a:chExt cx="0" cy="0"/>
-        </a:xfrm>
-      </p:grpSpPr>
-      <p:sp>
-        <p:nvSpPr>
-          <p:cNvPr id="84" name="Google Shape;84;p16"/>
-          <p:cNvSpPr/>
-          <p:nvPr/>
-        </p:nvSpPr>
-        <p:spPr>
-          <a:xfrm>
-            <a:off x="270790" y="1108797"/>
-            <a:ext cx="2616409" cy="2534658"/>
-          </a:xfrm>
-          <a:prstGeom prst="roundRect">
-            <a:avLst>
-              <a:gd name="adj" fmla="val 16667"/>
-            </a:avLst>
-          </a:prstGeom>
-          <a:noFill/>
-          <a:ln w="76200" cap="flat" cmpd="sng">
-            <a:solidFill>
-              <a:srgbClr val="E69138"/>
-            </a:solidFill>
-            <a:prstDash val="solid"/>
-            <a:round/>
-            <a:headEnd type="none" w="sm" len="sm"/>
-            <a:tailEnd type="none" w="sm" len="sm"/>
-          </a:ln>
-        </p:spPr>
-        <p:txBody>
-          <a:bodyPr spcFirstLastPara="1" wrap="square" lIns="91425" tIns="91425" rIns="91425" bIns="91425" anchor="ctr" anchorCtr="0">
-            <a:noAutofit/>
-          </a:bodyPr>
-          <a:lstStyle/>
-          <a:p>
-            <a:pPr marL="0" lvl="0" indent="0" algn="l" rtl="0">
-              <a:spcBef>
-                <a:spcPts val="0"/>
-              </a:spcBef>
-              <a:spcAft>
-                <a:spcPts val="0"/>
-              </a:spcAft>
-              <a:buNone/>
-            </a:pPr>
-            <a:endParaRPr/>
-          </a:p>
-        </p:txBody>
-      </p:sp>
-      <p:sp>
-        <p:nvSpPr>
-          <p:cNvPr id="86" name="Google Shape;86;p16"/>
-          <p:cNvSpPr txBox="1"/>
-          <p:nvPr/>
-        </p:nvSpPr>
-        <p:spPr>
-          <a:xfrm>
-            <a:off x="293550" y="2398474"/>
-            <a:ext cx="866656" cy="400079"/>
-          </a:xfrm>
-          <a:prstGeom prst="rect">
-            <a:avLst/>
-          </a:prstGeom>
-          <a:noFill/>
-          <a:ln>
-            <a:noFill/>
-          </a:ln>
-        </p:spPr>
-        <p:txBody>
-          <a:bodyPr spcFirstLastPara="1" wrap="square" lIns="91425" tIns="91425" rIns="91425" bIns="91425" anchor="t" anchorCtr="0">
-            <a:spAutoFit/>
-          </a:bodyPr>
-          <a:lstStyle/>
-          <a:p>
-            <a:pPr marL="0" lvl="0" indent="0" algn="l" rtl="0">
-              <a:spcBef>
-                <a:spcPts val="0"/>
-              </a:spcBef>
-              <a:spcAft>
-                <a:spcPts val="0"/>
-              </a:spcAft>
-              <a:buNone/>
-            </a:pPr>
-            <a:r>
-              <a:rPr lang="en" b="1" dirty="0">
-                <a:solidFill>
-                  <a:srgbClr val="00B050"/>
-                </a:solidFill>
-              </a:rPr>
-              <a:t>Biofilm</a:t>
-            </a:r>
-            <a:endParaRPr b="1" dirty="0">
-              <a:solidFill>
-                <a:srgbClr val="00B050"/>
-              </a:solidFill>
-            </a:endParaRPr>
-          </a:p>
-        </p:txBody>
-      </p:sp>
-      <p:sp>
-        <p:nvSpPr>
-          <p:cNvPr id="87" name="Google Shape;87;p16"/>
-          <p:cNvSpPr txBox="1"/>
-          <p:nvPr/>
-        </p:nvSpPr>
-        <p:spPr>
-          <a:xfrm>
-            <a:off x="1590108" y="2398474"/>
-            <a:ext cx="1255100" cy="615523"/>
-          </a:xfrm>
-          <a:prstGeom prst="rect">
-            <a:avLst/>
-          </a:prstGeom>
-          <a:noFill/>
-          <a:ln>
-            <a:noFill/>
-          </a:ln>
-        </p:spPr>
-        <p:txBody>
-          <a:bodyPr spcFirstLastPara="1" wrap="square" lIns="91425" tIns="91425" rIns="91425" bIns="91425" anchor="t" anchorCtr="0">
-            <a:spAutoFit/>
-          </a:bodyPr>
-          <a:lstStyle/>
-          <a:p>
-            <a:pPr marL="0" lvl="0" indent="0" algn="r" rtl="0">
-              <a:spcBef>
-                <a:spcPts val="0"/>
-              </a:spcBef>
-              <a:spcAft>
-                <a:spcPts val="0"/>
-              </a:spcAft>
-              <a:buNone/>
-            </a:pPr>
-            <a:r>
-              <a:rPr lang="en" b="1" dirty="0">
-                <a:solidFill>
-                  <a:srgbClr val="FF0000"/>
-                </a:solidFill>
-              </a:rPr>
-              <a:t>Defense</a:t>
-            </a:r>
-          </a:p>
-          <a:p>
-            <a:pPr marL="0" lvl="0" indent="0" algn="r" rtl="0">
-              <a:spcBef>
-                <a:spcPts val="0"/>
-              </a:spcBef>
-              <a:spcAft>
-                <a:spcPts val="0"/>
-              </a:spcAft>
-              <a:buNone/>
-            </a:pPr>
-            <a:r>
-              <a:rPr lang="en" dirty="0">
-                <a:solidFill>
-                  <a:srgbClr val="FF0000"/>
-                </a:solidFill>
-              </a:rPr>
-              <a:t>mechanisms</a:t>
-            </a:r>
-            <a:endParaRPr dirty="0">
-              <a:solidFill>
-                <a:srgbClr val="FF0000"/>
-              </a:solidFill>
-            </a:endParaRPr>
-          </a:p>
-        </p:txBody>
-      </p:sp>
-      <p:cxnSp>
-        <p:nvCxnSpPr>
-          <p:cNvPr id="88" name="Google Shape;88;p16"/>
-          <p:cNvCxnSpPr>
-            <a:cxnSpLocks/>
-          </p:cNvCxnSpPr>
-          <p:nvPr/>
-        </p:nvCxnSpPr>
-        <p:spPr>
-          <a:xfrm>
-            <a:off x="1835357" y="1542993"/>
-            <a:ext cx="524999" cy="855481"/>
-          </a:xfrm>
-          <a:prstGeom prst="straightConnector1">
-            <a:avLst/>
-          </a:prstGeom>
-          <a:noFill/>
-          <a:ln w="28575" cap="flat" cmpd="sng">
-            <a:solidFill>
-              <a:schemeClr val="dk2"/>
-            </a:solidFill>
-            <a:prstDash val="solid"/>
-            <a:round/>
-            <a:headEnd type="none" w="med" len="med"/>
-            <a:tailEnd type="triangle" w="med" len="med"/>
-          </a:ln>
-        </p:spPr>
-      </p:cxnSp>
-      <p:cxnSp>
-        <p:nvCxnSpPr>
-          <p:cNvPr id="89" name="Google Shape;89;p16"/>
-          <p:cNvCxnSpPr>
-            <a:cxnSpLocks/>
-          </p:cNvCxnSpPr>
-          <p:nvPr/>
-        </p:nvCxnSpPr>
-        <p:spPr>
-          <a:xfrm flipV="1">
-            <a:off x="741467" y="1533759"/>
-            <a:ext cx="639413" cy="842966"/>
-          </a:xfrm>
-          <a:prstGeom prst="straightConnector1">
-            <a:avLst/>
-          </a:prstGeom>
-          <a:noFill/>
-          <a:ln w="28575" cap="flat" cmpd="sng">
-            <a:solidFill>
-              <a:schemeClr val="dk2"/>
-            </a:solidFill>
-            <a:prstDash val="solid"/>
-            <a:round/>
-            <a:headEnd type="none" w="med" len="med"/>
-            <a:tailEnd type="triangle" w="med" len="med"/>
-          </a:ln>
-        </p:spPr>
-      </p:cxnSp>
-      <p:cxnSp>
-        <p:nvCxnSpPr>
-          <p:cNvPr id="90" name="Google Shape;90;p16"/>
-          <p:cNvCxnSpPr>
-            <a:cxnSpLocks/>
-          </p:cNvCxnSpPr>
-          <p:nvPr/>
-        </p:nvCxnSpPr>
-        <p:spPr>
-          <a:xfrm flipH="1">
-            <a:off x="1060308" y="2605616"/>
-            <a:ext cx="908193" cy="0"/>
-          </a:xfrm>
-          <a:prstGeom prst="straightConnector1">
-            <a:avLst/>
-          </a:prstGeom>
-          <a:noFill/>
-          <a:ln w="28575" cap="flat" cmpd="sng">
-            <a:solidFill>
-              <a:schemeClr val="dk2"/>
-            </a:solidFill>
-            <a:prstDash val="solid"/>
-            <a:round/>
-            <a:headEnd type="none" w="med" len="med"/>
-            <a:tailEnd type="triangle" w="med" len="med"/>
-          </a:ln>
-        </p:spPr>
-      </p:cxnSp>
-      <p:sp>
-        <p:nvSpPr>
-          <p:cNvPr id="91" name="Google Shape;91;p16"/>
-          <p:cNvSpPr txBox="1"/>
-          <p:nvPr/>
-        </p:nvSpPr>
-        <p:spPr>
-          <a:xfrm>
-            <a:off x="609838" y="3042626"/>
-            <a:ext cx="1966752" cy="538020"/>
-          </a:xfrm>
-          <a:prstGeom prst="roundRect">
-            <a:avLst/>
-          </a:prstGeom>
-          <a:noFill/>
-          <a:ln>
-            <a:noFill/>
-          </a:ln>
-        </p:spPr>
-        <p:style>
-          <a:lnRef idx="2">
-            <a:schemeClr val="accent4"/>
-          </a:lnRef>
-          <a:fillRef idx="1">
-            <a:schemeClr val="lt1"/>
-          </a:fillRef>
-          <a:effectRef idx="0">
-            <a:schemeClr val="accent4"/>
-          </a:effectRef>
-          <a:fontRef idx="minor">
-            <a:schemeClr val="dk1"/>
-          </a:fontRef>
-        </p:style>
-        <p:txBody>
-          <a:bodyPr spcFirstLastPara="1" wrap="square" lIns="27432" tIns="27432" rIns="27432" bIns="27432" anchor="t" anchorCtr="0">
-            <a:spAutoFit/>
-          </a:bodyPr>
-          <a:lstStyle/>
-          <a:p>
-            <a:pPr marL="0" lvl="0" indent="0" algn="ctr" rtl="0">
-              <a:spcBef>
-                <a:spcPts val="0"/>
-              </a:spcBef>
-              <a:spcAft>
-                <a:spcPts val="0"/>
-              </a:spcAft>
-              <a:buClr>
-                <a:schemeClr val="dk1"/>
-              </a:buClr>
-              <a:buSzPts val="1100"/>
-              <a:buFont typeface="Arial"/>
-              <a:buNone/>
-            </a:pPr>
-            <a:r>
-              <a:rPr lang="en" dirty="0"/>
-              <a:t>a </a:t>
-            </a:r>
-            <a:r>
-              <a:rPr lang="en-US" dirty="0"/>
-              <a:t>particle-</a:t>
-            </a:r>
-            <a:r>
-              <a:rPr lang="en" dirty="0"/>
-              <a:t>attached,</a:t>
-            </a:r>
-            <a:endParaRPr lang="en-US" dirty="0"/>
-          </a:p>
-          <a:p>
-            <a:pPr marL="0" lvl="0" indent="0" algn="ctr" rtl="0">
-              <a:spcBef>
-                <a:spcPts val="0"/>
-              </a:spcBef>
-              <a:spcAft>
-                <a:spcPts val="0"/>
-              </a:spcAft>
-              <a:buNone/>
-            </a:pPr>
-            <a:r>
-              <a:rPr lang="en" dirty="0"/>
-              <a:t>d</a:t>
-            </a:r>
-            <a:r>
-              <a:rPr lang="en" dirty="0">
-                <a:solidFill>
-                  <a:schemeClr val="dk1"/>
-                </a:solidFill>
-              </a:rPr>
-              <a:t>eep ocean</a:t>
-            </a:r>
-            <a:r>
-              <a:rPr lang="en-US" dirty="0">
-                <a:solidFill>
-                  <a:schemeClr val="dk1"/>
-                </a:solidFill>
-              </a:rPr>
-              <a:t> </a:t>
-            </a:r>
-            <a:r>
-              <a:rPr lang="en-US" dirty="0"/>
-              <a:t>microbe</a:t>
-            </a:r>
-          </a:p>
-        </p:txBody>
-      </p:sp>
-      <p:sp>
-        <p:nvSpPr>
-          <p:cNvPr id="92" name="Google Shape;92;p16"/>
-          <p:cNvSpPr txBox="1"/>
-          <p:nvPr/>
-        </p:nvSpPr>
-        <p:spPr>
-          <a:xfrm>
-            <a:off x="293550" y="1605369"/>
-            <a:ext cx="866656" cy="400079"/>
-          </a:xfrm>
-          <a:prstGeom prst="rect">
-            <a:avLst/>
-          </a:prstGeom>
-          <a:noFill/>
-          <a:ln>
-            <a:noFill/>
-          </a:ln>
-        </p:spPr>
-        <p:txBody>
-          <a:bodyPr spcFirstLastPara="1" wrap="square" lIns="91425" tIns="91425" rIns="91425" bIns="91425" anchor="t" anchorCtr="0">
-            <a:spAutoFit/>
-          </a:bodyPr>
-          <a:lstStyle/>
-          <a:p>
-            <a:pPr marL="0" lvl="0" indent="0" algn="l" rtl="0">
-              <a:spcBef>
-                <a:spcPts val="0"/>
-              </a:spcBef>
-              <a:spcAft>
-                <a:spcPts val="0"/>
-              </a:spcAft>
-              <a:buNone/>
-            </a:pPr>
-            <a:r>
-              <a:rPr lang="en" b="1" dirty="0">
-                <a:solidFill>
-                  <a:srgbClr val="B45F06"/>
-                </a:solidFill>
-              </a:rPr>
-              <a:t>spreads</a:t>
-            </a:r>
-            <a:endParaRPr b="1" dirty="0">
-              <a:solidFill>
-                <a:srgbClr val="B45F06"/>
-              </a:solidFill>
-            </a:endParaRPr>
-          </a:p>
-        </p:txBody>
-      </p:sp>
-      <p:sp>
-        <p:nvSpPr>
-          <p:cNvPr id="93" name="Google Shape;93;p16"/>
-          <p:cNvSpPr txBox="1"/>
-          <p:nvPr/>
-        </p:nvSpPr>
-        <p:spPr>
-          <a:xfrm>
-            <a:off x="2023924" y="1605369"/>
-            <a:ext cx="789917" cy="400079"/>
-          </a:xfrm>
-          <a:prstGeom prst="rect">
-            <a:avLst/>
-          </a:prstGeom>
-          <a:noFill/>
-          <a:ln>
-            <a:noFill/>
-          </a:ln>
-        </p:spPr>
-        <p:txBody>
-          <a:bodyPr spcFirstLastPara="1" wrap="square" lIns="91425" tIns="91425" rIns="91425" bIns="91425" anchor="t" anchorCtr="0">
-            <a:spAutoFit/>
-          </a:bodyPr>
-          <a:lstStyle/>
-          <a:p>
-            <a:pPr marL="0" lvl="0" indent="0" algn="l" rtl="0">
-              <a:spcBef>
-                <a:spcPts val="0"/>
-              </a:spcBef>
-              <a:spcAft>
-                <a:spcPts val="0"/>
-              </a:spcAft>
-              <a:buNone/>
-            </a:pPr>
-            <a:r>
-              <a:rPr lang="en" b="1" dirty="0">
-                <a:solidFill>
-                  <a:srgbClr val="B45F06"/>
-                </a:solidFill>
-              </a:rPr>
-              <a:t>carries</a:t>
-            </a:r>
-            <a:endParaRPr b="1" dirty="0">
-              <a:solidFill>
-                <a:srgbClr val="B45F06"/>
-              </a:solidFill>
-            </a:endParaRPr>
-          </a:p>
-        </p:txBody>
-      </p:sp>
-      <p:sp>
-        <p:nvSpPr>
-          <p:cNvPr id="94" name="Google Shape;94;p16"/>
-          <p:cNvSpPr txBox="1"/>
-          <p:nvPr/>
-        </p:nvSpPr>
-        <p:spPr>
-          <a:xfrm>
-            <a:off x="874155" y="2157049"/>
-            <a:ext cx="1357582" cy="523190"/>
-          </a:xfrm>
-          <a:prstGeom prst="rect">
-            <a:avLst/>
-          </a:prstGeom>
-          <a:noFill/>
-          <a:ln>
-            <a:noFill/>
-          </a:ln>
-        </p:spPr>
-        <p:txBody>
-          <a:bodyPr spcFirstLastPara="1" wrap="square" lIns="91425" tIns="91425" rIns="91425" bIns="91425" anchor="t" anchorCtr="0">
-            <a:spAutoFit/>
-          </a:bodyPr>
-          <a:lstStyle/>
-          <a:p>
-            <a:pPr marL="0" lvl="0" indent="0" algn="ctr" rtl="0">
-              <a:spcBef>
-                <a:spcPts val="0"/>
-              </a:spcBef>
-              <a:spcAft>
-                <a:spcPts val="0"/>
-              </a:spcAft>
-              <a:buNone/>
-            </a:pPr>
-            <a:r>
-              <a:rPr lang="en" sz="1100" b="1" dirty="0">
-                <a:solidFill>
-                  <a:srgbClr val="B45F06"/>
-                </a:solidFill>
-              </a:rPr>
-              <a:t>helps competion, defense on</a:t>
-            </a:r>
-            <a:endParaRPr sz="1100" b="1" dirty="0">
-              <a:solidFill>
-                <a:srgbClr val="B45F06"/>
-              </a:solidFill>
-            </a:endParaRPr>
-          </a:p>
-        </p:txBody>
-      </p:sp>
-      <p:sp>
-        <p:nvSpPr>
-          <p:cNvPr id="22" name="Google Shape;85;p16">
-            <a:extLst>
-              <a:ext uri="{FF2B5EF4-FFF2-40B4-BE49-F238E27FC236}">
-                <a16:creationId xmlns:a16="http://schemas.microsoft.com/office/drawing/2014/main" id="{7B3E143E-5E39-4CA1-91FE-5EB3C5A75D11}"/>
-              </a:ext>
-            </a:extLst>
-          </p:cNvPr>
-          <p:cNvSpPr txBox="1"/>
-          <p:nvPr/>
-        </p:nvSpPr>
-        <p:spPr>
-          <a:xfrm>
-            <a:off x="491464" y="1125573"/>
-            <a:ext cx="2203500" cy="400079"/>
-          </a:xfrm>
-          <a:prstGeom prst="rect">
-            <a:avLst/>
-          </a:prstGeom>
-          <a:noFill/>
-          <a:ln>
-            <a:noFill/>
-          </a:ln>
-        </p:spPr>
-        <p:txBody>
-          <a:bodyPr spcFirstLastPara="1" wrap="square" lIns="91425" tIns="91425" rIns="91425" bIns="91425" anchor="t" anchorCtr="0">
-            <a:spAutoFit/>
-          </a:bodyPr>
-          <a:lstStyle/>
-          <a:p>
-            <a:pPr marL="0" lvl="0" indent="0" algn="ctr" rtl="0">
-              <a:spcBef>
-                <a:spcPts val="0"/>
-              </a:spcBef>
-              <a:spcAft>
-                <a:spcPts val="0"/>
-              </a:spcAft>
-              <a:buNone/>
-            </a:pPr>
-            <a:r>
-              <a:rPr lang="en" b="1" dirty="0">
-                <a:solidFill>
-                  <a:schemeClr val="accent1">
-                    <a:lumMod val="75000"/>
-                  </a:schemeClr>
-                </a:solidFill>
-              </a:rPr>
-              <a:t>Transposon</a:t>
-            </a:r>
-            <a:endParaRPr b="1" dirty="0">
-              <a:solidFill>
-                <a:schemeClr val="accent1">
-                  <a:lumMod val="75000"/>
-                </a:schemeClr>
-              </a:solidFill>
-            </a:endParaRPr>
-          </a:p>
-        </p:txBody>
-      </p:sp>
-    </p:spTree>
-    <p:extLst>
-      <p:ext uri="{BB962C8B-B14F-4D97-AF65-F5344CB8AC3E}">
-        <p14:creationId xmlns:p14="http://schemas.microsoft.com/office/powerpoint/2010/main" val="636080059"/>
-      </p:ext>
-    </p:extLst>
-  </p:cSld>
-  <p:clrMapOvr>
-    <a:masterClrMapping/>
-  </p:clrMapOvr>
-</p:sld>
-</file>
-
-<file path=ppt/slides/slide3.xml><?xml version="1.0" encoding="utf-8"?>
-<p:sld xmlns:a="http://schemas.openxmlformats.org/drawingml/2006/main" xmlns:r="http://schemas.openxmlformats.org/officeDocument/2006/relationships" xmlns:p="http://schemas.openxmlformats.org/presentationml/2006/main">
-  <p:cSld>
-    <p:spTree>
-      <p:nvGrpSpPr>
-        <p:cNvPr id="1" name="Shape 83"/>
-        <p:cNvGrpSpPr/>
-        <p:nvPr/>
-      </p:nvGrpSpPr>
-      <p:grpSpPr>
-        <a:xfrm>
-          <a:off x="0" y="0"/>
-          <a:ext cx="0" cy="0"/>
-          <a:chOff x="0" y="0"/>
-          <a:chExt cx="0" cy="0"/>
-        </a:xfrm>
-      </p:grpSpPr>
       <p:cxnSp>
         <p:nvCxnSpPr>
           <p:cNvPr id="36" name="Connector: Elbow 35">
@@ -7202,97 +6327,7 @@
 </p:sld>
 </file>
 
-<file path=ppt/slides/slide4.xml><?xml version="1.0" encoding="utf-8"?>
-<p:sld xmlns:a="http://schemas.openxmlformats.org/drawingml/2006/main" xmlns:r="http://schemas.openxmlformats.org/officeDocument/2006/relationships" xmlns:p="http://schemas.openxmlformats.org/presentationml/2006/main">
-  <p:cSld>
-    <p:spTree>
-      <p:nvGrpSpPr>
-        <p:cNvPr id="1" name=""/>
-        <p:cNvGrpSpPr/>
-        <p:nvPr/>
-      </p:nvGrpSpPr>
-      <p:grpSpPr>
-        <a:xfrm>
-          <a:off x="0" y="0"/>
-          <a:ext cx="0" cy="0"/>
-          <a:chOff x="0" y="0"/>
-          <a:chExt cx="0" cy="0"/>
-        </a:xfrm>
-      </p:grpSpPr>
-      <p:pic>
-        <p:nvPicPr>
-          <p:cNvPr id="48" name="Picture 47">
-            <a:extLst>
-              <a:ext uri="{FF2B5EF4-FFF2-40B4-BE49-F238E27FC236}">
-                <a16:creationId xmlns:a16="http://schemas.microsoft.com/office/drawing/2014/main" id="{FA789CA7-0549-41FD-898D-4A79935BB60B}"/>
-              </a:ext>
-            </a:extLst>
-          </p:cNvPr>
-          <p:cNvPicPr>
-            <a:picLocks noChangeAspect="1"/>
-          </p:cNvPicPr>
-          <p:nvPr/>
-        </p:nvPicPr>
-        <p:blipFill>
-          <a:blip r:embed="rId2"/>
-          <a:stretch>
-            <a:fillRect/>
-          </a:stretch>
-        </p:blipFill>
-        <p:spPr>
-          <a:xfrm>
-            <a:off x="2102906" y="167431"/>
-            <a:ext cx="4938188" cy="4808637"/>
-          </a:xfrm>
-          <a:prstGeom prst="rect">
-            <a:avLst/>
-          </a:prstGeom>
-        </p:spPr>
-      </p:pic>
-      <p:pic>
-        <p:nvPicPr>
-          <p:cNvPr id="5" name="Picture 4">
-            <a:extLst>
-              <a:ext uri="{FF2B5EF4-FFF2-40B4-BE49-F238E27FC236}">
-                <a16:creationId xmlns:a16="http://schemas.microsoft.com/office/drawing/2014/main" id="{70025AA0-B7C4-4C2D-8DDE-E68B6674AA9B}"/>
-              </a:ext>
-            </a:extLst>
-          </p:cNvPr>
-          <p:cNvPicPr>
-            <a:picLocks noChangeAspect="1"/>
-          </p:cNvPicPr>
-          <p:nvPr/>
-        </p:nvPicPr>
-        <p:blipFill>
-          <a:blip r:embed="rId3"/>
-          <a:stretch>
-            <a:fillRect/>
-          </a:stretch>
-        </p:blipFill>
-        <p:spPr>
-          <a:xfrm>
-            <a:off x="807812" y="605257"/>
-            <a:ext cx="190071" cy="193137"/>
-          </a:xfrm>
-          <a:prstGeom prst="rect">
-            <a:avLst/>
-          </a:prstGeom>
-        </p:spPr>
-      </p:pic>
-    </p:spTree>
-    <p:extLst>
-      <p:ext uri="{BB962C8B-B14F-4D97-AF65-F5344CB8AC3E}">
-        <p14:creationId xmlns:p14="http://schemas.microsoft.com/office/powerpoint/2010/main" val="4047624809"/>
-      </p:ext>
-    </p:extLst>
-  </p:cSld>
-  <p:clrMapOvr>
-    <a:masterClrMapping/>
-  </p:clrMapOvr>
-</p:sld>
-</file>
-
-<file path=ppt/slides/slide5.xml><?xml version="1.0" encoding="utf-8"?>
+<file path=ppt/slides/slide2.xml><?xml version="1.0" encoding="utf-8"?>
 <p:sld xmlns:a="http://schemas.openxmlformats.org/drawingml/2006/main" xmlns:r="http://schemas.openxmlformats.org/officeDocument/2006/relationships" xmlns:p="http://schemas.openxmlformats.org/presentationml/2006/main">
   <p:cSld>
     <p:spTree>
@@ -7402,6 +6437,1139 @@
     <p:extLst>
       <p:ext uri="{BB962C8B-B14F-4D97-AF65-F5344CB8AC3E}">
         <p14:creationId xmlns:p14="http://schemas.microsoft.com/office/powerpoint/2010/main" val="2012311000"/>
+      </p:ext>
+    </p:extLst>
+  </p:cSld>
+  <p:clrMapOvr>
+    <a:masterClrMapping/>
+  </p:clrMapOvr>
+</p:sld>
+</file>
+
+<file path=ppt/slides/slide3.xml><?xml version="1.0" encoding="utf-8"?>
+<p:sld xmlns:a="http://schemas.openxmlformats.org/drawingml/2006/main" xmlns:r="http://schemas.openxmlformats.org/officeDocument/2006/relationships" xmlns:p="http://schemas.openxmlformats.org/presentationml/2006/main">
+  <p:cSld>
+    <p:spTree>
+      <p:nvGrpSpPr>
+        <p:cNvPr id="1" name=""/>
+        <p:cNvGrpSpPr/>
+        <p:nvPr/>
+      </p:nvGrpSpPr>
+      <p:grpSpPr>
+        <a:xfrm>
+          <a:off x="0" y="0"/>
+          <a:ext cx="0" cy="0"/>
+          <a:chOff x="0" y="0"/>
+          <a:chExt cx="0" cy="0"/>
+        </a:xfrm>
+      </p:grpSpPr>
+      <p:pic>
+        <p:nvPicPr>
+          <p:cNvPr id="1026" name="Picture 2">
+            <a:extLst>
+              <a:ext uri="{FF2B5EF4-FFF2-40B4-BE49-F238E27FC236}">
+                <a16:creationId xmlns:a16="http://schemas.microsoft.com/office/drawing/2014/main" id="{5733F4CF-82DF-4B85-A33E-2D40CC68C865}"/>
+              </a:ext>
+            </a:extLst>
+          </p:cNvPr>
+          <p:cNvPicPr>
+            <a:picLocks noChangeAspect="1" noChangeArrowheads="1"/>
+          </p:cNvPicPr>
+          <p:nvPr/>
+        </p:nvPicPr>
+        <p:blipFill>
+          <a:blip r:embed="rId2">
+            <a:extLst>
+              <a:ext uri="{28A0092B-C50C-407E-A947-70E740481C1C}">
+                <a14:useLocalDpi xmlns:a14="http://schemas.microsoft.com/office/drawing/2010/main" val="0"/>
+              </a:ext>
+            </a:extLst>
+          </a:blip>
+          <a:srcRect/>
+          <a:stretch>
+            <a:fillRect/>
+          </a:stretch>
+        </p:blipFill>
+        <p:spPr bwMode="auto">
+          <a:xfrm>
+            <a:off x="1206018" y="3532045"/>
+            <a:ext cx="5968782" cy="1731330"/>
+          </a:xfrm>
+          <a:prstGeom prst="rect">
+            <a:avLst/>
+          </a:prstGeom>
+          <a:noFill/>
+          <a:extLst>
+            <a:ext uri="{909E8E84-426E-40DD-AFC4-6F175D3DCCD1}">
+              <a14:hiddenFill xmlns:a14="http://schemas.microsoft.com/office/drawing/2010/main">
+                <a:solidFill>
+                  <a:srgbClr val="FFFFFF"/>
+                </a:solidFill>
+              </a14:hiddenFill>
+            </a:ext>
+          </a:extLst>
+        </p:spPr>
+      </p:pic>
+      <p:pic>
+        <p:nvPicPr>
+          <p:cNvPr id="12" name="Picture 11">
+            <a:extLst>
+              <a:ext uri="{FF2B5EF4-FFF2-40B4-BE49-F238E27FC236}">
+                <a16:creationId xmlns:a16="http://schemas.microsoft.com/office/drawing/2014/main" id="{BA7013EA-BD65-48E1-A93C-977760A09120}"/>
+              </a:ext>
+            </a:extLst>
+          </p:cNvPr>
+          <p:cNvPicPr>
+            <a:picLocks noChangeAspect="1"/>
+          </p:cNvPicPr>
+          <p:nvPr/>
+        </p:nvPicPr>
+        <p:blipFill>
+          <a:blip r:embed="rId3"/>
+          <a:stretch>
+            <a:fillRect/>
+          </a:stretch>
+        </p:blipFill>
+        <p:spPr>
+          <a:xfrm>
+            <a:off x="4264383" y="36431"/>
+            <a:ext cx="2706433" cy="3213117"/>
+          </a:xfrm>
+          <a:prstGeom prst="rect">
+            <a:avLst/>
+          </a:prstGeom>
+        </p:spPr>
+      </p:pic>
+      <p:pic>
+        <p:nvPicPr>
+          <p:cNvPr id="22" name="Picture 21">
+            <a:extLst>
+              <a:ext uri="{FF2B5EF4-FFF2-40B4-BE49-F238E27FC236}">
+                <a16:creationId xmlns:a16="http://schemas.microsoft.com/office/drawing/2014/main" id="{17E120B9-D3E8-4312-9539-DDDBF8A3B9D6}"/>
+              </a:ext>
+            </a:extLst>
+          </p:cNvPr>
+          <p:cNvPicPr>
+            <a:picLocks noChangeAspect="1"/>
+          </p:cNvPicPr>
+          <p:nvPr/>
+        </p:nvPicPr>
+        <p:blipFill>
+          <a:blip r:embed="rId4"/>
+          <a:stretch>
+            <a:fillRect/>
+          </a:stretch>
+        </p:blipFill>
+        <p:spPr>
+          <a:xfrm>
+            <a:off x="1257037" y="1"/>
+            <a:ext cx="3007346" cy="3249548"/>
+          </a:xfrm>
+          <a:prstGeom prst="rect">
+            <a:avLst/>
+          </a:prstGeom>
+        </p:spPr>
+      </p:pic>
+      <mc:AlternateContent xmlns:mc="http://schemas.openxmlformats.org/markup-compatibility/2006">
+        <mc:Choice xmlns:p14="http://schemas.microsoft.com/office/powerpoint/2010/main" Requires="p14">
+          <p:contentPart p14:bwMode="auto" r:id="rId5">
+            <p14:nvContentPartPr>
+              <p14:cNvPr id="28" name="Ink 27">
+                <a:extLst>
+                  <a:ext uri="{FF2B5EF4-FFF2-40B4-BE49-F238E27FC236}">
+                    <a16:creationId xmlns:a16="http://schemas.microsoft.com/office/drawing/2014/main" id="{D2321326-E734-47F7-9CD3-8B99EBA57243}"/>
+                  </a:ext>
+                </a:extLst>
+              </p14:cNvPr>
+              <p14:cNvContentPartPr/>
+              <p14:nvPr/>
+            </p14:nvContentPartPr>
+            <p14:xfrm>
+              <a:off x="3254188" y="229692"/>
+              <a:ext cx="762502" cy="360"/>
+            </p14:xfrm>
+          </p:contentPart>
+        </mc:Choice>
+        <mc:Fallback>
+          <p:pic>
+            <p:nvPicPr>
+              <p:cNvPr id="28" name="Ink 27">
+                <a:extLst>
+                  <a:ext uri="{FF2B5EF4-FFF2-40B4-BE49-F238E27FC236}">
+                    <a16:creationId xmlns:a16="http://schemas.microsoft.com/office/drawing/2014/main" id="{D2321326-E734-47F7-9CD3-8B99EBA57243}"/>
+                  </a:ext>
+                </a:extLst>
+              </p:cNvPr>
+              <p:cNvPicPr/>
+              <p:nvPr/>
+            </p:nvPicPr>
+            <p:blipFill>
+              <a:blip r:embed="rId6"/>
+              <a:stretch>
+                <a:fillRect/>
+              </a:stretch>
+            </p:blipFill>
+            <p:spPr>
+              <a:xfrm>
+                <a:off x="3200161" y="121692"/>
+                <a:ext cx="870196" cy="216000"/>
+              </a:xfrm>
+              <a:prstGeom prst="rect">
+                <a:avLst/>
+              </a:prstGeom>
+            </p:spPr>
+          </p:pic>
+        </mc:Fallback>
+      </mc:AlternateContent>
+      <mc:AlternateContent xmlns:mc="http://schemas.openxmlformats.org/markup-compatibility/2006">
+        <mc:Choice xmlns:p14="http://schemas.microsoft.com/office/powerpoint/2010/main" Requires="p14">
+          <p:contentPart p14:bwMode="auto" r:id="rId7">
+            <p14:nvContentPartPr>
+              <p14:cNvPr id="29" name="Ink 28">
+                <a:extLst>
+                  <a:ext uri="{FF2B5EF4-FFF2-40B4-BE49-F238E27FC236}">
+                    <a16:creationId xmlns:a16="http://schemas.microsoft.com/office/drawing/2014/main" id="{030A0374-74B8-4601-BA72-445C5046FA6E}"/>
+                  </a:ext>
+                </a:extLst>
+              </p14:cNvPr>
+              <p14:cNvContentPartPr/>
+              <p14:nvPr/>
+            </p14:nvContentPartPr>
+            <p14:xfrm>
+              <a:off x="2108586" y="868473"/>
+              <a:ext cx="604440" cy="360"/>
+            </p14:xfrm>
+          </p:contentPart>
+        </mc:Choice>
+        <mc:Fallback>
+          <p:pic>
+            <p:nvPicPr>
+              <p:cNvPr id="29" name="Ink 28">
+                <a:extLst>
+                  <a:ext uri="{FF2B5EF4-FFF2-40B4-BE49-F238E27FC236}">
+                    <a16:creationId xmlns:a16="http://schemas.microsoft.com/office/drawing/2014/main" id="{030A0374-74B8-4601-BA72-445C5046FA6E}"/>
+                  </a:ext>
+                </a:extLst>
+              </p:cNvPr>
+              <p:cNvPicPr/>
+              <p:nvPr/>
+            </p:nvPicPr>
+            <p:blipFill>
+              <a:blip r:embed="rId8"/>
+              <a:stretch>
+                <a:fillRect/>
+              </a:stretch>
+            </p:blipFill>
+            <p:spPr>
+              <a:xfrm>
+                <a:off x="2054946" y="760833"/>
+                <a:ext cx="712080" cy="216000"/>
+              </a:xfrm>
+              <a:prstGeom prst="rect">
+                <a:avLst/>
+              </a:prstGeom>
+            </p:spPr>
+          </p:pic>
+        </mc:Fallback>
+      </mc:AlternateContent>
+      <mc:AlternateContent xmlns:mc="http://schemas.openxmlformats.org/markup-compatibility/2006">
+        <mc:Choice xmlns:p14="http://schemas.microsoft.com/office/powerpoint/2010/main" Requires="p14">
+          <p:contentPart p14:bwMode="auto" r:id="rId9">
+            <p14:nvContentPartPr>
+              <p14:cNvPr id="30" name="Ink 29">
+                <a:extLst>
+                  <a:ext uri="{FF2B5EF4-FFF2-40B4-BE49-F238E27FC236}">
+                    <a16:creationId xmlns:a16="http://schemas.microsoft.com/office/drawing/2014/main" id="{4B45943A-CB2B-4067-984E-6696092D0D9F}"/>
+                  </a:ext>
+                </a:extLst>
+              </p14:cNvPr>
+              <p14:cNvContentPartPr/>
+              <p14:nvPr/>
+            </p14:nvContentPartPr>
+            <p14:xfrm>
+              <a:off x="2926976" y="868473"/>
+              <a:ext cx="571514" cy="360"/>
+            </p14:xfrm>
+          </p:contentPart>
+        </mc:Choice>
+        <mc:Fallback>
+          <p:pic>
+            <p:nvPicPr>
+              <p:cNvPr id="30" name="Ink 29">
+                <a:extLst>
+                  <a:ext uri="{FF2B5EF4-FFF2-40B4-BE49-F238E27FC236}">
+                    <a16:creationId xmlns:a16="http://schemas.microsoft.com/office/drawing/2014/main" id="{4B45943A-CB2B-4067-984E-6696092D0D9F}"/>
+                  </a:ext>
+                </a:extLst>
+              </p:cNvPr>
+              <p:cNvPicPr/>
+              <p:nvPr/>
+            </p:nvPicPr>
+            <p:blipFill>
+              <a:blip r:embed="rId10"/>
+              <a:stretch>
+                <a:fillRect/>
+              </a:stretch>
+            </p:blipFill>
+            <p:spPr>
+              <a:xfrm>
+                <a:off x="2872992" y="760833"/>
+                <a:ext cx="679123" cy="216000"/>
+              </a:xfrm>
+              <a:prstGeom prst="rect">
+                <a:avLst/>
+              </a:prstGeom>
+            </p:spPr>
+          </p:pic>
+        </mc:Fallback>
+      </mc:AlternateContent>
+      <mc:AlternateContent xmlns:mc="http://schemas.openxmlformats.org/markup-compatibility/2006">
+        <mc:Choice xmlns:p14="http://schemas.microsoft.com/office/powerpoint/2010/main" Requires="p14">
+          <p:contentPart p14:bwMode="auto" r:id="rId11">
+            <p14:nvContentPartPr>
+              <p14:cNvPr id="33" name="Ink 32">
+                <a:extLst>
+                  <a:ext uri="{FF2B5EF4-FFF2-40B4-BE49-F238E27FC236}">
+                    <a16:creationId xmlns:a16="http://schemas.microsoft.com/office/drawing/2014/main" id="{1CBBEB3E-B9A2-4BF1-8190-5970A2BBBB98}"/>
+                  </a:ext>
+                </a:extLst>
+              </p14:cNvPr>
+              <p14:cNvContentPartPr/>
+              <p14:nvPr/>
+            </p14:nvContentPartPr>
+            <p14:xfrm>
+              <a:off x="2210647" y="1661545"/>
+              <a:ext cx="604440" cy="360"/>
+            </p14:xfrm>
+          </p:contentPart>
+        </mc:Choice>
+        <mc:Fallback>
+          <p:pic>
+            <p:nvPicPr>
+              <p:cNvPr id="33" name="Ink 32">
+                <a:extLst>
+                  <a:ext uri="{FF2B5EF4-FFF2-40B4-BE49-F238E27FC236}">
+                    <a16:creationId xmlns:a16="http://schemas.microsoft.com/office/drawing/2014/main" id="{1CBBEB3E-B9A2-4BF1-8190-5970A2BBBB98}"/>
+                  </a:ext>
+                </a:extLst>
+              </p:cNvPr>
+              <p:cNvPicPr/>
+              <p:nvPr/>
+            </p:nvPicPr>
+            <p:blipFill>
+              <a:blip r:embed="rId8"/>
+              <a:stretch>
+                <a:fillRect/>
+              </a:stretch>
+            </p:blipFill>
+            <p:spPr>
+              <a:xfrm>
+                <a:off x="2157007" y="1553905"/>
+                <a:ext cx="712080" cy="216000"/>
+              </a:xfrm>
+              <a:prstGeom prst="rect">
+                <a:avLst/>
+              </a:prstGeom>
+            </p:spPr>
+          </p:pic>
+        </mc:Fallback>
+      </mc:AlternateContent>
+      <mc:AlternateContent xmlns:mc="http://schemas.openxmlformats.org/markup-compatibility/2006">
+        <mc:Choice xmlns:p14="http://schemas.microsoft.com/office/powerpoint/2010/main" Requires="p14">
+          <p:contentPart p14:bwMode="auto" r:id="rId12">
+            <p14:nvContentPartPr>
+              <p14:cNvPr id="36" name="Ink 35">
+                <a:extLst>
+                  <a:ext uri="{FF2B5EF4-FFF2-40B4-BE49-F238E27FC236}">
+                    <a16:creationId xmlns:a16="http://schemas.microsoft.com/office/drawing/2014/main" id="{488588F0-29F6-4160-8DEE-E485E7E8BF6E}"/>
+                  </a:ext>
+                </a:extLst>
+              </p14:cNvPr>
+              <p14:cNvContentPartPr/>
+              <p14:nvPr/>
+            </p14:nvContentPartPr>
+            <p14:xfrm>
+              <a:off x="2815087" y="1381994"/>
+              <a:ext cx="604440" cy="360"/>
+            </p14:xfrm>
+          </p:contentPart>
+        </mc:Choice>
+        <mc:Fallback>
+          <p:pic>
+            <p:nvPicPr>
+              <p:cNvPr id="36" name="Ink 35">
+                <a:extLst>
+                  <a:ext uri="{FF2B5EF4-FFF2-40B4-BE49-F238E27FC236}">
+                    <a16:creationId xmlns:a16="http://schemas.microsoft.com/office/drawing/2014/main" id="{488588F0-29F6-4160-8DEE-E485E7E8BF6E}"/>
+                  </a:ext>
+                </a:extLst>
+              </p:cNvPr>
+              <p:cNvPicPr/>
+              <p:nvPr/>
+            </p:nvPicPr>
+            <p:blipFill>
+              <a:blip r:embed="rId8"/>
+              <a:stretch>
+                <a:fillRect/>
+              </a:stretch>
+            </p:blipFill>
+            <p:spPr>
+              <a:xfrm>
+                <a:off x="2761447" y="1274354"/>
+                <a:ext cx="712080" cy="216000"/>
+              </a:xfrm>
+              <a:prstGeom prst="rect">
+                <a:avLst/>
+              </a:prstGeom>
+            </p:spPr>
+          </p:pic>
+        </mc:Fallback>
+      </mc:AlternateContent>
+      <mc:AlternateContent xmlns:mc="http://schemas.openxmlformats.org/markup-compatibility/2006">
+        <mc:Choice xmlns:p14="http://schemas.microsoft.com/office/powerpoint/2010/main" Requires="p14">
+          <p:contentPart p14:bwMode="auto" r:id="rId13">
+            <p14:nvContentPartPr>
+              <p14:cNvPr id="37" name="Ink 36">
+                <a:extLst>
+                  <a:ext uri="{FF2B5EF4-FFF2-40B4-BE49-F238E27FC236}">
+                    <a16:creationId xmlns:a16="http://schemas.microsoft.com/office/drawing/2014/main" id="{6EDC7116-6636-4121-8E04-4FCC471AEDA0}"/>
+                  </a:ext>
+                </a:extLst>
+              </p14:cNvPr>
+              <p14:cNvContentPartPr/>
+              <p14:nvPr/>
+            </p14:nvContentPartPr>
+            <p14:xfrm>
+              <a:off x="1783327" y="1978410"/>
+              <a:ext cx="516120" cy="360"/>
+            </p14:xfrm>
+          </p:contentPart>
+        </mc:Choice>
+        <mc:Fallback>
+          <p:pic>
+            <p:nvPicPr>
+              <p:cNvPr id="37" name="Ink 36">
+                <a:extLst>
+                  <a:ext uri="{FF2B5EF4-FFF2-40B4-BE49-F238E27FC236}">
+                    <a16:creationId xmlns:a16="http://schemas.microsoft.com/office/drawing/2014/main" id="{6EDC7116-6636-4121-8E04-4FCC471AEDA0}"/>
+                  </a:ext>
+                </a:extLst>
+              </p:cNvPr>
+              <p:cNvPicPr/>
+              <p:nvPr/>
+            </p:nvPicPr>
+            <p:blipFill>
+              <a:blip r:embed="rId14"/>
+              <a:stretch>
+                <a:fillRect/>
+              </a:stretch>
+            </p:blipFill>
+            <p:spPr>
+              <a:xfrm>
+                <a:off x="1729699" y="1870770"/>
+                <a:ext cx="623735" cy="216000"/>
+              </a:xfrm>
+              <a:prstGeom prst="rect">
+                <a:avLst/>
+              </a:prstGeom>
+            </p:spPr>
+          </p:pic>
+        </mc:Fallback>
+      </mc:AlternateContent>
+      <mc:AlternateContent xmlns:mc="http://schemas.openxmlformats.org/markup-compatibility/2006">
+        <mc:Choice xmlns:p14="http://schemas.microsoft.com/office/powerpoint/2010/main" Requires="p14">
+          <p:contentPart p14:bwMode="auto" r:id="rId15">
+            <p14:nvContentPartPr>
+              <p14:cNvPr id="40" name="Ink 39">
+                <a:extLst>
+                  <a:ext uri="{FF2B5EF4-FFF2-40B4-BE49-F238E27FC236}">
+                    <a16:creationId xmlns:a16="http://schemas.microsoft.com/office/drawing/2014/main" id="{287DB42C-0FCE-4340-B15A-843961E76A58}"/>
+                  </a:ext>
+                </a:extLst>
+              </p14:cNvPr>
+              <p14:cNvContentPartPr/>
+              <p14:nvPr/>
+            </p14:nvContentPartPr>
+            <p14:xfrm>
+              <a:off x="1824113" y="2361988"/>
+              <a:ext cx="481320" cy="9720"/>
+            </p14:xfrm>
+          </p:contentPart>
+        </mc:Choice>
+        <mc:Fallback>
+          <p:pic>
+            <p:nvPicPr>
+              <p:cNvPr id="40" name="Ink 39">
+                <a:extLst>
+                  <a:ext uri="{FF2B5EF4-FFF2-40B4-BE49-F238E27FC236}">
+                    <a16:creationId xmlns:a16="http://schemas.microsoft.com/office/drawing/2014/main" id="{287DB42C-0FCE-4340-B15A-843961E76A58}"/>
+                  </a:ext>
+                </a:extLst>
+              </p:cNvPr>
+              <p:cNvPicPr/>
+              <p:nvPr/>
+            </p:nvPicPr>
+            <p:blipFill>
+              <a:blip r:embed="rId16"/>
+              <a:stretch>
+                <a:fillRect/>
+              </a:stretch>
+            </p:blipFill>
+            <p:spPr>
+              <a:xfrm>
+                <a:off x="1770473" y="2253988"/>
+                <a:ext cx="588960" cy="225360"/>
+              </a:xfrm>
+              <a:prstGeom prst="rect">
+                <a:avLst/>
+              </a:prstGeom>
+            </p:spPr>
+          </p:pic>
+        </mc:Fallback>
+      </mc:AlternateContent>
+      <mc:AlternateContent xmlns:mc="http://schemas.openxmlformats.org/markup-compatibility/2006">
+        <mc:Choice xmlns:p14="http://schemas.microsoft.com/office/powerpoint/2010/main" Requires="p14">
+          <p:contentPart p14:bwMode="auto" r:id="rId17">
+            <p14:nvContentPartPr>
+              <p14:cNvPr id="41" name="Ink 40">
+                <a:extLst>
+                  <a:ext uri="{FF2B5EF4-FFF2-40B4-BE49-F238E27FC236}">
+                    <a16:creationId xmlns:a16="http://schemas.microsoft.com/office/drawing/2014/main" id="{5F5DB1C6-3FAD-4552-9D7D-EBDB8F8139EA}"/>
+                  </a:ext>
+                </a:extLst>
+              </p14:cNvPr>
+              <p14:cNvContentPartPr/>
+              <p14:nvPr/>
+            </p14:nvContentPartPr>
+            <p14:xfrm>
+              <a:off x="1770473" y="2751868"/>
+              <a:ext cx="445320" cy="360"/>
+            </p14:xfrm>
+          </p:contentPart>
+        </mc:Choice>
+        <mc:Fallback>
+          <p:pic>
+            <p:nvPicPr>
+              <p:cNvPr id="41" name="Ink 40">
+                <a:extLst>
+                  <a:ext uri="{FF2B5EF4-FFF2-40B4-BE49-F238E27FC236}">
+                    <a16:creationId xmlns:a16="http://schemas.microsoft.com/office/drawing/2014/main" id="{5F5DB1C6-3FAD-4552-9D7D-EBDB8F8139EA}"/>
+                  </a:ext>
+                </a:extLst>
+              </p:cNvPr>
+              <p:cNvPicPr/>
+              <p:nvPr/>
+            </p:nvPicPr>
+            <p:blipFill>
+              <a:blip r:embed="rId18"/>
+              <a:stretch>
+                <a:fillRect/>
+              </a:stretch>
+            </p:blipFill>
+            <p:spPr>
+              <a:xfrm>
+                <a:off x="1716473" y="2644228"/>
+                <a:ext cx="552960" cy="216000"/>
+              </a:xfrm>
+              <a:prstGeom prst="rect">
+                <a:avLst/>
+              </a:prstGeom>
+            </p:spPr>
+          </p:pic>
+        </mc:Fallback>
+      </mc:AlternateContent>
+    </p:spTree>
+    <p:extLst>
+      <p:ext uri="{BB962C8B-B14F-4D97-AF65-F5344CB8AC3E}">
+        <p14:creationId xmlns:p14="http://schemas.microsoft.com/office/powerpoint/2010/main" val="2716181968"/>
+      </p:ext>
+    </p:extLst>
+  </p:cSld>
+  <p:clrMapOvr>
+    <a:masterClrMapping/>
+  </p:clrMapOvr>
+</p:sld>
+</file>
+
+<file path=ppt/slides/slide4.xml><?xml version="1.0" encoding="utf-8"?>
+<p:sld xmlns:a="http://schemas.openxmlformats.org/drawingml/2006/main" xmlns:r="http://schemas.openxmlformats.org/officeDocument/2006/relationships" xmlns:p="http://schemas.openxmlformats.org/presentationml/2006/main">
+  <p:cSld>
+    <p:spTree>
+      <p:nvGrpSpPr>
+        <p:cNvPr id="1" name=""/>
+        <p:cNvGrpSpPr/>
+        <p:nvPr/>
+      </p:nvGrpSpPr>
+      <p:grpSpPr>
+        <a:xfrm>
+          <a:off x="0" y="0"/>
+          <a:ext cx="0" cy="0"/>
+          <a:chOff x="0" y="0"/>
+          <a:chExt cx="0" cy="0"/>
+        </a:xfrm>
+      </p:grpSpPr>
+      <p:pic>
+        <p:nvPicPr>
+          <p:cNvPr id="3" name="Picture 2">
+            <a:extLst>
+              <a:ext uri="{FF2B5EF4-FFF2-40B4-BE49-F238E27FC236}">
+                <a16:creationId xmlns:a16="http://schemas.microsoft.com/office/drawing/2014/main" id="{95719087-9345-4877-A92D-2242D806E229}"/>
+              </a:ext>
+            </a:extLst>
+          </p:cNvPr>
+          <p:cNvPicPr>
+            <a:picLocks noChangeAspect="1"/>
+          </p:cNvPicPr>
+          <p:nvPr/>
+        </p:nvPicPr>
+        <p:blipFill>
+          <a:blip r:embed="rId2"/>
+          <a:stretch>
+            <a:fillRect/>
+          </a:stretch>
+        </p:blipFill>
+        <p:spPr>
+          <a:xfrm>
+            <a:off x="866804" y="346998"/>
+            <a:ext cx="3456543" cy="3904613"/>
+          </a:xfrm>
+          <a:prstGeom prst="rect">
+            <a:avLst/>
+          </a:prstGeom>
+        </p:spPr>
+      </p:pic>
+      <p:pic>
+        <p:nvPicPr>
+          <p:cNvPr id="12" name="Picture 11">
+            <a:extLst>
+              <a:ext uri="{FF2B5EF4-FFF2-40B4-BE49-F238E27FC236}">
+                <a16:creationId xmlns:a16="http://schemas.microsoft.com/office/drawing/2014/main" id="{BA7013EA-BD65-48E1-A93C-977760A09120}"/>
+              </a:ext>
+            </a:extLst>
+          </p:cNvPr>
+          <p:cNvPicPr>
+            <a:picLocks noChangeAspect="1"/>
+          </p:cNvPicPr>
+          <p:nvPr/>
+        </p:nvPicPr>
+        <p:blipFill>
+          <a:blip r:embed="rId3"/>
+          <a:stretch>
+            <a:fillRect/>
+          </a:stretch>
+        </p:blipFill>
+        <p:spPr>
+          <a:xfrm>
+            <a:off x="4384699" y="419468"/>
+            <a:ext cx="3196061" cy="3794411"/>
+          </a:xfrm>
+          <a:prstGeom prst="rect">
+            <a:avLst/>
+          </a:prstGeom>
+        </p:spPr>
+      </p:pic>
+      <mc:AlternateContent xmlns:mc="http://schemas.openxmlformats.org/markup-compatibility/2006">
+        <mc:Choice xmlns:p14="http://schemas.microsoft.com/office/powerpoint/2010/main" Requires="p14">
+          <p:contentPart p14:bwMode="auto" r:id="rId4">
+            <p14:nvContentPartPr>
+              <p14:cNvPr id="28" name="Ink 27">
+                <a:extLst>
+                  <a:ext uri="{FF2B5EF4-FFF2-40B4-BE49-F238E27FC236}">
+                    <a16:creationId xmlns:a16="http://schemas.microsoft.com/office/drawing/2014/main" id="{D2321326-E734-47F7-9CD3-8B99EBA57243}"/>
+                  </a:ext>
+                </a:extLst>
+              </p14:cNvPr>
+              <p14:cNvContentPartPr/>
+              <p14:nvPr/>
+            </p14:nvContentPartPr>
+            <p14:xfrm>
+              <a:off x="3326378" y="767103"/>
+              <a:ext cx="762502" cy="360"/>
+            </p14:xfrm>
+          </p:contentPart>
+        </mc:Choice>
+        <mc:Fallback>
+          <p:pic>
+            <p:nvPicPr>
+              <p:cNvPr id="28" name="Ink 27">
+                <a:extLst>
+                  <a:ext uri="{FF2B5EF4-FFF2-40B4-BE49-F238E27FC236}">
+                    <a16:creationId xmlns:a16="http://schemas.microsoft.com/office/drawing/2014/main" id="{D2321326-E734-47F7-9CD3-8B99EBA57243}"/>
+                  </a:ext>
+                </a:extLst>
+              </p:cNvPr>
+              <p:cNvPicPr/>
+              <p:nvPr/>
+            </p:nvPicPr>
+            <p:blipFill>
+              <a:blip r:embed="rId5"/>
+              <a:stretch>
+                <a:fillRect/>
+              </a:stretch>
+            </p:blipFill>
+            <p:spPr>
+              <a:xfrm>
+                <a:off x="3272376" y="659103"/>
+                <a:ext cx="870145" cy="216000"/>
+              </a:xfrm>
+              <a:prstGeom prst="rect">
+                <a:avLst/>
+              </a:prstGeom>
+            </p:spPr>
+          </p:pic>
+        </mc:Fallback>
+      </mc:AlternateContent>
+      <mc:AlternateContent xmlns:mc="http://schemas.openxmlformats.org/markup-compatibility/2006">
+        <mc:Choice xmlns:p14="http://schemas.microsoft.com/office/powerpoint/2010/main" Requires="p14">
+          <p:contentPart p14:bwMode="auto" r:id="rId6">
+            <p14:nvContentPartPr>
+              <p14:cNvPr id="29" name="Ink 28">
+                <a:extLst>
+                  <a:ext uri="{FF2B5EF4-FFF2-40B4-BE49-F238E27FC236}">
+                    <a16:creationId xmlns:a16="http://schemas.microsoft.com/office/drawing/2014/main" id="{030A0374-74B8-4601-BA72-445C5046FA6E}"/>
+                  </a:ext>
+                </a:extLst>
+              </p14:cNvPr>
+              <p14:cNvContentPartPr/>
+              <p14:nvPr/>
+            </p14:nvContentPartPr>
+            <p14:xfrm>
+              <a:off x="1481107" y="2754256"/>
+              <a:ext cx="604440" cy="360"/>
+            </p14:xfrm>
+          </p:contentPart>
+        </mc:Choice>
+        <mc:Fallback>
+          <p:pic>
+            <p:nvPicPr>
+              <p:cNvPr id="29" name="Ink 28">
+                <a:extLst>
+                  <a:ext uri="{FF2B5EF4-FFF2-40B4-BE49-F238E27FC236}">
+                    <a16:creationId xmlns:a16="http://schemas.microsoft.com/office/drawing/2014/main" id="{030A0374-74B8-4601-BA72-445C5046FA6E}"/>
+                  </a:ext>
+                </a:extLst>
+              </p:cNvPr>
+              <p:cNvPicPr/>
+              <p:nvPr/>
+            </p:nvPicPr>
+            <p:blipFill>
+              <a:blip r:embed="rId7"/>
+              <a:stretch>
+                <a:fillRect/>
+              </a:stretch>
+            </p:blipFill>
+            <p:spPr>
+              <a:xfrm>
+                <a:off x="1427075" y="2646256"/>
+                <a:ext cx="712144" cy="216000"/>
+              </a:xfrm>
+              <a:prstGeom prst="rect">
+                <a:avLst/>
+              </a:prstGeom>
+            </p:spPr>
+          </p:pic>
+        </mc:Fallback>
+      </mc:AlternateContent>
+      <mc:AlternateContent xmlns:mc="http://schemas.openxmlformats.org/markup-compatibility/2006">
+        <mc:Choice xmlns:p14="http://schemas.microsoft.com/office/powerpoint/2010/main" Requires="p14">
+          <p:contentPart p14:bwMode="auto" r:id="rId8">
+            <p14:nvContentPartPr>
+              <p14:cNvPr id="30" name="Ink 29">
+                <a:extLst>
+                  <a:ext uri="{FF2B5EF4-FFF2-40B4-BE49-F238E27FC236}">
+                    <a16:creationId xmlns:a16="http://schemas.microsoft.com/office/drawing/2014/main" id="{4B45943A-CB2B-4067-984E-6696092D0D9F}"/>
+                  </a:ext>
+                </a:extLst>
+              </p14:cNvPr>
+              <p14:cNvContentPartPr/>
+              <p14:nvPr/>
+            </p14:nvContentPartPr>
+            <p14:xfrm>
+              <a:off x="3056663" y="2141394"/>
+              <a:ext cx="571514" cy="360"/>
+            </p14:xfrm>
+          </p:contentPart>
+        </mc:Choice>
+        <mc:Fallback>
+          <p:pic>
+            <p:nvPicPr>
+              <p:cNvPr id="30" name="Ink 29">
+                <a:extLst>
+                  <a:ext uri="{FF2B5EF4-FFF2-40B4-BE49-F238E27FC236}">
+                    <a16:creationId xmlns:a16="http://schemas.microsoft.com/office/drawing/2014/main" id="{4B45943A-CB2B-4067-984E-6696092D0D9F}"/>
+                  </a:ext>
+                </a:extLst>
+              </p:cNvPr>
+              <p:cNvPicPr/>
+              <p:nvPr/>
+            </p:nvPicPr>
+            <p:blipFill>
+              <a:blip r:embed="rId9"/>
+              <a:stretch>
+                <a:fillRect/>
+              </a:stretch>
+            </p:blipFill>
+            <p:spPr>
+              <a:xfrm>
+                <a:off x="3002679" y="2033394"/>
+                <a:ext cx="679123" cy="216000"/>
+              </a:xfrm>
+              <a:prstGeom prst="rect">
+                <a:avLst/>
+              </a:prstGeom>
+            </p:spPr>
+          </p:pic>
+        </mc:Fallback>
+      </mc:AlternateContent>
+      <mc:AlternateContent xmlns:mc="http://schemas.openxmlformats.org/markup-compatibility/2006">
+        <mc:Choice xmlns:p14="http://schemas.microsoft.com/office/powerpoint/2010/main" Requires="p14">
+          <p:contentPart p14:bwMode="auto" r:id="rId10">
+            <p14:nvContentPartPr>
+              <p14:cNvPr id="33" name="Ink 32">
+                <a:extLst>
+                  <a:ext uri="{FF2B5EF4-FFF2-40B4-BE49-F238E27FC236}">
+                    <a16:creationId xmlns:a16="http://schemas.microsoft.com/office/drawing/2014/main" id="{1CBBEB3E-B9A2-4BF1-8190-5970A2BBBB98}"/>
+                  </a:ext>
+                </a:extLst>
+              </p14:cNvPr>
+              <p14:cNvContentPartPr/>
+              <p14:nvPr/>
+            </p14:nvContentPartPr>
+            <p14:xfrm>
+              <a:off x="2355256" y="1511160"/>
+              <a:ext cx="357770" cy="360"/>
+            </p14:xfrm>
+          </p:contentPart>
+        </mc:Choice>
+        <mc:Fallback>
+          <p:pic>
+            <p:nvPicPr>
+              <p:cNvPr id="33" name="Ink 32">
+                <a:extLst>
+                  <a:ext uri="{FF2B5EF4-FFF2-40B4-BE49-F238E27FC236}">
+                    <a16:creationId xmlns:a16="http://schemas.microsoft.com/office/drawing/2014/main" id="{1CBBEB3E-B9A2-4BF1-8190-5970A2BBBB98}"/>
+                  </a:ext>
+                </a:extLst>
+              </p:cNvPr>
+              <p:cNvPicPr/>
+              <p:nvPr/>
+            </p:nvPicPr>
+            <p:blipFill>
+              <a:blip r:embed="rId11"/>
+              <a:stretch>
+                <a:fillRect/>
+              </a:stretch>
+            </p:blipFill>
+            <p:spPr>
+              <a:xfrm>
+                <a:off x="2301267" y="1403160"/>
+                <a:ext cx="465389" cy="216000"/>
+              </a:xfrm>
+              <a:prstGeom prst="rect">
+                <a:avLst/>
+              </a:prstGeom>
+            </p:spPr>
+          </p:pic>
+        </mc:Fallback>
+      </mc:AlternateContent>
+      <mc:AlternateContent xmlns:mc="http://schemas.openxmlformats.org/markup-compatibility/2006">
+        <mc:Choice xmlns:p14="http://schemas.microsoft.com/office/powerpoint/2010/main" Requires="p14">
+          <p:contentPart p14:bwMode="auto" r:id="rId12">
+            <p14:nvContentPartPr>
+              <p14:cNvPr id="36" name="Ink 35">
+                <a:extLst>
+                  <a:ext uri="{FF2B5EF4-FFF2-40B4-BE49-F238E27FC236}">
+                    <a16:creationId xmlns:a16="http://schemas.microsoft.com/office/drawing/2014/main" id="{488588F0-29F6-4160-8DEE-E485E7E8BF6E}"/>
+                  </a:ext>
+                </a:extLst>
+              </p14:cNvPr>
+              <p14:cNvContentPartPr/>
+              <p14:nvPr/>
+            </p14:nvContentPartPr>
+            <p14:xfrm>
+              <a:off x="3040621" y="1502309"/>
+              <a:ext cx="496663" cy="360"/>
+            </p14:xfrm>
+          </p:contentPart>
+        </mc:Choice>
+        <mc:Fallback>
+          <p:pic>
+            <p:nvPicPr>
+              <p:cNvPr id="36" name="Ink 35">
+                <a:extLst>
+                  <a:ext uri="{FF2B5EF4-FFF2-40B4-BE49-F238E27FC236}">
+                    <a16:creationId xmlns:a16="http://schemas.microsoft.com/office/drawing/2014/main" id="{488588F0-29F6-4160-8DEE-E485E7E8BF6E}"/>
+                  </a:ext>
+                </a:extLst>
+              </p:cNvPr>
+              <p:cNvPicPr/>
+              <p:nvPr/>
+            </p:nvPicPr>
+            <p:blipFill>
+              <a:blip r:embed="rId13"/>
+              <a:stretch>
+                <a:fillRect/>
+              </a:stretch>
+            </p:blipFill>
+            <p:spPr>
+              <a:xfrm>
+                <a:off x="2986636" y="1394309"/>
+                <a:ext cx="604273" cy="216000"/>
+              </a:xfrm>
+              <a:prstGeom prst="rect">
+                <a:avLst/>
+              </a:prstGeom>
+            </p:spPr>
+          </p:pic>
+        </mc:Fallback>
+      </mc:AlternateContent>
+      <mc:AlternateContent xmlns:mc="http://schemas.openxmlformats.org/markup-compatibility/2006">
+        <mc:Choice xmlns:p14="http://schemas.microsoft.com/office/powerpoint/2010/main" Requires="p14">
+          <p:contentPart p14:bwMode="auto" r:id="rId14">
+            <p14:nvContentPartPr>
+              <p14:cNvPr id="37" name="Ink 36">
+                <a:extLst>
+                  <a:ext uri="{FF2B5EF4-FFF2-40B4-BE49-F238E27FC236}">
+                    <a16:creationId xmlns:a16="http://schemas.microsoft.com/office/drawing/2014/main" id="{6EDC7116-6636-4121-8E04-4FCC471AEDA0}"/>
+                  </a:ext>
+                </a:extLst>
+              </p14:cNvPr>
+              <p14:cNvContentPartPr/>
+              <p14:nvPr/>
+            </p14:nvContentPartPr>
+            <p14:xfrm>
+              <a:off x="2299447" y="2451653"/>
+              <a:ext cx="516120" cy="360"/>
+            </p14:xfrm>
+          </p:contentPart>
+        </mc:Choice>
+        <mc:Fallback>
+          <p:pic>
+            <p:nvPicPr>
+              <p:cNvPr id="37" name="Ink 36">
+                <a:extLst>
+                  <a:ext uri="{FF2B5EF4-FFF2-40B4-BE49-F238E27FC236}">
+                    <a16:creationId xmlns:a16="http://schemas.microsoft.com/office/drawing/2014/main" id="{6EDC7116-6636-4121-8E04-4FCC471AEDA0}"/>
+                  </a:ext>
+                </a:extLst>
+              </p:cNvPr>
+              <p:cNvPicPr/>
+              <p:nvPr/>
+            </p:nvPicPr>
+            <p:blipFill>
+              <a:blip r:embed="rId15"/>
+              <a:stretch>
+                <a:fillRect/>
+              </a:stretch>
+            </p:blipFill>
+            <p:spPr>
+              <a:xfrm>
+                <a:off x="2245460" y="2343653"/>
+                <a:ext cx="623735" cy="216000"/>
+              </a:xfrm>
+              <a:prstGeom prst="rect">
+                <a:avLst/>
+              </a:prstGeom>
+            </p:spPr>
+          </p:pic>
+        </mc:Fallback>
+      </mc:AlternateContent>
+      <mc:AlternateContent xmlns:mc="http://schemas.openxmlformats.org/markup-compatibility/2006">
+        <mc:Choice xmlns:p14="http://schemas.microsoft.com/office/powerpoint/2010/main" Requires="p14">
+          <p:contentPart p14:bwMode="auto" r:id="rId16">
+            <p14:nvContentPartPr>
+              <p14:cNvPr id="40" name="Ink 39">
+                <a:extLst>
+                  <a:ext uri="{FF2B5EF4-FFF2-40B4-BE49-F238E27FC236}">
+                    <a16:creationId xmlns:a16="http://schemas.microsoft.com/office/drawing/2014/main" id="{287DB42C-0FCE-4340-B15A-843961E76A58}"/>
+                  </a:ext>
+                </a:extLst>
+              </p14:cNvPr>
+              <p14:cNvContentPartPr/>
+              <p14:nvPr/>
+            </p14:nvContentPartPr>
+            <p14:xfrm>
+              <a:off x="1818127" y="3110330"/>
+              <a:ext cx="481320" cy="9720"/>
+            </p14:xfrm>
+          </p:contentPart>
+        </mc:Choice>
+        <mc:Fallback>
+          <p:pic>
+            <p:nvPicPr>
+              <p:cNvPr id="40" name="Ink 39">
+                <a:extLst>
+                  <a:ext uri="{FF2B5EF4-FFF2-40B4-BE49-F238E27FC236}">
+                    <a16:creationId xmlns:a16="http://schemas.microsoft.com/office/drawing/2014/main" id="{287DB42C-0FCE-4340-B15A-843961E76A58}"/>
+                  </a:ext>
+                </a:extLst>
+              </p:cNvPr>
+              <p:cNvPicPr/>
+              <p:nvPr/>
+            </p:nvPicPr>
+            <p:blipFill>
+              <a:blip r:embed="rId17"/>
+              <a:stretch>
+                <a:fillRect/>
+              </a:stretch>
+            </p:blipFill>
+            <p:spPr>
+              <a:xfrm>
+                <a:off x="1764127" y="3002330"/>
+                <a:ext cx="588960" cy="225360"/>
+              </a:xfrm>
+              <a:prstGeom prst="rect">
+                <a:avLst/>
+              </a:prstGeom>
+            </p:spPr>
+          </p:pic>
+        </mc:Fallback>
+      </mc:AlternateContent>
+      <mc:AlternateContent xmlns:mc="http://schemas.openxmlformats.org/markup-compatibility/2006">
+        <mc:Choice xmlns:p14="http://schemas.microsoft.com/office/powerpoint/2010/main" Requires="p14">
+          <p:contentPart p14:bwMode="auto" r:id="rId18">
+            <p14:nvContentPartPr>
+              <p14:cNvPr id="41" name="Ink 40">
+                <a:extLst>
+                  <a:ext uri="{FF2B5EF4-FFF2-40B4-BE49-F238E27FC236}">
+                    <a16:creationId xmlns:a16="http://schemas.microsoft.com/office/drawing/2014/main" id="{5F5DB1C6-3FAD-4552-9D7D-EBDB8F8139EA}"/>
+                  </a:ext>
+                </a:extLst>
+              </p14:cNvPr>
+              <p14:cNvContentPartPr/>
+              <p14:nvPr/>
+            </p14:nvContentPartPr>
+            <p14:xfrm>
+              <a:off x="1525867" y="3609822"/>
+              <a:ext cx="257460" cy="360"/>
+            </p14:xfrm>
+          </p:contentPart>
+        </mc:Choice>
+        <mc:Fallback>
+          <p:pic>
+            <p:nvPicPr>
+              <p:cNvPr id="41" name="Ink 40">
+                <a:extLst>
+                  <a:ext uri="{FF2B5EF4-FFF2-40B4-BE49-F238E27FC236}">
+                    <a16:creationId xmlns:a16="http://schemas.microsoft.com/office/drawing/2014/main" id="{5F5DB1C6-3FAD-4552-9D7D-EBDB8F8139EA}"/>
+                  </a:ext>
+                </a:extLst>
+              </p:cNvPr>
+              <p:cNvPicPr/>
+              <p:nvPr/>
+            </p:nvPicPr>
+            <p:blipFill>
+              <a:blip r:embed="rId19"/>
+              <a:stretch>
+                <a:fillRect/>
+              </a:stretch>
+            </p:blipFill>
+            <p:spPr>
+              <a:xfrm>
+                <a:off x="1471930" y="3501822"/>
+                <a:ext cx="364975" cy="216000"/>
+              </a:xfrm>
+              <a:prstGeom prst="rect">
+                <a:avLst/>
+              </a:prstGeom>
+            </p:spPr>
+          </p:pic>
+        </mc:Fallback>
+      </mc:AlternateContent>
+    </p:spTree>
+    <p:extLst>
+      <p:ext uri="{BB962C8B-B14F-4D97-AF65-F5344CB8AC3E}">
+        <p14:creationId xmlns:p14="http://schemas.microsoft.com/office/powerpoint/2010/main" val="4039826392"/>
+      </p:ext>
+    </p:extLst>
+  </p:cSld>
+  <p:clrMapOvr>
+    <a:masterClrMapping/>
+  </p:clrMapOvr>
+</p:sld>
+</file>
+
+<file path=ppt/slides/slide5.xml><?xml version="1.0" encoding="utf-8"?>
+<p:sld xmlns:a="http://schemas.openxmlformats.org/drawingml/2006/main" xmlns:r="http://schemas.openxmlformats.org/officeDocument/2006/relationships" xmlns:p="http://schemas.openxmlformats.org/presentationml/2006/main">
+  <p:cSld>
+    <p:spTree>
+      <p:nvGrpSpPr>
+        <p:cNvPr id="1" name=""/>
+        <p:cNvGrpSpPr/>
+        <p:nvPr/>
+      </p:nvGrpSpPr>
+      <p:grpSpPr>
+        <a:xfrm>
+          <a:off x="0" y="0"/>
+          <a:ext cx="0" cy="0"/>
+          <a:chOff x="0" y="0"/>
+          <a:chExt cx="0" cy="0"/>
+        </a:xfrm>
+      </p:grpSpPr>
+      <p:pic>
+        <p:nvPicPr>
+          <p:cNvPr id="12" name="Picture 11">
+            <a:extLst>
+              <a:ext uri="{FF2B5EF4-FFF2-40B4-BE49-F238E27FC236}">
+                <a16:creationId xmlns:a16="http://schemas.microsoft.com/office/drawing/2014/main" id="{BA7013EA-BD65-48E1-A93C-977760A09120}"/>
+              </a:ext>
+            </a:extLst>
+          </p:cNvPr>
+          <p:cNvPicPr>
+            <a:picLocks noChangeAspect="1"/>
+          </p:cNvPicPr>
+          <p:nvPr/>
+        </p:nvPicPr>
+        <p:blipFill>
+          <a:blip r:embed="rId2"/>
+          <a:stretch>
+            <a:fillRect/>
+          </a:stretch>
+        </p:blipFill>
+        <p:spPr>
+          <a:xfrm>
+            <a:off x="4384699" y="419468"/>
+            <a:ext cx="3196061" cy="3794411"/>
+          </a:xfrm>
+          <a:prstGeom prst="rect">
+            <a:avLst/>
+          </a:prstGeom>
+        </p:spPr>
+      </p:pic>
+      <p:pic>
+        <p:nvPicPr>
+          <p:cNvPr id="8" name="Picture 7">
+            <a:extLst>
+              <a:ext uri="{FF2B5EF4-FFF2-40B4-BE49-F238E27FC236}">
+                <a16:creationId xmlns:a16="http://schemas.microsoft.com/office/drawing/2014/main" id="{5F32F092-8AD0-4E8F-9D93-D77DA7461DD7}"/>
+              </a:ext>
+            </a:extLst>
+          </p:cNvPr>
+          <p:cNvPicPr>
+            <a:picLocks noChangeAspect="1"/>
+          </p:cNvPicPr>
+          <p:nvPr/>
+        </p:nvPicPr>
+        <p:blipFill>
+          <a:blip r:embed="rId3"/>
+          <a:stretch>
+            <a:fillRect/>
+          </a:stretch>
+        </p:blipFill>
+        <p:spPr>
+          <a:xfrm>
+            <a:off x="922421" y="360808"/>
+            <a:ext cx="3462278" cy="3853071"/>
+          </a:xfrm>
+          <a:prstGeom prst="rect">
+            <a:avLst/>
+          </a:prstGeom>
+        </p:spPr>
+      </p:pic>
+    </p:spTree>
+    <p:extLst>
+      <p:ext uri="{BB962C8B-B14F-4D97-AF65-F5344CB8AC3E}">
+        <p14:creationId xmlns:p14="http://schemas.microsoft.com/office/powerpoint/2010/main" val="3730474762"/>
       </p:ext>
     </p:extLst>
   </p:cSld>

</xml_diff>

<commit_message>
Added PDF/SVG graphic for submitting
</commit_message>
<xml_diff>
--- a/Figure Generating/illustration_conclusion.pptx
+++ b/Figure Generating/illustration_conclusion.pptx
@@ -5,21 +5,19 @@
     <p:sldMasterId id="2147483659" r:id="rId1"/>
   </p:sldMasterIdLst>
   <p:notesMasterIdLst>
-    <p:notesMasterId r:id="rId11"/>
+    <p:notesMasterId r:id="rId9"/>
   </p:notesMasterIdLst>
   <p:sldIdLst>
     <p:sldId id="267" r:id="rId2"/>
-    <p:sldId id="269" r:id="rId3"/>
-    <p:sldId id="270" r:id="rId4"/>
-    <p:sldId id="268" r:id="rId5"/>
-    <p:sldId id="262" r:id="rId6"/>
-    <p:sldId id="263" r:id="rId7"/>
-    <p:sldId id="256" r:id="rId8"/>
-    <p:sldId id="265" r:id="rId9"/>
-    <p:sldId id="266" r:id="rId10"/>
+    <p:sldId id="271" r:id="rId3"/>
+    <p:sldId id="269" r:id="rId4"/>
+    <p:sldId id="262" r:id="rId5"/>
+    <p:sldId id="256" r:id="rId6"/>
+    <p:sldId id="265" r:id="rId7"/>
+    <p:sldId id="266" r:id="rId8"/>
   </p:sldIdLst>
   <p:sldSz cx="9144000" cy="5143500" type="screen16x9"/>
-  <p:notesSz cx="6858000" cy="9144000"/>
+  <p:notesSz cx="7315200" cy="9601200"/>
   <p:defaultTextStyle>
     <a:defPPr marR="0" lvl="0" algn="l" rtl="0">
       <a:lnSpc>
@@ -766,8 +764,8 @@
         </p:nvSpPr>
         <p:spPr>
           <a:xfrm>
-            <a:off x="381300" y="685800"/>
-            <a:ext cx="6096075" cy="3429000"/>
+            <a:off x="457200" y="720725"/>
+            <a:ext cx="6400800" cy="3600450"/>
           </a:xfrm>
           <a:custGeom>
             <a:avLst/>
@@ -817,8 +815,8 @@
         </p:nvSpPr>
         <p:spPr>
           <a:xfrm>
-            <a:off x="685800" y="4343400"/>
-            <a:ext cx="5486400" cy="4114800"/>
+            <a:off x="731520" y="4560570"/>
+            <a:ext cx="5852160" cy="4320540"/>
           </a:xfrm>
           <a:prstGeom prst="rect">
             <a:avLst/>
@@ -829,7 +827,7 @@
           </a:ln>
         </p:spPr>
         <p:txBody>
-          <a:bodyPr spcFirstLastPara="1" wrap="square" lIns="91425" tIns="91425" rIns="91425" bIns="91425" anchor="t" anchorCtr="0">
+          <a:bodyPr spcFirstLastPara="1" wrap="square" lIns="96645" tIns="96645" rIns="96645" bIns="96645" anchor="t" anchorCtr="0">
             <a:noAutofit/>
           </a:bodyPr>
           <a:lstStyle>
@@ -1202,8 +1200,8 @@
         </p:nvSpPr>
         <p:spPr>
           <a:xfrm>
-            <a:off x="381000" y="685800"/>
-            <a:ext cx="6096000" cy="3429000"/>
+            <a:off x="457200" y="720725"/>
+            <a:ext cx="6400800" cy="3600450"/>
           </a:xfrm>
           <a:custGeom>
             <a:avLst/>
@@ -1243,26 +1241,20 @@
         </p:nvSpPr>
         <p:spPr>
           <a:xfrm>
-            <a:off x="685800" y="4343400"/>
-            <a:ext cx="5486400" cy="4114800"/>
+            <a:off x="731520" y="4560570"/>
+            <a:ext cx="5852160" cy="4320540"/>
           </a:xfrm>
           <a:prstGeom prst="rect">
             <a:avLst/>
           </a:prstGeom>
         </p:spPr>
         <p:txBody>
-          <a:bodyPr spcFirstLastPara="1" wrap="square" lIns="91425" tIns="91425" rIns="91425" bIns="91425" anchor="t" anchorCtr="0">
+          <a:bodyPr spcFirstLastPara="1" wrap="square" lIns="96645" tIns="96645" rIns="96645" bIns="96645" anchor="t" anchorCtr="0">
             <a:noAutofit/>
           </a:bodyPr>
           <a:lstStyle/>
           <a:p>
-            <a:pPr marL="0" lvl="0" indent="0" algn="l" rtl="0">
-              <a:spcBef>
-                <a:spcPts val="0"/>
-              </a:spcBef>
-              <a:spcAft>
-                <a:spcPts val="0"/>
-              </a:spcAft>
+            <a:pPr marL="0" indent="0">
               <a:buNone/>
             </a:pPr>
             <a:endParaRPr/>
@@ -1311,8 +1303,8 @@
         </p:nvSpPr>
         <p:spPr>
           <a:xfrm>
-            <a:off x="381000" y="685800"/>
-            <a:ext cx="6096000" cy="3429000"/>
+            <a:off x="457200" y="720725"/>
+            <a:ext cx="6400800" cy="3600450"/>
           </a:xfrm>
           <a:custGeom>
             <a:avLst/>
@@ -1352,26 +1344,20 @@
         </p:nvSpPr>
         <p:spPr>
           <a:xfrm>
-            <a:off x="685800" y="4343400"/>
-            <a:ext cx="5486400" cy="4114800"/>
+            <a:off x="731520" y="4560570"/>
+            <a:ext cx="5852160" cy="4320540"/>
           </a:xfrm>
           <a:prstGeom prst="rect">
             <a:avLst/>
           </a:prstGeom>
         </p:spPr>
         <p:txBody>
-          <a:bodyPr spcFirstLastPara="1" wrap="square" lIns="91425" tIns="91425" rIns="91425" bIns="91425" anchor="t" anchorCtr="0">
+          <a:bodyPr spcFirstLastPara="1" wrap="square" lIns="96645" tIns="96645" rIns="96645" bIns="96645" anchor="t" anchorCtr="0">
             <a:noAutofit/>
           </a:bodyPr>
           <a:lstStyle/>
           <a:p>
-            <a:pPr marL="0" lvl="0" indent="0" algn="l" rtl="0">
-              <a:spcBef>
-                <a:spcPts val="0"/>
-              </a:spcBef>
-              <a:spcAft>
-                <a:spcPts val="0"/>
-              </a:spcAft>
+            <a:pPr marL="0" indent="0">
               <a:buNone/>
             </a:pPr>
             <a:endParaRPr/>
@@ -1381,7 +1367,7 @@
     </p:spTree>
     <p:extLst>
       <p:ext uri="{BB962C8B-B14F-4D97-AF65-F5344CB8AC3E}">
-        <p14:creationId xmlns:p14="http://schemas.microsoft.com/office/powerpoint/2010/main" val="2099555246"/>
+        <p14:creationId xmlns:p14="http://schemas.microsoft.com/office/powerpoint/2010/main" val="4271516274"/>
       </p:ext>
     </p:extLst>
   </p:cSld>
@@ -1420,8 +1406,8 @@
         </p:nvSpPr>
         <p:spPr>
           <a:xfrm>
-            <a:off x="381000" y="685800"/>
-            <a:ext cx="6096000" cy="3429000"/>
+            <a:off x="457200" y="720725"/>
+            <a:ext cx="6400800" cy="3600450"/>
           </a:xfrm>
           <a:custGeom>
             <a:avLst/>
@@ -1461,26 +1447,20 @@
         </p:nvSpPr>
         <p:spPr>
           <a:xfrm>
-            <a:off x="685800" y="4343400"/>
-            <a:ext cx="5486400" cy="4114800"/>
+            <a:off x="731520" y="4560570"/>
+            <a:ext cx="5852160" cy="4320540"/>
           </a:xfrm>
           <a:prstGeom prst="rect">
             <a:avLst/>
           </a:prstGeom>
         </p:spPr>
         <p:txBody>
-          <a:bodyPr spcFirstLastPara="1" wrap="square" lIns="91425" tIns="91425" rIns="91425" bIns="91425" anchor="t" anchorCtr="0">
+          <a:bodyPr spcFirstLastPara="1" wrap="square" lIns="96645" tIns="96645" rIns="96645" bIns="96645" anchor="t" anchorCtr="0">
             <a:noAutofit/>
           </a:bodyPr>
           <a:lstStyle/>
           <a:p>
-            <a:pPr marL="0" lvl="0" indent="0" algn="l" rtl="0">
-              <a:spcBef>
-                <a:spcPts val="0"/>
-              </a:spcBef>
-              <a:spcAft>
-                <a:spcPts val="0"/>
-              </a:spcAft>
+            <a:pPr marL="0" indent="0">
               <a:buNone/>
             </a:pPr>
             <a:endParaRPr/>
@@ -5911,6 +5891,896 @@
         </p:nvSpPr>
         <p:spPr>
           <a:xfrm>
+            <a:off x="579708" y="366363"/>
+            <a:ext cx="7984583" cy="4303345"/>
+          </a:xfrm>
+          <a:prstGeom prst="roundRect">
+            <a:avLst>
+              <a:gd name="adj" fmla="val 16667"/>
+            </a:avLst>
+          </a:prstGeom>
+          <a:noFill/>
+          <a:ln w="76200" cap="flat" cmpd="sng">
+            <a:solidFill>
+              <a:srgbClr val="E69138"/>
+            </a:solidFill>
+            <a:prstDash val="solid"/>
+            <a:round/>
+            <a:headEnd type="none" w="sm" len="sm"/>
+            <a:tailEnd type="none" w="sm" len="sm"/>
+          </a:ln>
+        </p:spPr>
+        <p:txBody>
+          <a:bodyPr spcFirstLastPara="1" wrap="square" lIns="91425" tIns="91425" rIns="91425" bIns="91425" anchor="ctr" anchorCtr="0">
+            <a:noAutofit/>
+          </a:bodyPr>
+          <a:lstStyle/>
+          <a:p>
+            <a:pPr marL="0" lvl="0" indent="0" algn="l" rtl="0">
+              <a:spcBef>
+                <a:spcPts val="0"/>
+              </a:spcBef>
+              <a:spcAft>
+                <a:spcPts val="0"/>
+              </a:spcAft>
+              <a:buNone/>
+            </a:pPr>
+            <a:endParaRPr/>
+          </a:p>
+        </p:txBody>
+      </p:sp>
+      <p:sp>
+        <p:nvSpPr>
+          <p:cNvPr id="86" name="Google Shape;86;p16"/>
+          <p:cNvSpPr txBox="1"/>
+          <p:nvPr/>
+        </p:nvSpPr>
+        <p:spPr>
+          <a:xfrm>
+            <a:off x="3099328" y="3403407"/>
+            <a:ext cx="3055629" cy="701469"/>
+          </a:xfrm>
+          <a:prstGeom prst="roundRect">
+            <a:avLst/>
+          </a:prstGeom>
+          <a:solidFill>
+            <a:srgbClr val="92D050"/>
+          </a:solidFill>
+          <a:ln>
+            <a:noFill/>
+          </a:ln>
+        </p:spPr>
+        <p:txBody>
+          <a:bodyPr spcFirstLastPara="1" wrap="square" lIns="9144" tIns="9144" rIns="9144" bIns="9144" anchor="t" anchorCtr="0">
+            <a:spAutoFit/>
+          </a:bodyPr>
+          <a:lstStyle/>
+          <a:p>
+            <a:pPr marL="0" lvl="0" indent="0" algn="ctr" rtl="0">
+              <a:spcBef>
+                <a:spcPts val="0"/>
+              </a:spcBef>
+              <a:spcAft>
+                <a:spcPts val="0"/>
+              </a:spcAft>
+              <a:buNone/>
+            </a:pPr>
+            <a:r>
+              <a:rPr lang="en" sz="2000" b="1" dirty="0">
+                <a:solidFill>
+                  <a:schemeClr val="tx1"/>
+                </a:solidFill>
+              </a:rPr>
+              <a:t>Particle-associated lifestyle</a:t>
+            </a:r>
+            <a:endParaRPr sz="2000" b="1" dirty="0">
+              <a:solidFill>
+                <a:schemeClr val="tx1"/>
+              </a:solidFill>
+            </a:endParaRPr>
+          </a:p>
+        </p:txBody>
+      </p:sp>
+      <p:sp>
+        <p:nvSpPr>
+          <p:cNvPr id="87" name="Google Shape;87;p16"/>
+          <p:cNvSpPr txBox="1"/>
+          <p:nvPr/>
+        </p:nvSpPr>
+        <p:spPr>
+          <a:xfrm>
+            <a:off x="6117092" y="2063338"/>
+            <a:ext cx="2067308" cy="701469"/>
+          </a:xfrm>
+          <a:prstGeom prst="roundRect">
+            <a:avLst/>
+          </a:prstGeom>
+          <a:solidFill>
+            <a:srgbClr val="FF5050"/>
+          </a:solidFill>
+          <a:ln>
+            <a:noFill/>
+          </a:ln>
+        </p:spPr>
+        <p:txBody>
+          <a:bodyPr spcFirstLastPara="1" wrap="square" lIns="9144" tIns="9144" rIns="9144" bIns="9144" anchor="t" anchorCtr="0">
+            <a:spAutoFit/>
+          </a:bodyPr>
+          <a:lstStyle/>
+          <a:p>
+            <a:pPr marL="0" lvl="0" indent="0" algn="ctr" rtl="0">
+              <a:spcBef>
+                <a:spcPts val="0"/>
+              </a:spcBef>
+              <a:spcAft>
+                <a:spcPts val="0"/>
+              </a:spcAft>
+              <a:buNone/>
+            </a:pPr>
+            <a:r>
+              <a:rPr lang="en-US" sz="2000" b="1" dirty="0">
+                <a:solidFill>
+                  <a:schemeClr val="tx1"/>
+                </a:solidFill>
+              </a:rPr>
+              <a:t>Increased genome size</a:t>
+            </a:r>
+          </a:p>
+        </p:txBody>
+      </p:sp>
+      <p:sp>
+        <p:nvSpPr>
+          <p:cNvPr id="91" name="Google Shape;91;p16"/>
+          <p:cNvSpPr txBox="1"/>
+          <p:nvPr/>
+        </p:nvSpPr>
+        <p:spPr>
+          <a:xfrm>
+            <a:off x="2029523" y="4061499"/>
+            <a:ext cx="5456972" cy="469916"/>
+          </a:xfrm>
+          <a:prstGeom prst="roundRect">
+            <a:avLst/>
+          </a:prstGeom>
+          <a:noFill/>
+          <a:ln>
+            <a:noFill/>
+          </a:ln>
+        </p:spPr>
+        <p:style>
+          <a:lnRef idx="2">
+            <a:schemeClr val="accent4"/>
+          </a:lnRef>
+          <a:fillRef idx="1">
+            <a:schemeClr val="lt1"/>
+          </a:fillRef>
+          <a:effectRef idx="0">
+            <a:schemeClr val="accent4"/>
+          </a:effectRef>
+          <a:fontRef idx="minor">
+            <a:schemeClr val="dk1"/>
+          </a:fontRef>
+        </p:style>
+        <p:txBody>
+          <a:bodyPr spcFirstLastPara="1" wrap="square" lIns="27432" tIns="27432" rIns="27432" bIns="27432" anchor="t" anchorCtr="0">
+            <a:spAutoFit/>
+          </a:bodyPr>
+          <a:lstStyle/>
+          <a:p>
+            <a:pPr marL="0" lvl="0" indent="0" algn="ctr" rtl="0">
+              <a:spcBef>
+                <a:spcPts val="0"/>
+              </a:spcBef>
+              <a:spcAft>
+                <a:spcPts val="0"/>
+              </a:spcAft>
+              <a:buClr>
+                <a:schemeClr val="dk1"/>
+              </a:buClr>
+              <a:buSzPts val="1100"/>
+              <a:buFont typeface="Arial"/>
+              <a:buNone/>
+            </a:pPr>
+            <a:r>
+              <a:rPr lang="en" sz="2400" b="1" dirty="0"/>
+              <a:t>A d</a:t>
+            </a:r>
+            <a:r>
+              <a:rPr lang="en" sz="2400" b="1" dirty="0">
+                <a:solidFill>
+                  <a:schemeClr val="dk1"/>
+                </a:solidFill>
+              </a:rPr>
+              <a:t>eep-ocean</a:t>
+            </a:r>
+            <a:r>
+              <a:rPr lang="en-US" sz="2400" b="1" dirty="0">
+                <a:solidFill>
+                  <a:schemeClr val="dk1"/>
+                </a:solidFill>
+              </a:rPr>
+              <a:t> microbial</a:t>
+            </a:r>
+            <a:r>
+              <a:rPr lang="en-US" sz="2400" b="1" dirty="0"/>
+              <a:t> community</a:t>
+            </a:r>
+          </a:p>
+        </p:txBody>
+      </p:sp>
+      <p:sp>
+        <p:nvSpPr>
+          <p:cNvPr id="94" name="Google Shape;94;p16"/>
+          <p:cNvSpPr txBox="1"/>
+          <p:nvPr/>
+        </p:nvSpPr>
+        <p:spPr>
+          <a:xfrm>
+            <a:off x="586055" y="2601487"/>
+            <a:ext cx="2698020" cy="800189"/>
+          </a:xfrm>
+          <a:prstGeom prst="rect">
+            <a:avLst/>
+          </a:prstGeom>
+          <a:noFill/>
+          <a:ln>
+            <a:noFill/>
+          </a:ln>
+        </p:spPr>
+        <p:txBody>
+          <a:bodyPr spcFirstLastPara="1" wrap="square" lIns="91425" tIns="91425" rIns="91425" bIns="91425" anchor="t" anchorCtr="0">
+            <a:spAutoFit/>
+          </a:bodyPr>
+          <a:lstStyle/>
+          <a:p>
+            <a:pPr marL="0" lvl="0" indent="0" algn="ctr" rtl="0">
+              <a:spcBef>
+                <a:spcPts val="0"/>
+              </a:spcBef>
+              <a:spcAft>
+                <a:spcPts val="0"/>
+              </a:spcAft>
+              <a:buNone/>
+            </a:pPr>
+            <a:r>
+              <a:rPr lang="en" sz="2000" b="1" dirty="0">
+                <a:solidFill>
+                  <a:srgbClr val="B45F06"/>
+                </a:solidFill>
+              </a:rPr>
+              <a:t>helps competion </a:t>
+            </a:r>
+          </a:p>
+          <a:p>
+            <a:pPr marL="0" lvl="0" indent="0" algn="ctr" rtl="0">
+              <a:spcBef>
+                <a:spcPts val="0"/>
+              </a:spcBef>
+              <a:spcAft>
+                <a:spcPts val="0"/>
+              </a:spcAft>
+              <a:buNone/>
+            </a:pPr>
+            <a:r>
+              <a:rPr lang="en" sz="2000" b="1" dirty="0">
+                <a:solidFill>
+                  <a:srgbClr val="B45F06"/>
+                </a:solidFill>
+              </a:rPr>
+              <a:t>and defense on</a:t>
+            </a:r>
+            <a:endParaRPr sz="2000" b="1" dirty="0">
+              <a:solidFill>
+                <a:srgbClr val="B45F06"/>
+              </a:solidFill>
+            </a:endParaRPr>
+          </a:p>
+        </p:txBody>
+      </p:sp>
+      <p:sp>
+        <p:nvSpPr>
+          <p:cNvPr id="22" name="Google Shape;85;p16">
+            <a:extLst>
+              <a:ext uri="{FF2B5EF4-FFF2-40B4-BE49-F238E27FC236}">
+                <a16:creationId xmlns:a16="http://schemas.microsoft.com/office/drawing/2014/main" id="{7B3E143E-5E39-4CA1-91FE-5EB3C5A75D11}"/>
+              </a:ext>
+            </a:extLst>
+          </p:cNvPr>
+          <p:cNvSpPr txBox="1"/>
+          <p:nvPr/>
+        </p:nvSpPr>
+        <p:spPr>
+          <a:xfrm>
+            <a:off x="3425307" y="506422"/>
+            <a:ext cx="2293386" cy="612900"/>
+          </a:xfrm>
+          <a:prstGeom prst="roundRect">
+            <a:avLst/>
+          </a:prstGeom>
+          <a:solidFill>
+            <a:schemeClr val="accent1">
+              <a:lumMod val="60000"/>
+              <a:lumOff val="40000"/>
+            </a:schemeClr>
+          </a:solidFill>
+          <a:ln>
+            <a:noFill/>
+          </a:ln>
+        </p:spPr>
+        <p:txBody>
+          <a:bodyPr spcFirstLastPara="1" wrap="square" lIns="91425" tIns="91425" rIns="91425" bIns="91425" anchor="t" anchorCtr="0">
+            <a:spAutoFit/>
+          </a:bodyPr>
+          <a:lstStyle/>
+          <a:p>
+            <a:pPr marL="0" lvl="0" indent="0" algn="ctr" rtl="0">
+              <a:spcBef>
+                <a:spcPts val="0"/>
+              </a:spcBef>
+              <a:spcAft>
+                <a:spcPts val="0"/>
+              </a:spcAft>
+              <a:buNone/>
+            </a:pPr>
+            <a:r>
+              <a:rPr lang="en" sz="2400" b="1" dirty="0">
+                <a:solidFill>
+                  <a:schemeClr val="tx1"/>
+                </a:solidFill>
+              </a:rPr>
+              <a:t>Transposons</a:t>
+            </a:r>
+            <a:endParaRPr sz="2400" b="1" dirty="0">
+              <a:solidFill>
+                <a:schemeClr val="tx1"/>
+              </a:solidFill>
+            </a:endParaRPr>
+          </a:p>
+        </p:txBody>
+      </p:sp>
+      <p:sp>
+        <p:nvSpPr>
+          <p:cNvPr id="18" name="Google Shape;87;p16">
+            <a:extLst>
+              <a:ext uri="{FF2B5EF4-FFF2-40B4-BE49-F238E27FC236}">
+                <a16:creationId xmlns:a16="http://schemas.microsoft.com/office/drawing/2014/main" id="{A7651EED-4922-4FBC-AF26-D9ABA1EA33EE}"/>
+              </a:ext>
+            </a:extLst>
+          </p:cNvPr>
+          <p:cNvSpPr txBox="1"/>
+          <p:nvPr/>
+        </p:nvSpPr>
+        <p:spPr>
+          <a:xfrm>
+            <a:off x="855978" y="1810572"/>
+            <a:ext cx="2698019" cy="701469"/>
+          </a:xfrm>
+          <a:prstGeom prst="roundRect">
+            <a:avLst/>
+          </a:prstGeom>
+          <a:solidFill>
+            <a:srgbClr val="FF5050"/>
+          </a:solidFill>
+          <a:ln>
+            <a:noFill/>
+          </a:ln>
+        </p:spPr>
+        <p:txBody>
+          <a:bodyPr spcFirstLastPara="1" wrap="square" lIns="9144" tIns="9144" rIns="9144" bIns="9144" anchor="t" anchorCtr="0">
+            <a:spAutoFit/>
+          </a:bodyPr>
+          <a:lstStyle/>
+          <a:p>
+            <a:pPr marL="0" lvl="0" indent="0" algn="ctr" rtl="0">
+              <a:spcBef>
+                <a:spcPts val="0"/>
+              </a:spcBef>
+              <a:spcAft>
+                <a:spcPts val="0"/>
+              </a:spcAft>
+              <a:buNone/>
+            </a:pPr>
+            <a:r>
+              <a:rPr lang="en-US" sz="2000" b="1" dirty="0">
+                <a:solidFill>
+                  <a:schemeClr val="tx1"/>
+                </a:solidFill>
+              </a:rPr>
+              <a:t>Defense mechanism</a:t>
+            </a:r>
+          </a:p>
+          <a:p>
+            <a:pPr marL="0" lvl="0" indent="0" algn="ctr" rtl="0">
+              <a:spcBef>
+                <a:spcPts val="0"/>
+              </a:spcBef>
+              <a:spcAft>
+                <a:spcPts val="0"/>
+              </a:spcAft>
+              <a:buNone/>
+            </a:pPr>
+            <a:r>
+              <a:rPr lang="en-US" sz="2000" b="1" dirty="0">
+                <a:solidFill>
+                  <a:schemeClr val="tx1"/>
+                </a:solidFill>
+              </a:rPr>
+              <a:t>cassettes</a:t>
+            </a:r>
+          </a:p>
+        </p:txBody>
+      </p:sp>
+      <p:cxnSp>
+        <p:nvCxnSpPr>
+          <p:cNvPr id="19" name="Google Shape;90;p16">
+            <a:extLst>
+              <a:ext uri="{FF2B5EF4-FFF2-40B4-BE49-F238E27FC236}">
+                <a16:creationId xmlns:a16="http://schemas.microsoft.com/office/drawing/2014/main" id="{22CBA851-C115-40B9-ADAB-04C0469F5801}"/>
+              </a:ext>
+            </a:extLst>
+          </p:cNvPr>
+          <p:cNvCxnSpPr>
+            <a:cxnSpLocks/>
+          </p:cNvCxnSpPr>
+          <p:nvPr/>
+        </p:nvCxnSpPr>
+        <p:spPr>
+          <a:xfrm flipV="1">
+            <a:off x="4758009" y="1262253"/>
+            <a:ext cx="0" cy="2044390"/>
+          </a:xfrm>
+          <a:prstGeom prst="straightConnector1">
+            <a:avLst/>
+          </a:prstGeom>
+          <a:noFill/>
+          <a:ln w="57150" cap="flat" cmpd="sng">
+            <a:solidFill>
+              <a:schemeClr val="tx1"/>
+            </a:solidFill>
+            <a:prstDash val="solid"/>
+            <a:round/>
+            <a:headEnd type="none" w="med" len="med"/>
+            <a:tailEnd type="triangle" w="med" len="med"/>
+          </a:ln>
+        </p:spPr>
+      </p:cxnSp>
+      <p:sp>
+        <p:nvSpPr>
+          <p:cNvPr id="92" name="Google Shape;92;p16"/>
+          <p:cNvSpPr txBox="1"/>
+          <p:nvPr/>
+        </p:nvSpPr>
+        <p:spPr>
+          <a:xfrm>
+            <a:off x="4177200" y="2088257"/>
+            <a:ext cx="1161617" cy="357021"/>
+          </a:xfrm>
+          <a:prstGeom prst="rect">
+            <a:avLst/>
+          </a:prstGeom>
+          <a:solidFill>
+            <a:schemeClr val="bg1"/>
+          </a:solidFill>
+          <a:ln>
+            <a:noFill/>
+          </a:ln>
+        </p:spPr>
+        <p:txBody>
+          <a:bodyPr spcFirstLastPara="1" wrap="square" lIns="18288" tIns="9144" rIns="9144" bIns="9144" anchor="t" anchorCtr="0">
+            <a:spAutoFit/>
+          </a:bodyPr>
+          <a:lstStyle/>
+          <a:p>
+            <a:pPr marL="0" lvl="0" indent="0" algn="l" rtl="0">
+              <a:spcBef>
+                <a:spcPts val="0"/>
+              </a:spcBef>
+              <a:spcAft>
+                <a:spcPts val="0"/>
+              </a:spcAft>
+              <a:buNone/>
+            </a:pPr>
+            <a:r>
+              <a:rPr lang="en" sz="2200" b="1" dirty="0">
+                <a:solidFill>
+                  <a:srgbClr val="B45F06"/>
+                </a:solidFill>
+              </a:rPr>
+              <a:t>spreads</a:t>
+            </a:r>
+            <a:endParaRPr sz="2200" b="1" dirty="0">
+              <a:solidFill>
+                <a:srgbClr val="B45F06"/>
+              </a:solidFill>
+            </a:endParaRPr>
+          </a:p>
+        </p:txBody>
+      </p:sp>
+      <p:sp>
+        <p:nvSpPr>
+          <p:cNvPr id="85" name="Google Shape;92;p16">
+            <a:extLst>
+              <a:ext uri="{FF2B5EF4-FFF2-40B4-BE49-F238E27FC236}">
+                <a16:creationId xmlns:a16="http://schemas.microsoft.com/office/drawing/2014/main" id="{66075C9D-718F-4083-9BDF-0C4A805AF14D}"/>
+              </a:ext>
+            </a:extLst>
+          </p:cNvPr>
+          <p:cNvSpPr txBox="1"/>
+          <p:nvPr/>
+        </p:nvSpPr>
+        <p:spPr>
+          <a:xfrm>
+            <a:off x="2350066" y="1075423"/>
+            <a:ext cx="813573" cy="387798"/>
+          </a:xfrm>
+          <a:prstGeom prst="rect">
+            <a:avLst/>
+          </a:prstGeom>
+          <a:solidFill>
+            <a:schemeClr val="bg1"/>
+          </a:solidFill>
+          <a:ln>
+            <a:noFill/>
+          </a:ln>
+        </p:spPr>
+        <p:txBody>
+          <a:bodyPr spcFirstLastPara="1" wrap="square" lIns="18288" tIns="9144" rIns="9144" bIns="9144" anchor="t" anchorCtr="0">
+            <a:spAutoFit/>
+          </a:bodyPr>
+          <a:lstStyle/>
+          <a:p>
+            <a:pPr marL="0" lvl="0" indent="0" algn="l" rtl="0">
+              <a:spcBef>
+                <a:spcPts val="0"/>
+              </a:spcBef>
+              <a:spcAft>
+                <a:spcPts val="0"/>
+              </a:spcAft>
+              <a:buNone/>
+            </a:pPr>
+            <a:r>
+              <a:rPr lang="en" sz="2400" b="1" dirty="0">
+                <a:solidFill>
+                  <a:srgbClr val="B45F06"/>
+                </a:solidFill>
+              </a:rPr>
+              <a:t>carry</a:t>
+            </a:r>
+            <a:endParaRPr sz="2000" b="1" dirty="0">
+              <a:solidFill>
+                <a:srgbClr val="B45F06"/>
+              </a:solidFill>
+            </a:endParaRPr>
+          </a:p>
+        </p:txBody>
+      </p:sp>
+      <p:cxnSp>
+        <p:nvCxnSpPr>
+          <p:cNvPr id="23" name="Google Shape;90;p16">
+            <a:extLst>
+              <a:ext uri="{FF2B5EF4-FFF2-40B4-BE49-F238E27FC236}">
+                <a16:creationId xmlns:a16="http://schemas.microsoft.com/office/drawing/2014/main" id="{76FF781D-A53E-4BB3-9AED-568798FAB34C}"/>
+              </a:ext>
+            </a:extLst>
+          </p:cNvPr>
+          <p:cNvCxnSpPr>
+            <a:cxnSpLocks/>
+          </p:cNvCxnSpPr>
+          <p:nvPr/>
+        </p:nvCxnSpPr>
+        <p:spPr>
+          <a:xfrm flipV="1">
+            <a:off x="6075184" y="2850112"/>
+            <a:ext cx="395391" cy="451118"/>
+          </a:xfrm>
+          <a:prstGeom prst="straightConnector1">
+            <a:avLst/>
+          </a:prstGeom>
+          <a:noFill/>
+          <a:ln w="57150" cap="flat" cmpd="sng">
+            <a:solidFill>
+              <a:schemeClr val="tx1"/>
+            </a:solidFill>
+            <a:prstDash val="solid"/>
+            <a:round/>
+            <a:headEnd type="none" w="med" len="med"/>
+            <a:tailEnd type="triangle" w="med" len="med"/>
+          </a:ln>
+        </p:spPr>
+      </p:cxnSp>
+      <p:cxnSp>
+        <p:nvCxnSpPr>
+          <p:cNvPr id="27" name="Google Shape;90;p16">
+            <a:extLst>
+              <a:ext uri="{FF2B5EF4-FFF2-40B4-BE49-F238E27FC236}">
+                <a16:creationId xmlns:a16="http://schemas.microsoft.com/office/drawing/2014/main" id="{504468A2-3D05-4A3A-AF43-09B4F3D13B62}"/>
+              </a:ext>
+            </a:extLst>
+          </p:cNvPr>
+          <p:cNvCxnSpPr>
+            <a:cxnSpLocks/>
+          </p:cNvCxnSpPr>
+          <p:nvPr/>
+        </p:nvCxnSpPr>
+        <p:spPr>
+          <a:xfrm flipH="1" flipV="1">
+            <a:off x="5692780" y="1204332"/>
+            <a:ext cx="685873" cy="754414"/>
+          </a:xfrm>
+          <a:prstGeom prst="straightConnector1">
+            <a:avLst/>
+          </a:prstGeom>
+          <a:noFill/>
+          <a:ln w="57150" cap="flat" cmpd="sng">
+            <a:solidFill>
+              <a:schemeClr val="tx1"/>
+            </a:solidFill>
+            <a:prstDash val="solid"/>
+            <a:round/>
+            <a:headEnd type="none" w="med" len="med"/>
+            <a:tailEnd type="triangle" w="med" len="med"/>
+          </a:ln>
+        </p:spPr>
+      </p:cxnSp>
+      <p:cxnSp>
+        <p:nvCxnSpPr>
+          <p:cNvPr id="32" name="Google Shape;90;p16">
+            <a:extLst>
+              <a:ext uri="{FF2B5EF4-FFF2-40B4-BE49-F238E27FC236}">
+                <a16:creationId xmlns:a16="http://schemas.microsoft.com/office/drawing/2014/main" id="{6C50CF6E-766B-4443-96CC-5CCE6111D1DD}"/>
+              </a:ext>
+            </a:extLst>
+          </p:cNvPr>
+          <p:cNvCxnSpPr>
+            <a:cxnSpLocks/>
+          </p:cNvCxnSpPr>
+          <p:nvPr/>
+        </p:nvCxnSpPr>
+        <p:spPr>
+          <a:xfrm flipH="1">
+            <a:off x="2981248" y="1247182"/>
+            <a:ext cx="364118" cy="435676"/>
+          </a:xfrm>
+          <a:prstGeom prst="straightConnector1">
+            <a:avLst/>
+          </a:prstGeom>
+          <a:noFill/>
+          <a:ln w="57150" cap="flat" cmpd="sng">
+            <a:solidFill>
+              <a:schemeClr val="tx1"/>
+            </a:solidFill>
+            <a:prstDash val="solid"/>
+            <a:round/>
+            <a:headEnd type="none" w="med" len="med"/>
+            <a:tailEnd type="triangle" w="med" len="med"/>
+          </a:ln>
+        </p:spPr>
+      </p:cxnSp>
+      <p:sp>
+        <p:nvSpPr>
+          <p:cNvPr id="34" name="Google Shape;94;p16">
+            <a:extLst>
+              <a:ext uri="{FF2B5EF4-FFF2-40B4-BE49-F238E27FC236}">
+                <a16:creationId xmlns:a16="http://schemas.microsoft.com/office/drawing/2014/main" id="{DCD89C29-9457-47D3-927E-17082DE3893D}"/>
+              </a:ext>
+            </a:extLst>
+          </p:cNvPr>
+          <p:cNvSpPr txBox="1"/>
+          <p:nvPr/>
+        </p:nvSpPr>
+        <p:spPr>
+          <a:xfrm>
+            <a:off x="6224186" y="2930487"/>
+            <a:ext cx="2001151" cy="492412"/>
+          </a:xfrm>
+          <a:prstGeom prst="rect">
+            <a:avLst/>
+          </a:prstGeom>
+          <a:noFill/>
+          <a:ln>
+            <a:noFill/>
+          </a:ln>
+        </p:spPr>
+        <p:txBody>
+          <a:bodyPr spcFirstLastPara="1" wrap="square" lIns="91425" tIns="91425" rIns="91425" bIns="91425" anchor="t" anchorCtr="0">
+            <a:spAutoFit/>
+          </a:bodyPr>
+          <a:lstStyle/>
+          <a:p>
+            <a:pPr marL="0" lvl="0" indent="0" algn="ctr" rtl="0">
+              <a:spcBef>
+                <a:spcPts val="0"/>
+              </a:spcBef>
+              <a:spcAft>
+                <a:spcPts val="0"/>
+              </a:spcAft>
+              <a:buNone/>
+            </a:pPr>
+            <a:r>
+              <a:rPr lang="en" sz="2000" b="1" dirty="0">
+                <a:solidFill>
+                  <a:srgbClr val="B45F06"/>
+                </a:solidFill>
+              </a:rPr>
+              <a:t>correlates with</a:t>
+            </a:r>
+            <a:endParaRPr sz="2000" b="1" dirty="0">
+              <a:solidFill>
+                <a:srgbClr val="B45F06"/>
+              </a:solidFill>
+            </a:endParaRPr>
+          </a:p>
+        </p:txBody>
+      </p:sp>
+      <p:cxnSp>
+        <p:nvCxnSpPr>
+          <p:cNvPr id="39" name="Google Shape;90;p16">
+            <a:extLst>
+              <a:ext uri="{FF2B5EF4-FFF2-40B4-BE49-F238E27FC236}">
+                <a16:creationId xmlns:a16="http://schemas.microsoft.com/office/drawing/2014/main" id="{685EE98C-7DD8-4753-88C2-B34CD93CD22B}"/>
+              </a:ext>
+            </a:extLst>
+          </p:cNvPr>
+          <p:cNvCxnSpPr>
+            <a:cxnSpLocks/>
+          </p:cNvCxnSpPr>
+          <p:nvPr/>
+        </p:nvCxnSpPr>
+        <p:spPr>
+          <a:xfrm>
+            <a:off x="2911325" y="2608805"/>
+            <a:ext cx="624333" cy="692425"/>
+          </a:xfrm>
+          <a:prstGeom prst="straightConnector1">
+            <a:avLst/>
+          </a:prstGeom>
+          <a:noFill/>
+          <a:ln w="57150" cap="flat" cmpd="sng">
+            <a:solidFill>
+              <a:schemeClr val="tx1"/>
+            </a:solidFill>
+            <a:prstDash val="solid"/>
+            <a:round/>
+            <a:headEnd type="none" w="med" len="med"/>
+            <a:tailEnd type="triangle" w="med" len="med"/>
+          </a:ln>
+        </p:spPr>
+      </p:cxnSp>
+      <p:sp>
+        <p:nvSpPr>
+          <p:cNvPr id="45" name="Google Shape;94;p16">
+            <a:extLst>
+              <a:ext uri="{FF2B5EF4-FFF2-40B4-BE49-F238E27FC236}">
+                <a16:creationId xmlns:a16="http://schemas.microsoft.com/office/drawing/2014/main" id="{1A202B5C-1CC3-4616-A646-65D56D25AA2C}"/>
+              </a:ext>
+            </a:extLst>
+          </p:cNvPr>
+          <p:cNvSpPr txBox="1"/>
+          <p:nvPr/>
+        </p:nvSpPr>
+        <p:spPr>
+          <a:xfrm>
+            <a:off x="5980361" y="896573"/>
+            <a:ext cx="2447987" cy="1107965"/>
+          </a:xfrm>
+          <a:prstGeom prst="rect">
+            <a:avLst/>
+          </a:prstGeom>
+          <a:noFill/>
+          <a:ln>
+            <a:noFill/>
+          </a:ln>
+        </p:spPr>
+        <p:txBody>
+          <a:bodyPr spcFirstLastPara="1" wrap="square" lIns="91425" tIns="91425" rIns="91425" bIns="91425" anchor="t" anchorCtr="0">
+            <a:spAutoFit/>
+          </a:bodyPr>
+          <a:lstStyle/>
+          <a:p>
+            <a:pPr marL="0" lvl="0" indent="0" algn="ctr" rtl="0">
+              <a:spcBef>
+                <a:spcPts val="0"/>
+              </a:spcBef>
+              <a:spcAft>
+                <a:spcPts val="0"/>
+              </a:spcAft>
+              <a:buNone/>
+            </a:pPr>
+            <a:r>
+              <a:rPr lang="en-US" sz="2000" b="1" dirty="0">
+                <a:solidFill>
+                  <a:srgbClr val="B45F06"/>
+                </a:solidFill>
+              </a:rPr>
+              <a:t>b</a:t>
+            </a:r>
+            <a:r>
+              <a:rPr lang="en" sz="2000" b="1" dirty="0">
+                <a:solidFill>
+                  <a:srgbClr val="B45F06"/>
+                </a:solidFill>
+              </a:rPr>
+              <a:t>uffers distruptive </a:t>
+            </a:r>
+          </a:p>
+          <a:p>
+            <a:pPr marL="0" lvl="0" indent="0" algn="ctr" rtl="0">
+              <a:spcBef>
+                <a:spcPts val="0"/>
+              </a:spcBef>
+              <a:spcAft>
+                <a:spcPts val="0"/>
+              </a:spcAft>
+              <a:buNone/>
+            </a:pPr>
+            <a:r>
+              <a:rPr lang="en-US" sz="2000" b="1" dirty="0">
+                <a:solidFill>
+                  <a:srgbClr val="B45F06"/>
+                </a:solidFill>
+              </a:rPr>
+              <a:t>transpositions</a:t>
+            </a:r>
+          </a:p>
+          <a:p>
+            <a:pPr marL="0" lvl="0" indent="0" algn="ctr" rtl="0">
+              <a:spcBef>
+                <a:spcPts val="0"/>
+              </a:spcBef>
+              <a:spcAft>
+                <a:spcPts val="0"/>
+              </a:spcAft>
+              <a:buNone/>
+            </a:pPr>
+            <a:r>
+              <a:rPr lang="en" sz="2000" b="1" dirty="0">
+                <a:solidFill>
+                  <a:srgbClr val="B45F06"/>
+                </a:solidFill>
+              </a:rPr>
+              <a:t>caused by</a:t>
+            </a:r>
+          </a:p>
+        </p:txBody>
+      </p:sp>
+    </p:spTree>
+    <p:extLst>
+      <p:ext uri="{BB962C8B-B14F-4D97-AF65-F5344CB8AC3E}">
+        <p14:creationId xmlns:p14="http://schemas.microsoft.com/office/powerpoint/2010/main" val="2476497050"/>
+      </p:ext>
+    </p:extLst>
+  </p:cSld>
+  <p:clrMapOvr>
+    <a:masterClrMapping/>
+  </p:clrMapOvr>
+</p:sld>
+</file>
+
+<file path=ppt/slides/slide2.xml><?xml version="1.0" encoding="utf-8"?>
+<p:sld xmlns:a="http://schemas.openxmlformats.org/drawingml/2006/main" xmlns:r="http://schemas.openxmlformats.org/officeDocument/2006/relationships" xmlns:p="http://schemas.openxmlformats.org/presentationml/2006/main">
+  <p:cSld>
+    <p:spTree>
+      <p:nvGrpSpPr>
+        <p:cNvPr id="1" name="Shape 83"/>
+        <p:cNvGrpSpPr/>
+        <p:nvPr/>
+      </p:nvGrpSpPr>
+      <p:grpSpPr>
+        <a:xfrm>
+          <a:off x="0" y="0"/>
+          <a:ext cx="0" cy="0"/>
+          <a:chOff x="0" y="0"/>
+          <a:chExt cx="0" cy="0"/>
+        </a:xfrm>
+      </p:grpSpPr>
+      <p:sp>
+        <p:nvSpPr>
+          <p:cNvPr id="84" name="Google Shape;84;p16"/>
+          <p:cNvSpPr/>
+          <p:nvPr/>
+        </p:nvSpPr>
+        <p:spPr>
+          <a:xfrm>
             <a:off x="2393485" y="633993"/>
             <a:ext cx="4798647" cy="2637031"/>
           </a:xfrm>
@@ -6766,7 +7636,7 @@
     </p:spTree>
     <p:extLst>
       <p:ext uri="{BB962C8B-B14F-4D97-AF65-F5344CB8AC3E}">
-        <p14:creationId xmlns:p14="http://schemas.microsoft.com/office/powerpoint/2010/main" val="2476497050"/>
+        <p14:creationId xmlns:p14="http://schemas.microsoft.com/office/powerpoint/2010/main" val="2943934902"/>
       </p:ext>
     </p:extLst>
   </p:cSld>
@@ -6776,7 +7646,7 @@
 </p:sld>
 </file>
 
-<file path=ppt/slides/slide2.xml><?xml version="1.0" encoding="utf-8"?>
+<file path=ppt/slides/slide3.xml><?xml version="1.0" encoding="utf-8"?>
 <p:sld xmlns:a="http://schemas.openxmlformats.org/drawingml/2006/main" xmlns:r="http://schemas.openxmlformats.org/officeDocument/2006/relationships" xmlns:p="http://schemas.openxmlformats.org/presentationml/2006/main">
   <p:cSld>
     <p:spTree>
@@ -7166,1008 +8036,7 @@
 </p:sld>
 </file>
 
-<file path=ppt/slides/slide3.xml><?xml version="1.0" encoding="utf-8"?>
-<p:sld xmlns:a="http://schemas.openxmlformats.org/drawingml/2006/main" xmlns:r="http://schemas.openxmlformats.org/officeDocument/2006/relationships" xmlns:p="http://schemas.openxmlformats.org/presentationml/2006/main">
-  <p:cSld>
-    <p:spTree>
-      <p:nvGrpSpPr>
-        <p:cNvPr id="1" name=""/>
-        <p:cNvGrpSpPr/>
-        <p:nvPr/>
-      </p:nvGrpSpPr>
-      <p:grpSpPr>
-        <a:xfrm>
-          <a:off x="0" y="0"/>
-          <a:ext cx="0" cy="0"/>
-          <a:chOff x="0" y="0"/>
-          <a:chExt cx="0" cy="0"/>
-        </a:xfrm>
-      </p:grpSpPr>
-      <p:sp>
-        <p:nvSpPr>
-          <p:cNvPr id="2" name="Title 1">
-            <a:extLst>
-              <a:ext uri="{FF2B5EF4-FFF2-40B4-BE49-F238E27FC236}">
-                <a16:creationId xmlns:a16="http://schemas.microsoft.com/office/drawing/2014/main" id="{0BC1151D-3F67-41C1-A5A1-EC00F3520517}"/>
-              </a:ext>
-            </a:extLst>
-          </p:cNvPr>
-          <p:cNvSpPr>
-            <a:spLocks noGrp="1"/>
-          </p:cNvSpPr>
-          <p:nvPr>
-            <p:ph type="title"/>
-          </p:nvPr>
-        </p:nvSpPr>
-        <p:spPr/>
-        <p:txBody>
-          <a:bodyPr/>
-          <a:lstStyle/>
-          <a:p>
-            <a:endParaRPr lang="en-US"/>
-          </a:p>
-        </p:txBody>
-      </p:sp>
-    </p:spTree>
-    <p:extLst>
-      <p:ext uri="{BB962C8B-B14F-4D97-AF65-F5344CB8AC3E}">
-        <p14:creationId xmlns:p14="http://schemas.microsoft.com/office/powerpoint/2010/main" val="791765194"/>
-      </p:ext>
-    </p:extLst>
-  </p:cSld>
-  <p:clrMapOvr>
-    <a:masterClrMapping/>
-  </p:clrMapOvr>
-</p:sld>
-</file>
-
 <file path=ppt/slides/slide4.xml><?xml version="1.0" encoding="utf-8"?>
-<p:sld xmlns:a="http://schemas.openxmlformats.org/drawingml/2006/main" xmlns:r="http://schemas.openxmlformats.org/officeDocument/2006/relationships" xmlns:p="http://schemas.openxmlformats.org/presentationml/2006/main">
-  <p:cSld>
-    <p:spTree>
-      <p:nvGrpSpPr>
-        <p:cNvPr id="1" name="Shape 83"/>
-        <p:cNvGrpSpPr/>
-        <p:nvPr/>
-      </p:nvGrpSpPr>
-      <p:grpSpPr>
-        <a:xfrm>
-          <a:off x="0" y="0"/>
-          <a:ext cx="0" cy="0"/>
-          <a:chOff x="0" y="0"/>
-          <a:chExt cx="0" cy="0"/>
-        </a:xfrm>
-      </p:grpSpPr>
-      <p:sp>
-        <p:nvSpPr>
-          <p:cNvPr id="84" name="Google Shape;84;p16"/>
-          <p:cNvSpPr/>
-          <p:nvPr/>
-        </p:nvSpPr>
-        <p:spPr>
-          <a:xfrm>
-            <a:off x="2243015" y="667038"/>
-            <a:ext cx="4798647" cy="2812907"/>
-          </a:xfrm>
-          <a:prstGeom prst="roundRect">
-            <a:avLst>
-              <a:gd name="adj" fmla="val 16667"/>
-            </a:avLst>
-          </a:prstGeom>
-          <a:noFill/>
-          <a:ln w="76200" cap="flat" cmpd="sng">
-            <a:solidFill>
-              <a:srgbClr val="E69138"/>
-            </a:solidFill>
-            <a:prstDash val="solid"/>
-            <a:round/>
-            <a:headEnd type="none" w="sm" len="sm"/>
-            <a:tailEnd type="none" w="sm" len="sm"/>
-          </a:ln>
-        </p:spPr>
-        <p:txBody>
-          <a:bodyPr spcFirstLastPara="1" wrap="square" lIns="91425" tIns="91425" rIns="91425" bIns="91425" anchor="ctr" anchorCtr="0">
-            <a:noAutofit/>
-          </a:bodyPr>
-          <a:lstStyle/>
-          <a:p>
-            <a:pPr marL="0" lvl="0" indent="0" algn="l" rtl="0">
-              <a:spcBef>
-                <a:spcPts val="0"/>
-              </a:spcBef>
-              <a:spcAft>
-                <a:spcPts val="0"/>
-              </a:spcAft>
-              <a:buNone/>
-            </a:pPr>
-            <a:endParaRPr/>
-          </a:p>
-        </p:txBody>
-      </p:sp>
-      <p:sp>
-        <p:nvSpPr>
-          <p:cNvPr id="86" name="Google Shape;86;p16"/>
-          <p:cNvSpPr txBox="1"/>
-          <p:nvPr/>
-        </p:nvSpPr>
-        <p:spPr>
-          <a:xfrm>
-            <a:off x="3942647" y="843042"/>
-            <a:ext cx="1632963" cy="429054"/>
-          </a:xfrm>
-          <a:prstGeom prst="roundRect">
-            <a:avLst/>
-          </a:prstGeom>
-          <a:solidFill>
-            <a:srgbClr val="92D050"/>
-          </a:solidFill>
-          <a:ln>
-            <a:noFill/>
-          </a:ln>
-        </p:spPr>
-        <p:txBody>
-          <a:bodyPr spcFirstLastPara="1" wrap="square" lIns="9144" tIns="9144" rIns="9144" bIns="9144" anchor="t" anchorCtr="0">
-            <a:spAutoFit/>
-          </a:bodyPr>
-          <a:lstStyle/>
-          <a:p>
-            <a:pPr marL="0" lvl="0" indent="0" algn="ctr" rtl="0">
-              <a:spcBef>
-                <a:spcPts val="0"/>
-              </a:spcBef>
-              <a:spcAft>
-                <a:spcPts val="0"/>
-              </a:spcAft>
-              <a:buNone/>
-            </a:pPr>
-            <a:r>
-              <a:rPr lang="en" sz="1200" b="1" dirty="0">
-                <a:solidFill>
-                  <a:schemeClr val="tx1"/>
-                </a:solidFill>
-              </a:rPr>
-              <a:t>Particle-associated lifestyle</a:t>
-            </a:r>
-            <a:endParaRPr sz="1200" b="1" dirty="0">
-              <a:solidFill>
-                <a:schemeClr val="tx1"/>
-              </a:solidFill>
-            </a:endParaRPr>
-          </a:p>
-        </p:txBody>
-      </p:sp>
-      <p:sp>
-        <p:nvSpPr>
-          <p:cNvPr id="87" name="Google Shape;87;p16"/>
-          <p:cNvSpPr txBox="1"/>
-          <p:nvPr/>
-        </p:nvSpPr>
-        <p:spPr>
-          <a:xfrm>
-            <a:off x="5329469" y="1555299"/>
-            <a:ext cx="1108844" cy="633365"/>
-          </a:xfrm>
-          <a:prstGeom prst="roundRect">
-            <a:avLst/>
-          </a:prstGeom>
-          <a:solidFill>
-            <a:srgbClr val="FF5050"/>
-          </a:solidFill>
-          <a:ln>
-            <a:noFill/>
-          </a:ln>
-        </p:spPr>
-        <p:txBody>
-          <a:bodyPr spcFirstLastPara="1" wrap="square" lIns="9144" tIns="9144" rIns="9144" bIns="9144" anchor="t" anchorCtr="0">
-            <a:spAutoFit/>
-          </a:bodyPr>
-          <a:lstStyle/>
-          <a:p>
-            <a:pPr marL="0" lvl="0" indent="0" algn="ctr" rtl="0">
-              <a:spcBef>
-                <a:spcPts val="0"/>
-              </a:spcBef>
-              <a:spcAft>
-                <a:spcPts val="0"/>
-              </a:spcAft>
-              <a:buNone/>
-            </a:pPr>
-            <a:r>
-              <a:rPr lang="en" sz="1200" b="1" dirty="0">
-                <a:solidFill>
-                  <a:schemeClr val="tx1"/>
-                </a:solidFill>
-              </a:rPr>
-              <a:t>Defense</a:t>
-            </a:r>
-          </a:p>
-          <a:p>
-            <a:pPr marL="0" lvl="0" indent="0" algn="ctr" rtl="0">
-              <a:spcBef>
-                <a:spcPts val="0"/>
-              </a:spcBef>
-              <a:spcAft>
-                <a:spcPts val="0"/>
-              </a:spcAft>
-              <a:buNone/>
-            </a:pPr>
-            <a:r>
-              <a:rPr lang="en-US" sz="1200" b="1" dirty="0">
-                <a:solidFill>
-                  <a:schemeClr val="tx1"/>
-                </a:solidFill>
-              </a:rPr>
-              <a:t>m</a:t>
-            </a:r>
-            <a:r>
-              <a:rPr lang="en" sz="1200" b="1" dirty="0">
-                <a:solidFill>
-                  <a:schemeClr val="tx1"/>
-                </a:solidFill>
-              </a:rPr>
-              <a:t>echanism</a:t>
-            </a:r>
-          </a:p>
-          <a:p>
-            <a:pPr marL="0" lvl="0" indent="0" algn="ctr" rtl="0">
-              <a:spcBef>
-                <a:spcPts val="0"/>
-              </a:spcBef>
-              <a:spcAft>
-                <a:spcPts val="0"/>
-              </a:spcAft>
-              <a:buNone/>
-            </a:pPr>
-            <a:r>
-              <a:rPr lang="en" sz="1200" b="1" dirty="0">
-                <a:solidFill>
-                  <a:schemeClr val="tx1"/>
-                </a:solidFill>
-              </a:rPr>
-              <a:t>cassettes</a:t>
-            </a:r>
-            <a:endParaRPr sz="1200" b="1" dirty="0">
-              <a:solidFill>
-                <a:schemeClr val="tx1"/>
-              </a:solidFill>
-            </a:endParaRPr>
-          </a:p>
-        </p:txBody>
-      </p:sp>
-      <p:sp>
-        <p:nvSpPr>
-          <p:cNvPr id="91" name="Google Shape;91;p16"/>
-          <p:cNvSpPr txBox="1"/>
-          <p:nvPr/>
-        </p:nvSpPr>
-        <p:spPr>
-          <a:xfrm>
-            <a:off x="2844714" y="3065139"/>
-            <a:ext cx="3808346" cy="299657"/>
-          </a:xfrm>
-          <a:prstGeom prst="roundRect">
-            <a:avLst/>
-          </a:prstGeom>
-          <a:noFill/>
-          <a:ln>
-            <a:noFill/>
-          </a:ln>
-        </p:spPr>
-        <p:style>
-          <a:lnRef idx="2">
-            <a:schemeClr val="accent4"/>
-          </a:lnRef>
-          <a:fillRef idx="1">
-            <a:schemeClr val="lt1"/>
-          </a:fillRef>
-          <a:effectRef idx="0">
-            <a:schemeClr val="accent4"/>
-          </a:effectRef>
-          <a:fontRef idx="minor">
-            <a:schemeClr val="dk1"/>
-          </a:fontRef>
-        </p:style>
-        <p:txBody>
-          <a:bodyPr spcFirstLastPara="1" wrap="square" lIns="27432" tIns="27432" rIns="27432" bIns="27432" anchor="t" anchorCtr="0">
-            <a:spAutoFit/>
-          </a:bodyPr>
-          <a:lstStyle/>
-          <a:p>
-            <a:pPr marL="0" lvl="0" indent="0" algn="ctr" rtl="0">
-              <a:spcBef>
-                <a:spcPts val="0"/>
-              </a:spcBef>
-              <a:spcAft>
-                <a:spcPts val="0"/>
-              </a:spcAft>
-              <a:buClr>
-                <a:schemeClr val="dk1"/>
-              </a:buClr>
-              <a:buSzPts val="1100"/>
-              <a:buFont typeface="Arial"/>
-              <a:buNone/>
-            </a:pPr>
-            <a:r>
-              <a:rPr lang="en" b="1" dirty="0"/>
-              <a:t>A d</a:t>
-            </a:r>
-            <a:r>
-              <a:rPr lang="en" b="1" dirty="0">
-                <a:solidFill>
-                  <a:schemeClr val="dk1"/>
-                </a:solidFill>
-              </a:rPr>
-              <a:t>eep-ocean</a:t>
-            </a:r>
-            <a:r>
-              <a:rPr lang="en-US" b="1" dirty="0">
-                <a:solidFill>
-                  <a:schemeClr val="dk1"/>
-                </a:solidFill>
-              </a:rPr>
-              <a:t> microbial</a:t>
-            </a:r>
-            <a:r>
-              <a:rPr lang="en-US" b="1" dirty="0"/>
-              <a:t> community</a:t>
-            </a:r>
-          </a:p>
-        </p:txBody>
-      </p:sp>
-      <p:sp>
-        <p:nvSpPr>
-          <p:cNvPr id="94" name="Google Shape;94;p16"/>
-          <p:cNvSpPr txBox="1"/>
-          <p:nvPr/>
-        </p:nvSpPr>
-        <p:spPr>
-          <a:xfrm>
-            <a:off x="5369884" y="922453"/>
-            <a:ext cx="1857718" cy="553968"/>
-          </a:xfrm>
-          <a:prstGeom prst="rect">
-            <a:avLst/>
-          </a:prstGeom>
-          <a:noFill/>
-          <a:ln>
-            <a:noFill/>
-          </a:ln>
-        </p:spPr>
-        <p:txBody>
-          <a:bodyPr spcFirstLastPara="1" wrap="square" lIns="91425" tIns="91425" rIns="91425" bIns="91425" anchor="t" anchorCtr="0">
-            <a:spAutoFit/>
-          </a:bodyPr>
-          <a:lstStyle/>
-          <a:p>
-            <a:pPr marL="0" lvl="0" indent="0" algn="ctr" rtl="0">
-              <a:spcBef>
-                <a:spcPts val="0"/>
-              </a:spcBef>
-              <a:spcAft>
-                <a:spcPts val="0"/>
-              </a:spcAft>
-              <a:buNone/>
-            </a:pPr>
-            <a:r>
-              <a:rPr lang="en" sz="1200" b="1" dirty="0">
-                <a:solidFill>
-                  <a:srgbClr val="B45F06"/>
-                </a:solidFill>
-              </a:rPr>
-              <a:t>helps competion </a:t>
-            </a:r>
-          </a:p>
-          <a:p>
-            <a:pPr marL="0" lvl="0" indent="0" algn="ctr" rtl="0">
-              <a:spcBef>
-                <a:spcPts val="0"/>
-              </a:spcBef>
-              <a:spcAft>
-                <a:spcPts val="0"/>
-              </a:spcAft>
-              <a:buNone/>
-            </a:pPr>
-            <a:r>
-              <a:rPr lang="en" sz="1200" b="1" dirty="0">
-                <a:solidFill>
-                  <a:srgbClr val="B45F06"/>
-                </a:solidFill>
-              </a:rPr>
-              <a:t>and defense on</a:t>
-            </a:r>
-            <a:endParaRPr sz="1200" b="1" dirty="0">
-              <a:solidFill>
-                <a:srgbClr val="B45F06"/>
-              </a:solidFill>
-            </a:endParaRPr>
-          </a:p>
-        </p:txBody>
-      </p:sp>
-      <p:sp>
-        <p:nvSpPr>
-          <p:cNvPr id="22" name="Google Shape;85;p16">
-            <a:extLst>
-              <a:ext uri="{FF2B5EF4-FFF2-40B4-BE49-F238E27FC236}">
-                <a16:creationId xmlns:a16="http://schemas.microsoft.com/office/drawing/2014/main" id="{7B3E143E-5E39-4CA1-91FE-5EB3C5A75D11}"/>
-              </a:ext>
-            </a:extLst>
-          </p:cNvPr>
-          <p:cNvSpPr txBox="1"/>
-          <p:nvPr/>
-        </p:nvSpPr>
-        <p:spPr>
-          <a:xfrm>
-            <a:off x="3984987" y="2553511"/>
-            <a:ext cx="1632963" cy="442641"/>
-          </a:xfrm>
-          <a:prstGeom prst="roundRect">
-            <a:avLst/>
-          </a:prstGeom>
-          <a:solidFill>
-            <a:schemeClr val="accent1">
-              <a:lumMod val="60000"/>
-              <a:lumOff val="40000"/>
-            </a:schemeClr>
-          </a:solidFill>
-          <a:ln>
-            <a:noFill/>
-          </a:ln>
-        </p:spPr>
-        <p:txBody>
-          <a:bodyPr spcFirstLastPara="1" wrap="square" lIns="91425" tIns="91425" rIns="91425" bIns="91425" anchor="t" anchorCtr="0">
-            <a:spAutoFit/>
-          </a:bodyPr>
-          <a:lstStyle/>
-          <a:p>
-            <a:pPr marL="0" lvl="0" indent="0" algn="ctr" rtl="0">
-              <a:spcBef>
-                <a:spcPts val="0"/>
-              </a:spcBef>
-              <a:spcAft>
-                <a:spcPts val="0"/>
-              </a:spcAft>
-              <a:buNone/>
-            </a:pPr>
-            <a:r>
-              <a:rPr lang="en" b="1" dirty="0">
-                <a:solidFill>
-                  <a:schemeClr val="tx1"/>
-                </a:solidFill>
-              </a:rPr>
-              <a:t>Transposons</a:t>
-            </a:r>
-            <a:endParaRPr b="1" dirty="0">
-              <a:solidFill>
-                <a:schemeClr val="tx1"/>
-              </a:solidFill>
-            </a:endParaRPr>
-          </a:p>
-        </p:txBody>
-      </p:sp>
-      <p:sp>
-        <p:nvSpPr>
-          <p:cNvPr id="18" name="Google Shape;87;p16">
-            <a:extLst>
-              <a:ext uri="{FF2B5EF4-FFF2-40B4-BE49-F238E27FC236}">
-                <a16:creationId xmlns:a16="http://schemas.microsoft.com/office/drawing/2014/main" id="{A7651EED-4922-4FBC-AF26-D9ABA1EA33EE}"/>
-              </a:ext>
-            </a:extLst>
-          </p:cNvPr>
-          <p:cNvSpPr txBox="1"/>
-          <p:nvPr/>
-        </p:nvSpPr>
-        <p:spPr>
-          <a:xfrm>
-            <a:off x="3263207" y="1553817"/>
-            <a:ext cx="939897" cy="633365"/>
-          </a:xfrm>
-          <a:prstGeom prst="roundRect">
-            <a:avLst/>
-          </a:prstGeom>
-          <a:solidFill>
-            <a:srgbClr val="FF5050"/>
-          </a:solidFill>
-          <a:ln>
-            <a:noFill/>
-          </a:ln>
-        </p:spPr>
-        <p:txBody>
-          <a:bodyPr spcFirstLastPara="1" wrap="square" lIns="9144" tIns="9144" rIns="9144" bIns="9144" anchor="t" anchorCtr="0">
-            <a:spAutoFit/>
-          </a:bodyPr>
-          <a:lstStyle/>
-          <a:p>
-            <a:pPr marL="0" lvl="0" indent="0" algn="ctr" rtl="0">
-              <a:spcBef>
-                <a:spcPts val="0"/>
-              </a:spcBef>
-              <a:spcAft>
-                <a:spcPts val="0"/>
-              </a:spcAft>
-              <a:buNone/>
-            </a:pPr>
-            <a:r>
-              <a:rPr lang="en-US" sz="1200" b="1" dirty="0">
-                <a:solidFill>
-                  <a:schemeClr val="tx1"/>
-                </a:solidFill>
-              </a:rPr>
-              <a:t>Increased genome </a:t>
-            </a:r>
-          </a:p>
-          <a:p>
-            <a:pPr marL="0" lvl="0" indent="0" algn="ctr" rtl="0">
-              <a:spcBef>
-                <a:spcPts val="0"/>
-              </a:spcBef>
-              <a:spcAft>
-                <a:spcPts val="0"/>
-              </a:spcAft>
-              <a:buNone/>
-            </a:pPr>
-            <a:r>
-              <a:rPr lang="en-US" sz="1200" b="1" dirty="0">
-                <a:solidFill>
-                  <a:schemeClr val="tx1"/>
-                </a:solidFill>
-              </a:rPr>
-              <a:t>size</a:t>
-            </a:r>
-            <a:endParaRPr sz="1200" b="1" dirty="0">
-              <a:solidFill>
-                <a:schemeClr val="tx1"/>
-              </a:solidFill>
-            </a:endParaRPr>
-          </a:p>
-        </p:txBody>
-      </p:sp>
-      <p:cxnSp>
-        <p:nvCxnSpPr>
-          <p:cNvPr id="19" name="Google Shape;90;p16">
-            <a:extLst>
-              <a:ext uri="{FF2B5EF4-FFF2-40B4-BE49-F238E27FC236}">
-                <a16:creationId xmlns:a16="http://schemas.microsoft.com/office/drawing/2014/main" id="{22CBA851-C115-40B9-ADAB-04C0469F5801}"/>
-              </a:ext>
-            </a:extLst>
-          </p:cNvPr>
-          <p:cNvCxnSpPr>
-            <a:cxnSpLocks/>
-          </p:cNvCxnSpPr>
-          <p:nvPr/>
-        </p:nvCxnSpPr>
-        <p:spPr>
-          <a:xfrm flipH="1">
-            <a:off x="4748887" y="1457093"/>
-            <a:ext cx="10241" cy="953687"/>
-          </a:xfrm>
-          <a:prstGeom prst="straightConnector1">
-            <a:avLst/>
-          </a:prstGeom>
-          <a:noFill/>
-          <a:ln w="28575" cap="flat" cmpd="sng">
-            <a:solidFill>
-              <a:schemeClr val="tx1"/>
-            </a:solidFill>
-            <a:prstDash val="solid"/>
-            <a:round/>
-            <a:headEnd type="none" w="med" len="med"/>
-            <a:tailEnd type="triangle" w="med" len="med"/>
-          </a:ln>
-        </p:spPr>
-      </p:cxnSp>
-      <p:sp>
-        <p:nvSpPr>
-          <p:cNvPr id="92" name="Google Shape;92;p16"/>
-          <p:cNvSpPr txBox="1"/>
-          <p:nvPr/>
-        </p:nvSpPr>
-        <p:spPr>
-          <a:xfrm>
-            <a:off x="4395114" y="1705584"/>
-            <a:ext cx="795391" cy="233910"/>
-          </a:xfrm>
-          <a:prstGeom prst="rect">
-            <a:avLst/>
-          </a:prstGeom>
-          <a:solidFill>
-            <a:schemeClr val="bg1"/>
-          </a:solidFill>
-          <a:ln>
-            <a:noFill/>
-          </a:ln>
-        </p:spPr>
-        <p:txBody>
-          <a:bodyPr spcFirstLastPara="1" wrap="square" lIns="18288" tIns="9144" rIns="9144" bIns="9144" anchor="t" anchorCtr="0">
-            <a:spAutoFit/>
-          </a:bodyPr>
-          <a:lstStyle/>
-          <a:p>
-            <a:pPr marL="0" lvl="0" indent="0" algn="l" rtl="0">
-              <a:spcBef>
-                <a:spcPts val="0"/>
-              </a:spcBef>
-              <a:spcAft>
-                <a:spcPts val="0"/>
-              </a:spcAft>
-              <a:buNone/>
-            </a:pPr>
-            <a:r>
-              <a:rPr lang="en" b="1" dirty="0">
-                <a:solidFill>
-                  <a:srgbClr val="B45F06"/>
-                </a:solidFill>
-              </a:rPr>
-              <a:t>spreads</a:t>
-            </a:r>
-            <a:endParaRPr b="1" dirty="0">
-              <a:solidFill>
-                <a:srgbClr val="B45F06"/>
-              </a:solidFill>
-            </a:endParaRPr>
-          </a:p>
-        </p:txBody>
-      </p:sp>
-      <p:sp>
-        <p:nvSpPr>
-          <p:cNvPr id="85" name="Google Shape;92;p16">
-            <a:extLst>
-              <a:ext uri="{FF2B5EF4-FFF2-40B4-BE49-F238E27FC236}">
-                <a16:creationId xmlns:a16="http://schemas.microsoft.com/office/drawing/2014/main" id="{66075C9D-718F-4083-9BDF-0C4A805AF14D}"/>
-              </a:ext>
-            </a:extLst>
-          </p:cNvPr>
-          <p:cNvSpPr txBox="1"/>
-          <p:nvPr/>
-        </p:nvSpPr>
-        <p:spPr>
-          <a:xfrm>
-            <a:off x="5560496" y="2302476"/>
-            <a:ext cx="487587" cy="233910"/>
-          </a:xfrm>
-          <a:prstGeom prst="rect">
-            <a:avLst/>
-          </a:prstGeom>
-          <a:solidFill>
-            <a:schemeClr val="bg1"/>
-          </a:solidFill>
-          <a:ln>
-            <a:noFill/>
-          </a:ln>
-        </p:spPr>
-        <p:txBody>
-          <a:bodyPr spcFirstLastPara="1" wrap="square" lIns="18288" tIns="9144" rIns="9144" bIns="9144" anchor="t" anchorCtr="0">
-            <a:spAutoFit/>
-          </a:bodyPr>
-          <a:lstStyle/>
-          <a:p>
-            <a:pPr marL="0" lvl="0" indent="0" algn="l" rtl="0">
-              <a:spcBef>
-                <a:spcPts val="0"/>
-              </a:spcBef>
-              <a:spcAft>
-                <a:spcPts val="0"/>
-              </a:spcAft>
-              <a:buNone/>
-            </a:pPr>
-            <a:r>
-              <a:rPr lang="en" b="1" dirty="0">
-                <a:solidFill>
-                  <a:srgbClr val="B45F06"/>
-                </a:solidFill>
-              </a:rPr>
-              <a:t>carry</a:t>
-            </a:r>
-            <a:endParaRPr b="1" dirty="0">
-              <a:solidFill>
-                <a:srgbClr val="B45F06"/>
-              </a:solidFill>
-            </a:endParaRPr>
-          </a:p>
-        </p:txBody>
-      </p:sp>
-      <p:cxnSp>
-        <p:nvCxnSpPr>
-          <p:cNvPr id="23" name="Google Shape;90;p16">
-            <a:extLst>
-              <a:ext uri="{FF2B5EF4-FFF2-40B4-BE49-F238E27FC236}">
-                <a16:creationId xmlns:a16="http://schemas.microsoft.com/office/drawing/2014/main" id="{76FF781D-A53E-4BB3-9AED-568798FAB34C}"/>
-              </a:ext>
-            </a:extLst>
-          </p:cNvPr>
-          <p:cNvCxnSpPr>
-            <a:cxnSpLocks/>
-          </p:cNvCxnSpPr>
-          <p:nvPr/>
-        </p:nvCxnSpPr>
-        <p:spPr>
-          <a:xfrm flipV="1">
-            <a:off x="5421086" y="2254139"/>
-            <a:ext cx="222441" cy="248479"/>
-          </a:xfrm>
-          <a:prstGeom prst="straightConnector1">
-            <a:avLst/>
-          </a:prstGeom>
-          <a:noFill/>
-          <a:ln w="28575" cap="flat" cmpd="sng">
-            <a:solidFill>
-              <a:schemeClr val="tx1"/>
-            </a:solidFill>
-            <a:prstDash val="solid"/>
-            <a:round/>
-            <a:headEnd type="none" w="med" len="med"/>
-            <a:tailEnd type="triangle" w="med" len="med"/>
-          </a:ln>
-        </p:spPr>
-      </p:cxnSp>
-      <p:cxnSp>
-        <p:nvCxnSpPr>
-          <p:cNvPr id="27" name="Google Shape;90;p16">
-            <a:extLst>
-              <a:ext uri="{FF2B5EF4-FFF2-40B4-BE49-F238E27FC236}">
-                <a16:creationId xmlns:a16="http://schemas.microsoft.com/office/drawing/2014/main" id="{504468A2-3D05-4A3A-AF43-09B4F3D13B62}"/>
-              </a:ext>
-            </a:extLst>
-          </p:cNvPr>
-          <p:cNvCxnSpPr>
-            <a:cxnSpLocks/>
-          </p:cNvCxnSpPr>
-          <p:nvPr/>
-        </p:nvCxnSpPr>
-        <p:spPr>
-          <a:xfrm flipH="1" flipV="1">
-            <a:off x="5590774" y="1271266"/>
-            <a:ext cx="176300" cy="215046"/>
-          </a:xfrm>
-          <a:prstGeom prst="straightConnector1">
-            <a:avLst/>
-          </a:prstGeom>
-          <a:noFill/>
-          <a:ln w="28575" cap="flat" cmpd="sng">
-            <a:solidFill>
-              <a:schemeClr val="tx1"/>
-            </a:solidFill>
-            <a:prstDash val="solid"/>
-            <a:round/>
-            <a:headEnd type="none" w="med" len="med"/>
-            <a:tailEnd type="triangle" w="med" len="med"/>
-          </a:ln>
-        </p:spPr>
-      </p:cxnSp>
-      <p:cxnSp>
-        <p:nvCxnSpPr>
-          <p:cNvPr id="32" name="Google Shape;90;p16">
-            <a:extLst>
-              <a:ext uri="{FF2B5EF4-FFF2-40B4-BE49-F238E27FC236}">
-                <a16:creationId xmlns:a16="http://schemas.microsoft.com/office/drawing/2014/main" id="{6C50CF6E-766B-4443-96CC-5CCE6111D1DD}"/>
-              </a:ext>
-            </a:extLst>
-          </p:cNvPr>
-          <p:cNvCxnSpPr>
-            <a:cxnSpLocks/>
-          </p:cNvCxnSpPr>
-          <p:nvPr/>
-        </p:nvCxnSpPr>
-        <p:spPr>
-          <a:xfrm flipH="1">
-            <a:off x="3769812" y="1292172"/>
-            <a:ext cx="172836" cy="203064"/>
-          </a:xfrm>
-          <a:prstGeom prst="straightConnector1">
-            <a:avLst/>
-          </a:prstGeom>
-          <a:noFill/>
-          <a:ln w="28575" cap="flat" cmpd="sng">
-            <a:solidFill>
-              <a:schemeClr val="tx1"/>
-            </a:solidFill>
-            <a:prstDash val="solid"/>
-            <a:round/>
-            <a:headEnd type="none" w="med" len="med"/>
-            <a:tailEnd type="triangle" w="med" len="med"/>
-          </a:ln>
-        </p:spPr>
-      </p:cxnSp>
-      <p:sp>
-        <p:nvSpPr>
-          <p:cNvPr id="34" name="Google Shape;94;p16">
-            <a:extLst>
-              <a:ext uri="{FF2B5EF4-FFF2-40B4-BE49-F238E27FC236}">
-                <a16:creationId xmlns:a16="http://schemas.microsoft.com/office/drawing/2014/main" id="{DCD89C29-9457-47D3-927E-17082DE3893D}"/>
-              </a:ext>
-            </a:extLst>
-          </p:cNvPr>
-          <p:cNvSpPr txBox="1"/>
-          <p:nvPr/>
-        </p:nvSpPr>
-        <p:spPr>
-          <a:xfrm>
-            <a:off x="2985421" y="892106"/>
-            <a:ext cx="970679" cy="553968"/>
-          </a:xfrm>
-          <a:prstGeom prst="rect">
-            <a:avLst/>
-          </a:prstGeom>
-          <a:noFill/>
-          <a:ln>
-            <a:noFill/>
-          </a:ln>
-        </p:spPr>
-        <p:txBody>
-          <a:bodyPr spcFirstLastPara="1" wrap="square" lIns="91425" tIns="91425" rIns="91425" bIns="91425" anchor="t" anchorCtr="0">
-            <a:spAutoFit/>
-          </a:bodyPr>
-          <a:lstStyle/>
-          <a:p>
-            <a:pPr marL="0" lvl="0" indent="0" algn="ctr" rtl="0">
-              <a:spcBef>
-                <a:spcPts val="0"/>
-              </a:spcBef>
-              <a:spcAft>
-                <a:spcPts val="0"/>
-              </a:spcAft>
-              <a:buNone/>
-            </a:pPr>
-            <a:r>
-              <a:rPr lang="en" sz="1200" b="1" dirty="0">
-                <a:solidFill>
-                  <a:srgbClr val="B45F06"/>
-                </a:solidFill>
-              </a:rPr>
-              <a:t>correlates with</a:t>
-            </a:r>
-            <a:endParaRPr sz="1200" b="1" dirty="0">
-              <a:solidFill>
-                <a:srgbClr val="B45F06"/>
-              </a:solidFill>
-            </a:endParaRPr>
-          </a:p>
-        </p:txBody>
-      </p:sp>
-      <p:cxnSp>
-        <p:nvCxnSpPr>
-          <p:cNvPr id="39" name="Google Shape;90;p16">
-            <a:extLst>
-              <a:ext uri="{FF2B5EF4-FFF2-40B4-BE49-F238E27FC236}">
-                <a16:creationId xmlns:a16="http://schemas.microsoft.com/office/drawing/2014/main" id="{685EE98C-7DD8-4753-88C2-B34CD93CD22B}"/>
-              </a:ext>
-            </a:extLst>
-          </p:cNvPr>
-          <p:cNvCxnSpPr>
-            <a:cxnSpLocks/>
-          </p:cNvCxnSpPr>
-          <p:nvPr/>
-        </p:nvCxnSpPr>
-        <p:spPr>
-          <a:xfrm>
-            <a:off x="3956100" y="2261768"/>
-            <a:ext cx="229161" cy="243631"/>
-          </a:xfrm>
-          <a:prstGeom prst="straightConnector1">
-            <a:avLst/>
-          </a:prstGeom>
-          <a:noFill/>
-          <a:ln w="28575" cap="flat" cmpd="sng">
-            <a:solidFill>
-              <a:schemeClr val="tx1"/>
-            </a:solidFill>
-            <a:prstDash val="solid"/>
-            <a:round/>
-            <a:headEnd type="none" w="med" len="med"/>
-            <a:tailEnd type="triangle" w="med" len="med"/>
-          </a:ln>
-        </p:spPr>
-      </p:cxnSp>
-      <p:sp>
-        <p:nvSpPr>
-          <p:cNvPr id="45" name="Google Shape;94;p16">
-            <a:extLst>
-              <a:ext uri="{FF2B5EF4-FFF2-40B4-BE49-F238E27FC236}">
-                <a16:creationId xmlns:a16="http://schemas.microsoft.com/office/drawing/2014/main" id="{1A202B5C-1CC3-4616-A646-65D56D25AA2C}"/>
-              </a:ext>
-            </a:extLst>
-          </p:cNvPr>
-          <p:cNvSpPr txBox="1"/>
-          <p:nvPr/>
-        </p:nvSpPr>
-        <p:spPr>
-          <a:xfrm>
-            <a:off x="2443122" y="2235294"/>
-            <a:ext cx="1734118" cy="738633"/>
-          </a:xfrm>
-          <a:prstGeom prst="rect">
-            <a:avLst/>
-          </a:prstGeom>
-          <a:noFill/>
-          <a:ln>
-            <a:noFill/>
-          </a:ln>
-        </p:spPr>
-        <p:txBody>
-          <a:bodyPr spcFirstLastPara="1" wrap="square" lIns="91425" tIns="91425" rIns="91425" bIns="91425" anchor="t" anchorCtr="0">
-            <a:spAutoFit/>
-          </a:bodyPr>
-          <a:lstStyle/>
-          <a:p>
-            <a:pPr marL="0" lvl="0" indent="0" algn="ctr" rtl="0">
-              <a:spcBef>
-                <a:spcPts val="0"/>
-              </a:spcBef>
-              <a:spcAft>
-                <a:spcPts val="0"/>
-              </a:spcAft>
-              <a:buNone/>
-            </a:pPr>
-            <a:r>
-              <a:rPr lang="en-US" sz="1200" b="1" dirty="0">
-                <a:solidFill>
-                  <a:srgbClr val="B45F06"/>
-                </a:solidFill>
-              </a:rPr>
-              <a:t>b</a:t>
-            </a:r>
-            <a:r>
-              <a:rPr lang="en" sz="1200" b="1" dirty="0">
-                <a:solidFill>
-                  <a:srgbClr val="B45F06"/>
-                </a:solidFill>
-              </a:rPr>
-              <a:t>uffer distruptive </a:t>
-            </a:r>
-          </a:p>
-          <a:p>
-            <a:pPr marL="0" lvl="0" indent="0" algn="ctr" rtl="0">
-              <a:spcBef>
-                <a:spcPts val="0"/>
-              </a:spcBef>
-              <a:spcAft>
-                <a:spcPts val="0"/>
-              </a:spcAft>
-              <a:buNone/>
-            </a:pPr>
-            <a:r>
-              <a:rPr lang="en-US" sz="1200" b="1" dirty="0">
-                <a:solidFill>
-                  <a:srgbClr val="B45F06"/>
-                </a:solidFill>
-              </a:rPr>
-              <a:t>transpositions</a:t>
-            </a:r>
-          </a:p>
-          <a:p>
-            <a:pPr marL="0" lvl="0" indent="0" algn="ctr" rtl="0">
-              <a:spcBef>
-                <a:spcPts val="0"/>
-              </a:spcBef>
-              <a:spcAft>
-                <a:spcPts val="0"/>
-              </a:spcAft>
-              <a:buNone/>
-            </a:pPr>
-            <a:r>
-              <a:rPr lang="en" sz="1200" b="1" dirty="0">
-                <a:solidFill>
-                  <a:srgbClr val="B45F06"/>
-                </a:solidFill>
-              </a:rPr>
-              <a:t>cause by</a:t>
-            </a:r>
-          </a:p>
-        </p:txBody>
-      </p:sp>
-    </p:spTree>
-    <p:extLst>
-      <p:ext uri="{BB962C8B-B14F-4D97-AF65-F5344CB8AC3E}">
-        <p14:creationId xmlns:p14="http://schemas.microsoft.com/office/powerpoint/2010/main" val="1961186547"/>
-      </p:ext>
-    </p:extLst>
-  </p:cSld>
-  <p:clrMapOvr>
-    <a:masterClrMapping/>
-  </p:clrMapOvr>
-</p:sld>
-</file>
-
-<file path=ppt/slides/slide5.xml><?xml version="1.0" encoding="utf-8"?>
 <p:sld xmlns:a="http://schemas.openxmlformats.org/drawingml/2006/main" xmlns:r="http://schemas.openxmlformats.org/officeDocument/2006/relationships" xmlns:p="http://schemas.openxmlformats.org/presentationml/2006/main">
   <p:cSld>
     <p:spTree>
@@ -8830,126 +8699,7 @@
 </p:sld>
 </file>
 
-<file path=ppt/slides/slide6.xml><?xml version="1.0" encoding="utf-8"?>
-<p:sld xmlns:a="http://schemas.openxmlformats.org/drawingml/2006/main" xmlns:r="http://schemas.openxmlformats.org/officeDocument/2006/relationships" xmlns:p="http://schemas.openxmlformats.org/presentationml/2006/main">
-  <p:cSld>
-    <p:spTree>
-      <p:nvGrpSpPr>
-        <p:cNvPr id="1" name=""/>
-        <p:cNvGrpSpPr/>
-        <p:nvPr/>
-      </p:nvGrpSpPr>
-      <p:grpSpPr>
-        <a:xfrm>
-          <a:off x="0" y="0"/>
-          <a:ext cx="0" cy="0"/>
-          <a:chOff x="0" y="0"/>
-          <a:chExt cx="0" cy="0"/>
-        </a:xfrm>
-      </p:grpSpPr>
-      <p:pic>
-        <p:nvPicPr>
-          <p:cNvPr id="6" name="Picture 5">
-            <a:extLst>
-              <a:ext uri="{FF2B5EF4-FFF2-40B4-BE49-F238E27FC236}">
-                <a16:creationId xmlns:a16="http://schemas.microsoft.com/office/drawing/2014/main" id="{8DAD7A85-1659-4A0D-A9BE-CC6344BBABBA}"/>
-              </a:ext>
-            </a:extLst>
-          </p:cNvPr>
-          <p:cNvPicPr>
-            <a:picLocks noChangeAspect="1"/>
-          </p:cNvPicPr>
-          <p:nvPr/>
-        </p:nvPicPr>
-        <p:blipFill rotWithShape="1">
-          <a:blip r:embed="rId2"/>
-          <a:srcRect l="1449"/>
-          <a:stretch/>
-        </p:blipFill>
-        <p:spPr>
-          <a:xfrm>
-            <a:off x="2222522" y="0"/>
-            <a:ext cx="4769075" cy="5143500"/>
-          </a:xfrm>
-          <a:prstGeom prst="rect">
-            <a:avLst/>
-          </a:prstGeom>
-        </p:spPr>
-      </p:pic>
-      <p:pic>
-        <p:nvPicPr>
-          <p:cNvPr id="8" name="Picture 7">
-            <a:extLst>
-              <a:ext uri="{FF2B5EF4-FFF2-40B4-BE49-F238E27FC236}">
-                <a16:creationId xmlns:a16="http://schemas.microsoft.com/office/drawing/2014/main" id="{3714AA10-0165-4DD8-A982-4B9AD0F60AA5}"/>
-              </a:ext>
-            </a:extLst>
-          </p:cNvPr>
-          <p:cNvPicPr>
-            <a:picLocks noChangeAspect="1"/>
-          </p:cNvPicPr>
-          <p:nvPr/>
-        </p:nvPicPr>
-        <p:blipFill>
-          <a:blip r:embed="rId3"/>
-          <a:stretch>
-            <a:fillRect/>
-          </a:stretch>
-        </p:blipFill>
-        <p:spPr>
-          <a:xfrm>
-            <a:off x="2222523" y="266133"/>
-            <a:ext cx="2349478" cy="2116953"/>
-          </a:xfrm>
-          <a:prstGeom prst="rect">
-            <a:avLst/>
-          </a:prstGeom>
-        </p:spPr>
-      </p:pic>
-      <p:pic>
-        <p:nvPicPr>
-          <p:cNvPr id="9" name="Picture 8">
-            <a:extLst>
-              <a:ext uri="{FF2B5EF4-FFF2-40B4-BE49-F238E27FC236}">
-                <a16:creationId xmlns:a16="http://schemas.microsoft.com/office/drawing/2014/main" id="{A1ADDFA3-72E8-425A-9FB4-04CF4C613D0A}"/>
-              </a:ext>
-            </a:extLst>
-          </p:cNvPr>
-          <p:cNvPicPr>
-            <a:picLocks noChangeAspect="1"/>
-          </p:cNvPicPr>
-          <p:nvPr/>
-        </p:nvPicPr>
-        <p:blipFill>
-          <a:blip r:embed="rId4"/>
-          <a:stretch>
-            <a:fillRect/>
-          </a:stretch>
-        </p:blipFill>
-        <p:spPr>
-          <a:xfrm>
-            <a:off x="2222522" y="35465"/>
-            <a:ext cx="190071" cy="193137"/>
-          </a:xfrm>
-          <a:prstGeom prst="rect">
-            <a:avLst/>
-          </a:prstGeom>
-        </p:spPr>
-      </p:pic>
-    </p:spTree>
-    <p:extLst>
-      <p:ext uri="{BB962C8B-B14F-4D97-AF65-F5344CB8AC3E}">
-        <p14:creationId xmlns:p14="http://schemas.microsoft.com/office/powerpoint/2010/main" val="2012311000"/>
-      </p:ext>
-    </p:extLst>
-  </p:cSld>
-  <p:clrMapOvr>
-    <a:masterClrMapping/>
-  </p:clrMapOvr>
-</p:sld>
-</file>
-
-<file path=ppt/slides/slide7.xml><?xml version="1.0" encoding="utf-8"?>
+<file path=ppt/slides/slide5.xml><?xml version="1.0" encoding="utf-8"?>
 <p:sld xmlns:a="http://schemas.openxmlformats.org/drawingml/2006/main" xmlns:r="http://schemas.openxmlformats.org/officeDocument/2006/relationships" xmlns:p="http://schemas.openxmlformats.org/presentationml/2006/main">
   <p:cSld>
     <p:spTree>
@@ -9494,7 +9244,7 @@
 </p:sld>
 </file>
 
-<file path=ppt/slides/slide8.xml><?xml version="1.0" encoding="utf-8"?>
+<file path=ppt/slides/slide6.xml><?xml version="1.0" encoding="utf-8"?>
 <p:sld xmlns:a="http://schemas.openxmlformats.org/drawingml/2006/main" xmlns:r="http://schemas.openxmlformats.org/officeDocument/2006/relationships" xmlns:p="http://schemas.openxmlformats.org/presentationml/2006/main">
   <p:cSld>
     <p:spTree>
@@ -9992,7 +9742,7 @@
 </p:sld>
 </file>
 
-<file path=ppt/slides/slide9.xml><?xml version="1.0" encoding="utf-8"?>
+<file path=ppt/slides/slide7.xml><?xml version="1.0" encoding="utf-8"?>
 <p:sld xmlns:a="http://schemas.openxmlformats.org/drawingml/2006/main" xmlns:r="http://schemas.openxmlformats.org/officeDocument/2006/relationships" xmlns:p="http://schemas.openxmlformats.org/presentationml/2006/main">
   <p:cSld>
     <p:spTree>

</xml_diff>